<commit_message>
Updated details on MCS and added slide on geographical spread
</commit_message>
<xml_diff>
--- a/ofmw-forum2016-valencia-demo.pptx
+++ b/ofmw-forum2016-valencia-demo.pptx
@@ -10,6 +10,7 @@
     <p:sldId id="258" r:id="rId4"/>
     <p:sldId id="259" r:id="rId5"/>
     <p:sldId id="260" r:id="rId6"/>
+    <p:sldId id="261" r:id="rId7"/>
   </p:sldIdLst>
   <p:sldSz cx="9144000" cy="6858000" type="screen4x3"/>
   <p:notesSz cx="6858000" cy="9144000"/>
@@ -31445,11 +31446,7 @@
             </a:r>
             <a:r>
               <a:rPr lang="nl-NL" sz="1100" dirty="0" smtClean="0"/>
-              <a:t> </a:t>
-            </a:r>
-            <a:r>
-              <a:rPr lang="nl-NL" sz="1100" dirty="0" smtClean="0"/>
-              <a:t>MCS)</a:t>
+              <a:t> MCS)</a:t>
             </a:r>
             <a:endParaRPr lang="en-US" sz="1200" dirty="0"/>
           </a:p>
@@ -31562,13 +31559,8 @@
             </a:r>
             <a:r>
               <a:rPr lang="nl-NL" sz="1400" dirty="0" smtClean="0"/>
-              <a:t> </a:t>
-            </a:r>
-            <a:r>
-              <a:rPr lang="nl-NL" sz="1400" dirty="0" smtClean="0"/>
-              <a:t>image</a:t>
-            </a:r>
-            <a:endParaRPr lang="nl-NL" sz="1400" dirty="0" smtClean="0"/>
+              <a:t> image</a:t>
+            </a:r>
           </a:p>
         </p:txBody>
       </p:sp>
@@ -33672,6 +33664,979 @@
 </p:sld>
 </file>
 
+<file path=ppt/slides/slide6.xml><?xml version="1.0" encoding="utf-8"?>
+<p:sld xmlns:a="http://schemas.openxmlformats.org/drawingml/2006/main" xmlns:r="http://schemas.openxmlformats.org/officeDocument/2006/relationships" xmlns:p="http://schemas.openxmlformats.org/presentationml/2006/main">
+  <p:cSld>
+    <p:spTree>
+      <p:nvGrpSpPr>
+        <p:cNvPr id="1" name=""/>
+        <p:cNvGrpSpPr/>
+        <p:nvPr/>
+      </p:nvGrpSpPr>
+      <p:grpSpPr>
+        <a:xfrm>
+          <a:off x="0" y="0"/>
+          <a:ext cx="0" cy="0"/>
+          <a:chOff x="0" y="0"/>
+          <a:chExt cx="0" cy="0"/>
+        </a:xfrm>
+      </p:grpSpPr>
+      <p:pic>
+        <p:nvPicPr>
+          <p:cNvPr id="1031" name="Picture 7" descr="http://image.slidesharecdn.com/5oraclespubliccloudfordatabaseandapplicationdeveloperskm-130228033654-phpapp01/95/oracles-public-cloud-for-database-and-application-developers-krzysztof-marciniak-senior-sales-consultant-oracle-polska-14-638.jpg?cb=1362025397"/>
+          <p:cNvPicPr>
+            <a:picLocks noChangeAspect="1" noChangeArrowheads="1"/>
+          </p:cNvPicPr>
+          <p:nvPr/>
+        </p:nvPicPr>
+        <p:blipFill rotWithShape="1">
+          <a:blip r:embed="rId2">
+            <a:extLst>
+              <a:ext uri="{28A0092B-C50C-407E-A947-70E740481C1C}">
+                <a14:useLocalDpi xmlns:a14="http://schemas.microsoft.com/office/drawing/2010/main" val="0"/>
+              </a:ext>
+            </a:extLst>
+          </a:blip>
+          <a:srcRect t="15224" r="40087" b="45326"/>
+          <a:stretch/>
+        </p:blipFill>
+        <p:spPr bwMode="auto">
+          <a:xfrm>
+            <a:off x="-396552" y="2548797"/>
+            <a:ext cx="9177887" cy="3400483"/>
+          </a:xfrm>
+          <a:prstGeom prst="rect">
+            <a:avLst/>
+          </a:prstGeom>
+          <a:noFill/>
+          <a:extLst>
+            <a:ext uri="{909E8E84-426E-40DD-AFC4-6F175D3DCCD1}">
+              <a14:hiddenFill xmlns:a14="http://schemas.microsoft.com/office/drawing/2010/main">
+                <a:solidFill>
+                  <a:srgbClr val="FFFFFF"/>
+                </a:solidFill>
+              </a14:hiddenFill>
+            </a:ext>
+          </a:extLst>
+        </p:spPr>
+      </p:pic>
+      <p:sp>
+        <p:nvSpPr>
+          <p:cNvPr id="2" name="AutoShape 2" descr="https://upload.wikimedia.org/wikipedia/commons/d/d0/BlankMap-World-1ce.png"/>
+          <p:cNvSpPr>
+            <a:spLocks noChangeAspect="1" noChangeArrowheads="1"/>
+          </p:cNvSpPr>
+          <p:nvPr/>
+        </p:nvSpPr>
+        <p:spPr bwMode="auto">
+          <a:xfrm>
+            <a:off x="155575" y="-1752600"/>
+            <a:ext cx="7019925" cy="3657600"/>
+          </a:xfrm>
+          <a:prstGeom prst="rect">
+            <a:avLst/>
+          </a:prstGeom>
+          <a:noFill/>
+          <a:extLst>
+            <a:ext uri="{909E8E84-426E-40DD-AFC4-6F175D3DCCD1}">
+              <a14:hiddenFill xmlns:a14="http://schemas.microsoft.com/office/drawing/2010/main">
+                <a:solidFill>
+                  <a:srgbClr val="FFFFFF"/>
+                </a:solidFill>
+              </a14:hiddenFill>
+            </a:ext>
+          </a:extLst>
+        </p:spPr>
+        <p:txBody>
+          <a:bodyPr vert="horz" wrap="square" lIns="91440" tIns="45720" rIns="91440" bIns="45720" numCol="1" anchor="t" anchorCtr="0" compatLnSpc="1">
+            <a:prstTxWarp prst="textNoShape">
+              <a:avLst/>
+            </a:prstTxWarp>
+          </a:bodyPr>
+          <a:lstStyle/>
+          <a:p>
+            <a:endParaRPr lang="en-US"/>
+          </a:p>
+        </p:txBody>
+      </p:sp>
+      <p:sp>
+        <p:nvSpPr>
+          <p:cNvPr id="4" name="Cube 3"/>
+          <p:cNvSpPr/>
+          <p:nvPr/>
+        </p:nvSpPr>
+        <p:spPr>
+          <a:xfrm>
+            <a:off x="7900296" y="2626325"/>
+            <a:ext cx="1008112" cy="720080"/>
+          </a:xfrm>
+          <a:prstGeom prst="cube">
+            <a:avLst/>
+          </a:prstGeom>
+        </p:spPr>
+        <p:style>
+          <a:lnRef idx="1">
+            <a:schemeClr val="accent2"/>
+          </a:lnRef>
+          <a:fillRef idx="3">
+            <a:schemeClr val="accent2"/>
+          </a:fillRef>
+          <a:effectRef idx="2">
+            <a:schemeClr val="accent2"/>
+          </a:effectRef>
+          <a:fontRef idx="minor">
+            <a:schemeClr val="lt1"/>
+          </a:fontRef>
+        </p:style>
+        <p:txBody>
+          <a:bodyPr rtlCol="0" anchor="ctr"/>
+          <a:lstStyle/>
+          <a:p>
+            <a:pPr algn="ctr"/>
+            <a:r>
+              <a:rPr lang="nl-NL" sz="1600" dirty="0" err="1" smtClean="0"/>
+              <a:t>DBaaS</a:t>
+            </a:r>
+            <a:endParaRPr lang="en-US" sz="1600" dirty="0"/>
+          </a:p>
+        </p:txBody>
+      </p:sp>
+      <p:sp>
+        <p:nvSpPr>
+          <p:cNvPr id="5" name="Cube 4"/>
+          <p:cNvSpPr/>
+          <p:nvPr/>
+        </p:nvSpPr>
+        <p:spPr>
+          <a:xfrm>
+            <a:off x="7250640" y="3399453"/>
+            <a:ext cx="1008112" cy="720080"/>
+          </a:xfrm>
+          <a:prstGeom prst="cube">
+            <a:avLst/>
+          </a:prstGeom>
+        </p:spPr>
+        <p:style>
+          <a:lnRef idx="1">
+            <a:schemeClr val="accent2"/>
+          </a:lnRef>
+          <a:fillRef idx="3">
+            <a:schemeClr val="accent2"/>
+          </a:fillRef>
+          <a:effectRef idx="2">
+            <a:schemeClr val="accent2"/>
+          </a:effectRef>
+          <a:fontRef idx="minor">
+            <a:schemeClr val="lt1"/>
+          </a:fontRef>
+        </p:style>
+        <p:txBody>
+          <a:bodyPr rtlCol="0" anchor="ctr"/>
+          <a:lstStyle/>
+          <a:p>
+            <a:pPr algn="ctr"/>
+            <a:r>
+              <a:rPr lang="nl-NL" sz="1600" dirty="0" smtClean="0"/>
+              <a:t>SOA CS</a:t>
+            </a:r>
+            <a:endParaRPr lang="en-US" sz="1600" dirty="0"/>
+          </a:p>
+        </p:txBody>
+      </p:sp>
+      <p:sp>
+        <p:nvSpPr>
+          <p:cNvPr id="6" name="Cube 5"/>
+          <p:cNvSpPr/>
+          <p:nvPr/>
+        </p:nvSpPr>
+        <p:spPr>
+          <a:xfrm>
+            <a:off x="7072712" y="2016680"/>
+            <a:ext cx="1008112" cy="720080"/>
+          </a:xfrm>
+          <a:prstGeom prst="cube">
+            <a:avLst/>
+          </a:prstGeom>
+        </p:spPr>
+        <p:style>
+          <a:lnRef idx="1">
+            <a:schemeClr val="accent2"/>
+          </a:lnRef>
+          <a:fillRef idx="3">
+            <a:schemeClr val="accent2"/>
+          </a:fillRef>
+          <a:effectRef idx="2">
+            <a:schemeClr val="accent2"/>
+          </a:effectRef>
+          <a:fontRef idx="minor">
+            <a:schemeClr val="lt1"/>
+          </a:fontRef>
+        </p:style>
+        <p:txBody>
+          <a:bodyPr rtlCol="0" anchor="ctr"/>
+          <a:lstStyle/>
+          <a:p>
+            <a:pPr algn="ctr"/>
+            <a:r>
+              <a:rPr lang="nl-NL" sz="1600" dirty="0" smtClean="0"/>
+              <a:t>ACC</a:t>
+            </a:r>
+            <a:endParaRPr lang="en-US" sz="1600" dirty="0"/>
+          </a:p>
+        </p:txBody>
+      </p:sp>
+      <p:sp>
+        <p:nvSpPr>
+          <p:cNvPr id="7" name="Cube 6"/>
+          <p:cNvSpPr/>
+          <p:nvPr/>
+        </p:nvSpPr>
+        <p:spPr>
+          <a:xfrm>
+            <a:off x="3616328" y="1323841"/>
+            <a:ext cx="936104" cy="720080"/>
+          </a:xfrm>
+          <a:prstGeom prst="cube">
+            <a:avLst/>
+          </a:prstGeom>
+        </p:spPr>
+        <p:style>
+          <a:lnRef idx="1">
+            <a:schemeClr val="accent2"/>
+          </a:lnRef>
+          <a:fillRef idx="3">
+            <a:schemeClr val="accent2"/>
+          </a:fillRef>
+          <a:effectRef idx="2">
+            <a:schemeClr val="accent2"/>
+          </a:effectRef>
+          <a:fontRef idx="minor">
+            <a:schemeClr val="lt1"/>
+          </a:fontRef>
+        </p:style>
+        <p:txBody>
+          <a:bodyPr rtlCol="0" anchor="ctr"/>
+          <a:lstStyle/>
+          <a:p>
+            <a:pPr algn="ctr"/>
+            <a:r>
+              <a:rPr lang="nl-NL" sz="1600" dirty="0" smtClean="0"/>
+              <a:t>ICS</a:t>
+            </a:r>
+            <a:endParaRPr lang="en-US" sz="1600" dirty="0"/>
+          </a:p>
+        </p:txBody>
+      </p:sp>
+      <p:sp>
+        <p:nvSpPr>
+          <p:cNvPr id="8" name="Cube 7"/>
+          <p:cNvSpPr/>
+          <p:nvPr/>
+        </p:nvSpPr>
+        <p:spPr>
+          <a:xfrm>
+            <a:off x="1312072" y="2165781"/>
+            <a:ext cx="936104" cy="720080"/>
+          </a:xfrm>
+          <a:prstGeom prst="cube">
+            <a:avLst/>
+          </a:prstGeom>
+        </p:spPr>
+        <p:style>
+          <a:lnRef idx="1">
+            <a:schemeClr val="accent2"/>
+          </a:lnRef>
+          <a:fillRef idx="3">
+            <a:schemeClr val="accent2"/>
+          </a:fillRef>
+          <a:effectRef idx="2">
+            <a:schemeClr val="accent2"/>
+          </a:effectRef>
+          <a:fontRef idx="minor">
+            <a:schemeClr val="lt1"/>
+          </a:fontRef>
+        </p:style>
+        <p:txBody>
+          <a:bodyPr rtlCol="0" anchor="ctr"/>
+          <a:lstStyle/>
+          <a:p>
+            <a:pPr algn="ctr"/>
+            <a:r>
+              <a:rPr lang="nl-NL" sz="1600" dirty="0"/>
+              <a:t>M</a:t>
+            </a:r>
+            <a:r>
+              <a:rPr lang="nl-NL" sz="1600" dirty="0" smtClean="0"/>
+              <a:t>CS</a:t>
+            </a:r>
+            <a:endParaRPr lang="en-US" sz="1600" dirty="0"/>
+          </a:p>
+        </p:txBody>
+      </p:sp>
+      <p:sp>
+        <p:nvSpPr>
+          <p:cNvPr id="9" name="Cube 8"/>
+          <p:cNvSpPr/>
+          <p:nvPr/>
+        </p:nvSpPr>
+        <p:spPr>
+          <a:xfrm>
+            <a:off x="2585053" y="830543"/>
+            <a:ext cx="936104" cy="720080"/>
+          </a:xfrm>
+          <a:prstGeom prst="cube">
+            <a:avLst/>
+          </a:prstGeom>
+        </p:spPr>
+        <p:style>
+          <a:lnRef idx="1">
+            <a:schemeClr val="accent2"/>
+          </a:lnRef>
+          <a:fillRef idx="3">
+            <a:schemeClr val="accent2"/>
+          </a:fillRef>
+          <a:effectRef idx="2">
+            <a:schemeClr val="accent2"/>
+          </a:effectRef>
+          <a:fontRef idx="minor">
+            <a:schemeClr val="lt1"/>
+          </a:fontRef>
+        </p:style>
+        <p:txBody>
+          <a:bodyPr rtlCol="0" anchor="ctr"/>
+          <a:lstStyle/>
+          <a:p>
+            <a:pPr algn="ctr"/>
+            <a:r>
+              <a:rPr lang="nl-NL" sz="1600" dirty="0" smtClean="0"/>
+              <a:t>DCS</a:t>
+            </a:r>
+            <a:endParaRPr lang="en-US" sz="1600" dirty="0"/>
+          </a:p>
+        </p:txBody>
+      </p:sp>
+      <p:sp>
+        <p:nvSpPr>
+          <p:cNvPr id="10" name="Cube 9"/>
+          <p:cNvSpPr/>
+          <p:nvPr/>
+        </p:nvSpPr>
+        <p:spPr>
+          <a:xfrm>
+            <a:off x="2374688" y="1611120"/>
+            <a:ext cx="936104" cy="720080"/>
+          </a:xfrm>
+          <a:prstGeom prst="cube">
+            <a:avLst/>
+          </a:prstGeom>
+        </p:spPr>
+        <p:style>
+          <a:lnRef idx="1">
+            <a:schemeClr val="accent2"/>
+          </a:lnRef>
+          <a:fillRef idx="3">
+            <a:schemeClr val="accent2"/>
+          </a:fillRef>
+          <a:effectRef idx="2">
+            <a:schemeClr val="accent2"/>
+          </a:effectRef>
+          <a:fontRef idx="minor">
+            <a:schemeClr val="lt1"/>
+          </a:fontRef>
+        </p:style>
+        <p:txBody>
+          <a:bodyPr rtlCol="0" anchor="ctr"/>
+          <a:lstStyle/>
+          <a:p>
+            <a:pPr algn="ctr"/>
+            <a:r>
+              <a:rPr lang="nl-NL" sz="1600" dirty="0"/>
+              <a:t>P</a:t>
+            </a:r>
+            <a:r>
+              <a:rPr lang="nl-NL" sz="1600" dirty="0" smtClean="0"/>
+              <a:t>CS</a:t>
+            </a:r>
+            <a:endParaRPr lang="en-US" sz="1600" dirty="0"/>
+          </a:p>
+        </p:txBody>
+      </p:sp>
+      <p:sp>
+        <p:nvSpPr>
+          <p:cNvPr id="11" name="Cube 10"/>
+          <p:cNvSpPr/>
+          <p:nvPr/>
+        </p:nvSpPr>
+        <p:spPr>
+          <a:xfrm>
+            <a:off x="3220138" y="2176983"/>
+            <a:ext cx="1008112" cy="720080"/>
+          </a:xfrm>
+          <a:prstGeom prst="cube">
+            <a:avLst/>
+          </a:prstGeom>
+        </p:spPr>
+        <p:style>
+          <a:lnRef idx="1">
+            <a:schemeClr val="accent2"/>
+          </a:lnRef>
+          <a:fillRef idx="3">
+            <a:schemeClr val="accent2"/>
+          </a:fillRef>
+          <a:effectRef idx="2">
+            <a:schemeClr val="accent2"/>
+          </a:effectRef>
+          <a:fontRef idx="minor">
+            <a:schemeClr val="lt1"/>
+          </a:fontRef>
+        </p:style>
+        <p:txBody>
+          <a:bodyPr rtlCol="0" anchor="ctr"/>
+          <a:lstStyle/>
+          <a:p>
+            <a:pPr algn="ctr"/>
+            <a:r>
+              <a:rPr lang="nl-NL" sz="1600" dirty="0">
+                <a:solidFill>
+                  <a:schemeClr val="lt1"/>
+                </a:solidFill>
+              </a:rPr>
+              <a:t>JCS</a:t>
+            </a:r>
+            <a:endParaRPr lang="en-US" sz="1600" dirty="0">
+              <a:solidFill>
+                <a:schemeClr val="lt1"/>
+              </a:solidFill>
+            </a:endParaRPr>
+          </a:p>
+        </p:txBody>
+      </p:sp>
+      <p:sp>
+        <p:nvSpPr>
+          <p:cNvPr id="12" name="Cube 11"/>
+          <p:cNvSpPr/>
+          <p:nvPr/>
+        </p:nvSpPr>
+        <p:spPr>
+          <a:xfrm>
+            <a:off x="6199341" y="3933056"/>
+            <a:ext cx="936104" cy="720080"/>
+          </a:xfrm>
+          <a:prstGeom prst="cube">
+            <a:avLst/>
+          </a:prstGeom>
+        </p:spPr>
+        <p:style>
+          <a:lnRef idx="1">
+            <a:schemeClr val="accent2"/>
+          </a:lnRef>
+          <a:fillRef idx="3">
+            <a:schemeClr val="accent2"/>
+          </a:fillRef>
+          <a:effectRef idx="2">
+            <a:schemeClr val="accent2"/>
+          </a:effectRef>
+          <a:fontRef idx="minor">
+            <a:schemeClr val="lt1"/>
+          </a:fontRef>
+        </p:style>
+        <p:txBody>
+          <a:bodyPr rtlCol="0" anchor="ctr"/>
+          <a:lstStyle/>
+          <a:p>
+            <a:pPr algn="ctr"/>
+            <a:r>
+              <a:rPr lang="nl-NL" sz="1600" dirty="0" err="1" smtClean="0"/>
+              <a:t>IoT</a:t>
+            </a:r>
+            <a:r>
+              <a:rPr lang="nl-NL" sz="1600" dirty="0" smtClean="0"/>
+              <a:t> CS</a:t>
+            </a:r>
+            <a:endParaRPr lang="en-US" sz="1600" dirty="0"/>
+          </a:p>
+        </p:txBody>
+      </p:sp>
+      <p:sp>
+        <p:nvSpPr>
+          <p:cNvPr id="3" name="Rectangular Callout 2"/>
+          <p:cNvSpPr/>
+          <p:nvPr/>
+        </p:nvSpPr>
+        <p:spPr>
+          <a:xfrm>
+            <a:off x="5146498" y="4427187"/>
+            <a:ext cx="1116124" cy="360040"/>
+          </a:xfrm>
+          <a:prstGeom prst="wedgeRectCallout">
+            <a:avLst>
+              <a:gd name="adj1" fmla="val 24341"/>
+              <a:gd name="adj2" fmla="val -165169"/>
+            </a:avLst>
+          </a:prstGeom>
+          <a:solidFill>
+            <a:schemeClr val="bg1"/>
+          </a:solidFill>
+          <a:ln>
+            <a:solidFill>
+              <a:srgbClr val="FF0000"/>
+            </a:solidFill>
+          </a:ln>
+        </p:spPr>
+        <p:style>
+          <a:lnRef idx="2">
+            <a:schemeClr val="accent1">
+              <a:shade val="50000"/>
+            </a:schemeClr>
+          </a:lnRef>
+          <a:fillRef idx="1">
+            <a:schemeClr val="accent1"/>
+          </a:fillRef>
+          <a:effectRef idx="0">
+            <a:schemeClr val="accent1"/>
+          </a:effectRef>
+          <a:fontRef idx="minor">
+            <a:schemeClr val="lt1"/>
+          </a:fontRef>
+        </p:style>
+        <p:txBody>
+          <a:bodyPr rtlCol="0" anchor="ctr"/>
+          <a:lstStyle/>
+          <a:p>
+            <a:pPr algn="ctr"/>
+            <a:r>
+              <a:rPr lang="nl-NL" b="1" dirty="0" smtClean="0">
+                <a:solidFill>
+                  <a:schemeClr val="tx1"/>
+                </a:solidFill>
+                <a:latin typeface="Aharoni" panose="02010803020104030203" pitchFamily="2" charset="-79"/>
+                <a:cs typeface="Aharoni" panose="02010803020104030203" pitchFamily="2" charset="-79"/>
+              </a:rPr>
+              <a:t>Valencia</a:t>
+            </a:r>
+            <a:endParaRPr lang="en-US" b="1" dirty="0">
+              <a:solidFill>
+                <a:schemeClr val="tx1"/>
+              </a:solidFill>
+              <a:latin typeface="Aharoni" panose="02010803020104030203" pitchFamily="2" charset="-79"/>
+              <a:cs typeface="Aharoni" panose="02010803020104030203" pitchFamily="2" charset="-79"/>
+            </a:endParaRPr>
+          </a:p>
+        </p:txBody>
+      </p:sp>
+      <p:sp>
+        <p:nvSpPr>
+          <p:cNvPr id="16" name="Cube 15"/>
+          <p:cNvSpPr/>
+          <p:nvPr/>
+        </p:nvSpPr>
+        <p:spPr>
+          <a:xfrm>
+            <a:off x="4530436" y="3573016"/>
+            <a:ext cx="936104" cy="720080"/>
+          </a:xfrm>
+          <a:prstGeom prst="cube">
+            <a:avLst/>
+          </a:prstGeom>
+        </p:spPr>
+        <p:style>
+          <a:lnRef idx="1">
+            <a:schemeClr val="accent6"/>
+          </a:lnRef>
+          <a:fillRef idx="3">
+            <a:schemeClr val="accent6"/>
+          </a:fillRef>
+          <a:effectRef idx="2">
+            <a:schemeClr val="accent6"/>
+          </a:effectRef>
+          <a:fontRef idx="minor">
+            <a:schemeClr val="lt1"/>
+          </a:fontRef>
+        </p:style>
+        <p:txBody>
+          <a:bodyPr rtlCol="0" anchor="ctr"/>
+          <a:lstStyle/>
+          <a:p>
+            <a:pPr algn="ctr"/>
+            <a:r>
+              <a:rPr lang="nl-NL" sz="1100" dirty="0" smtClean="0"/>
+              <a:t/>
+            </a:r>
+            <a:br>
+              <a:rPr lang="nl-NL" sz="1100" dirty="0" smtClean="0"/>
+            </a:br>
+            <a:r>
+              <a:rPr lang="nl-NL" sz="1100" dirty="0" smtClean="0"/>
+              <a:t>m</a:t>
+            </a:r>
+            <a:r>
+              <a:rPr lang="nl-NL" sz="1100" dirty="0" smtClean="0"/>
+              <a:t>ediator-proxy</a:t>
+            </a:r>
+            <a:endParaRPr lang="en-US" sz="1100" dirty="0"/>
+          </a:p>
+        </p:txBody>
+      </p:sp>
+      <p:pic>
+        <p:nvPicPr>
+          <p:cNvPr id="1032" name="Picture 8"/>
+          <p:cNvPicPr>
+            <a:picLocks noChangeAspect="1" noChangeArrowheads="1"/>
+          </p:cNvPicPr>
+          <p:nvPr/>
+        </p:nvPicPr>
+        <p:blipFill>
+          <a:blip r:embed="rId3" cstate="print">
+            <a:clrChange>
+              <a:clrFrom>
+                <a:srgbClr val="FFFFFF"/>
+              </a:clrFrom>
+              <a:clrTo>
+                <a:srgbClr val="FFFFFF">
+                  <a:alpha val="0"/>
+                </a:srgbClr>
+              </a:clrTo>
+            </a:clrChange>
+            <a:extLst>
+              <a:ext uri="{28A0092B-C50C-407E-A947-70E740481C1C}">
+                <a14:useLocalDpi xmlns:a14="http://schemas.microsoft.com/office/drawing/2010/main" val="0"/>
+              </a:ext>
+            </a:extLst>
+          </a:blip>
+          <a:srcRect/>
+          <a:stretch>
+            <a:fillRect/>
+          </a:stretch>
+        </p:blipFill>
+        <p:spPr bwMode="auto">
+          <a:xfrm>
+            <a:off x="4942865" y="3576123"/>
+            <a:ext cx="407265" cy="366741"/>
+          </a:xfrm>
+          <a:prstGeom prst="rect">
+            <a:avLst/>
+          </a:prstGeom>
+          <a:noFill/>
+          <a:ln>
+            <a:noFill/>
+          </a:ln>
+          <a:extLst>
+            <a:ext uri="{909E8E84-426E-40DD-AFC4-6F175D3DCCD1}">
+              <a14:hiddenFill xmlns:a14="http://schemas.microsoft.com/office/drawing/2010/main">
+                <a:solidFill>
+                  <a:schemeClr val="accent1"/>
+                </a:solidFill>
+              </a14:hiddenFill>
+            </a:ext>
+            <a:ext uri="{91240B29-F687-4F45-9708-019B960494DF}">
+              <a14:hiddenLine xmlns:a14="http://schemas.microsoft.com/office/drawing/2010/main" w="9525">
+                <a:solidFill>
+                  <a:schemeClr val="tx1"/>
+                </a:solidFill>
+                <a:miter lim="800000"/>
+                <a:headEnd/>
+                <a:tailEnd/>
+              </a14:hiddenLine>
+            </a:ext>
+          </a:extLst>
+        </p:spPr>
+      </p:pic>
+      <p:sp>
+        <p:nvSpPr>
+          <p:cNvPr id="21" name="Cloud 20"/>
+          <p:cNvSpPr/>
+          <p:nvPr/>
+        </p:nvSpPr>
+        <p:spPr>
+          <a:xfrm>
+            <a:off x="6034350" y="912281"/>
+            <a:ext cx="2052551" cy="969947"/>
+          </a:xfrm>
+          <a:prstGeom prst="cloud">
+            <a:avLst/>
+          </a:prstGeom>
+        </p:spPr>
+        <p:style>
+          <a:lnRef idx="1">
+            <a:schemeClr val="accent5"/>
+          </a:lnRef>
+          <a:fillRef idx="2">
+            <a:schemeClr val="accent5"/>
+          </a:fillRef>
+          <a:effectRef idx="1">
+            <a:schemeClr val="accent5"/>
+          </a:effectRef>
+          <a:fontRef idx="minor">
+            <a:schemeClr val="dk1"/>
+          </a:fontRef>
+        </p:style>
+        <p:txBody>
+          <a:bodyPr rtlCol="0" anchor="ctr"/>
+          <a:lstStyle/>
+          <a:p>
+            <a:pPr algn="ctr"/>
+            <a:endParaRPr lang="en-US"/>
+          </a:p>
+        </p:txBody>
+      </p:sp>
+      <p:pic>
+        <p:nvPicPr>
+          <p:cNvPr id="22" name="Picture 2" descr="https://i.kinja-img.com/gawker-media/image/upload/s--orhKhzhJ--/c_fill,fl_progressive,g_north,h_358,q_80,w_636/18iwgcfj83c3gpng.png"/>
+          <p:cNvPicPr>
+            <a:picLocks noChangeAspect="1" noChangeArrowheads="1"/>
+          </p:cNvPicPr>
+          <p:nvPr/>
+        </p:nvPicPr>
+        <p:blipFill>
+          <a:blip r:embed="rId4" cstate="print">
+            <a:clrChange>
+              <a:clrFrom>
+                <a:srgbClr val="FFFFFF"/>
+              </a:clrFrom>
+              <a:clrTo>
+                <a:srgbClr val="FFFFFF">
+                  <a:alpha val="0"/>
+                </a:srgbClr>
+              </a:clrTo>
+            </a:clrChange>
+            <a:extLst>
+              <a:ext uri="{28A0092B-C50C-407E-A947-70E740481C1C}">
+                <a14:useLocalDpi xmlns:a14="http://schemas.microsoft.com/office/drawing/2010/main" val="0"/>
+              </a:ext>
+            </a:extLst>
+          </a:blip>
+          <a:srcRect/>
+          <a:stretch>
+            <a:fillRect/>
+          </a:stretch>
+        </p:blipFill>
+        <p:spPr bwMode="auto">
+          <a:xfrm>
+            <a:off x="6297934" y="936180"/>
+            <a:ext cx="1091580" cy="614443"/>
+          </a:xfrm>
+          <a:prstGeom prst="rect">
+            <a:avLst/>
+          </a:prstGeom>
+          <a:noFill/>
+          <a:extLst>
+            <a:ext uri="{909E8E84-426E-40DD-AFC4-6F175D3DCCD1}">
+              <a14:hiddenFill xmlns:a14="http://schemas.microsoft.com/office/drawing/2010/main">
+                <a:solidFill>
+                  <a:srgbClr val="FFFFFF"/>
+                </a:solidFill>
+              </a14:hiddenFill>
+            </a:ext>
+          </a:extLst>
+        </p:spPr>
+      </p:pic>
+      <p:pic>
+        <p:nvPicPr>
+          <p:cNvPr id="23" name="Picture 4" descr="http://the.echonest.com/static/img/logos/250x200_lt.gif"/>
+          <p:cNvPicPr>
+            <a:picLocks noChangeAspect="1" noChangeArrowheads="1"/>
+          </p:cNvPicPr>
+          <p:nvPr/>
+        </p:nvPicPr>
+        <p:blipFill>
+          <a:blip r:embed="rId5">
+            <a:clrChange>
+              <a:clrFrom>
+                <a:srgbClr val="FFFFFF"/>
+              </a:clrFrom>
+              <a:clrTo>
+                <a:srgbClr val="FFFFFF">
+                  <a:alpha val="0"/>
+                </a:srgbClr>
+              </a:clrTo>
+            </a:clrChange>
+            <a:extLst>
+              <a:ext uri="{28A0092B-C50C-407E-A947-70E740481C1C}">
+                <a14:useLocalDpi xmlns:a14="http://schemas.microsoft.com/office/drawing/2010/main" val="0"/>
+              </a:ext>
+            </a:extLst>
+          </a:blip>
+          <a:srcRect/>
+          <a:stretch>
+            <a:fillRect/>
+          </a:stretch>
+        </p:blipFill>
+        <p:spPr bwMode="auto">
+          <a:xfrm>
+            <a:off x="6843724" y="890197"/>
+            <a:ext cx="1182560" cy="946048"/>
+          </a:xfrm>
+          <a:prstGeom prst="rect">
+            <a:avLst/>
+          </a:prstGeom>
+          <a:noFill/>
+          <a:extLst>
+            <a:ext uri="{909E8E84-426E-40DD-AFC4-6F175D3DCCD1}">
+              <a14:hiddenFill xmlns:a14="http://schemas.microsoft.com/office/drawing/2010/main">
+                <a:solidFill>
+                  <a:srgbClr val="FFFFFF"/>
+                </a:solidFill>
+              </a14:hiddenFill>
+            </a:ext>
+          </a:extLst>
+        </p:spPr>
+      </p:pic>
+      <p:grpSp>
+        <p:nvGrpSpPr>
+          <p:cNvPr id="13" name="Group 12"/>
+          <p:cNvGrpSpPr/>
+          <p:nvPr/>
+        </p:nvGrpSpPr>
+        <p:grpSpPr>
+          <a:xfrm>
+            <a:off x="1534936" y="4311235"/>
+            <a:ext cx="2052551" cy="969947"/>
+            <a:chOff x="1439158" y="4787227"/>
+            <a:chExt cx="2052551" cy="969947"/>
+          </a:xfrm>
+        </p:grpSpPr>
+        <p:sp>
+          <p:nvSpPr>
+            <p:cNvPr id="24" name="Cloud 23"/>
+            <p:cNvSpPr/>
+            <p:nvPr/>
+          </p:nvSpPr>
+          <p:spPr>
+            <a:xfrm>
+              <a:off x="1439158" y="4787227"/>
+              <a:ext cx="2052551" cy="969947"/>
+            </a:xfrm>
+            <a:prstGeom prst="cloud">
+              <a:avLst/>
+            </a:prstGeom>
+          </p:spPr>
+          <p:style>
+            <a:lnRef idx="1">
+              <a:schemeClr val="accent5"/>
+            </a:lnRef>
+            <a:fillRef idx="2">
+              <a:schemeClr val="accent5"/>
+            </a:fillRef>
+            <a:effectRef idx="1">
+              <a:schemeClr val="accent5"/>
+            </a:effectRef>
+            <a:fontRef idx="minor">
+              <a:schemeClr val="dk1"/>
+            </a:fontRef>
+          </p:style>
+          <p:txBody>
+            <a:bodyPr rtlCol="0" anchor="ctr"/>
+            <a:lstStyle/>
+            <a:p>
+              <a:pPr algn="ctr"/>
+              <a:endParaRPr lang="en-US"/>
+            </a:p>
+          </p:txBody>
+        </p:sp>
+        <p:pic>
+          <p:nvPicPr>
+            <p:cNvPr id="18" name="Picture 2" descr="https://g.twimg.com/Twitter_logo_blue.png"/>
+            <p:cNvPicPr>
+              <a:picLocks noChangeAspect="1" noChangeArrowheads="1"/>
+            </p:cNvPicPr>
+            <p:nvPr/>
+          </p:nvPicPr>
+          <p:blipFill>
+            <a:blip r:embed="rId6" cstate="print">
+              <a:extLst>
+                <a:ext uri="{28A0092B-C50C-407E-A947-70E740481C1C}">
+                  <a14:useLocalDpi xmlns:a14="http://schemas.microsoft.com/office/drawing/2010/main" val="0"/>
+                </a:ext>
+              </a:extLst>
+            </a:blip>
+            <a:srcRect/>
+            <a:stretch>
+              <a:fillRect/>
+            </a:stretch>
+          </p:blipFill>
+          <p:spPr bwMode="auto">
+            <a:xfrm>
+              <a:off x="2100933" y="5157192"/>
+              <a:ext cx="595930" cy="484887"/>
+            </a:xfrm>
+            <a:prstGeom prst="rect">
+              <a:avLst/>
+            </a:prstGeom>
+            <a:noFill/>
+            <a:extLst>
+              <a:ext uri="{909E8E84-426E-40DD-AFC4-6F175D3DCCD1}">
+                <a14:hiddenFill xmlns:a14="http://schemas.microsoft.com/office/drawing/2010/main">
+                  <a:solidFill>
+                    <a:srgbClr val="FFFFFF"/>
+                  </a:solidFill>
+                </a14:hiddenFill>
+              </a:ext>
+            </a:extLst>
+          </p:spPr>
+        </p:pic>
+      </p:grpSp>
+      <p:sp>
+        <p:nvSpPr>
+          <p:cNvPr id="26" name="Cube 25"/>
+          <p:cNvSpPr/>
+          <p:nvPr/>
+        </p:nvSpPr>
+        <p:spPr>
+          <a:xfrm>
+            <a:off x="1534936" y="1037214"/>
+            <a:ext cx="936104" cy="720080"/>
+          </a:xfrm>
+          <a:prstGeom prst="cube">
+            <a:avLst/>
+          </a:prstGeom>
+        </p:spPr>
+        <p:style>
+          <a:lnRef idx="1">
+            <a:schemeClr val="accent2"/>
+          </a:lnRef>
+          <a:fillRef idx="3">
+            <a:schemeClr val="accent2"/>
+          </a:fillRef>
+          <a:effectRef idx="2">
+            <a:schemeClr val="accent2"/>
+          </a:effectRef>
+          <a:fontRef idx="minor">
+            <a:schemeClr val="lt1"/>
+          </a:fontRef>
+        </p:style>
+        <p:txBody>
+          <a:bodyPr rtlCol="0" anchor="ctr"/>
+          <a:lstStyle/>
+          <a:p>
+            <a:pPr algn="ctr"/>
+            <a:r>
+              <a:rPr lang="nl-NL" sz="1600" dirty="0" smtClean="0"/>
+              <a:t>OSN</a:t>
+            </a:r>
+            <a:endParaRPr lang="en-US" sz="1600" dirty="0"/>
+          </a:p>
+        </p:txBody>
+      </p:sp>
+    </p:spTree>
+    <p:extLst>
+      <p:ext uri="{BB962C8B-B14F-4D97-AF65-F5344CB8AC3E}">
+        <p14:creationId xmlns:p14="http://schemas.microsoft.com/office/powerpoint/2010/main" val="3824823896"/>
+      </p:ext>
+    </p:extLst>
+  </p:cSld>
+  <p:clrMapOvr>
+    <a:masterClrMapping/>
+  </p:clrMapOvr>
+  <p:timing>
+    <p:tnLst>
+      <p:par>
+        <p:cTn id="1" dur="indefinite" restart="never" nodeType="tmRoot"/>
+      </p:par>
+    </p:tnLst>
+  </p:timing>
+</p:sld>
+</file>
+
 <file path=ppt/theme/theme1.xml><?xml version="1.0" encoding="utf-8"?>
 <a:theme xmlns:a="http://schemas.openxmlformats.org/drawingml/2006/main" name="Office Theme">
   <a:themeElements>

</xml_diff>

<commit_message>
Picture of Wilfred on geography slide
</commit_message>
<xml_diff>
--- a/ofmw-forum2016-valencia-demo.pptx
+++ b/ofmw-forum2016-valencia-demo.pptx
@@ -34113,65 +34113,19 @@
       </p:sp>
       <p:sp>
         <p:nvSpPr>
-          <p:cNvPr id="12" name="Cube 11"/>
-          <p:cNvSpPr/>
-          <p:nvPr/>
-        </p:nvSpPr>
-        <p:spPr>
-          <a:xfrm>
-            <a:off x="6199341" y="3933056"/>
-            <a:ext cx="936104" cy="720080"/>
-          </a:xfrm>
-          <a:prstGeom prst="cube">
-            <a:avLst/>
-          </a:prstGeom>
-        </p:spPr>
-        <p:style>
-          <a:lnRef idx="1">
-            <a:schemeClr val="accent2"/>
-          </a:lnRef>
-          <a:fillRef idx="3">
-            <a:schemeClr val="accent2"/>
-          </a:fillRef>
-          <a:effectRef idx="2">
-            <a:schemeClr val="accent2"/>
-          </a:effectRef>
-          <a:fontRef idx="minor">
-            <a:schemeClr val="lt1"/>
-          </a:fontRef>
-        </p:style>
-        <p:txBody>
-          <a:bodyPr rtlCol="0" anchor="ctr"/>
-          <a:lstStyle/>
-          <a:p>
-            <a:pPr algn="ctr"/>
-            <a:r>
-              <a:rPr lang="nl-NL" sz="1600" dirty="0" err="1" smtClean="0"/>
-              <a:t>IoT</a:t>
-            </a:r>
-            <a:r>
-              <a:rPr lang="nl-NL" sz="1600" dirty="0" smtClean="0"/>
-              <a:t> CS</a:t>
-            </a:r>
-            <a:endParaRPr lang="en-US" sz="1600" dirty="0"/>
-          </a:p>
-        </p:txBody>
-      </p:sp>
-      <p:sp>
-        <p:nvSpPr>
           <p:cNvPr id="3" name="Rectangular Callout 2"/>
           <p:cNvSpPr/>
           <p:nvPr/>
         </p:nvSpPr>
         <p:spPr>
           <a:xfrm>
-            <a:off x="5146498" y="4427187"/>
+            <a:off x="5028931" y="4436168"/>
             <a:ext cx="1116124" cy="360040"/>
           </a:xfrm>
           <a:prstGeom prst="wedgeRectCallout">
             <a:avLst>
-              <a:gd name="adj1" fmla="val 24341"/>
-              <a:gd name="adj2" fmla="val -165169"/>
+              <a:gd name="adj1" fmla="val 35060"/>
+              <a:gd name="adj2" fmla="val -174663"/>
             </a:avLst>
           </a:prstGeom>
           <a:solidFill>
@@ -34232,7 +34186,7 @@
         </p:nvSpPr>
         <p:spPr>
           <a:xfrm>
-            <a:off x="4530436" y="3573016"/>
+            <a:off x="4283968" y="3672267"/>
             <a:ext cx="936104" cy="720080"/>
           </a:xfrm>
           <a:prstGeom prst="cube">
@@ -34267,11 +34221,7 @@
             </a:br>
             <a:r>
               <a:rPr lang="nl-NL" sz="1100" dirty="0" smtClean="0"/>
-              <a:t>m</a:t>
-            </a:r>
-            <a:r>
-              <a:rPr lang="nl-NL" sz="1100" dirty="0" smtClean="0"/>
-              <a:t>ediator-proxy</a:t>
+              <a:t>mediator-proxy</a:t>
             </a:r>
             <a:endParaRPr lang="en-US" sz="1100" dirty="0"/>
           </a:p>
@@ -34310,7 +34260,7 @@
         </p:blipFill>
         <p:spPr bwMode="auto">
           <a:xfrm>
-            <a:off x="4942865" y="3576123"/>
+            <a:off x="4696397" y="3675374"/>
             <a:ext cx="407265" cy="366741"/>
           </a:xfrm>
           <a:prstGeom prst="rect">
@@ -34612,6 +34562,97 @@
             <a:r>
               <a:rPr lang="nl-NL" sz="1600" dirty="0" smtClean="0"/>
               <a:t>OSN</a:t>
+            </a:r>
+            <a:endParaRPr lang="en-US" sz="1600" dirty="0"/>
+          </a:p>
+        </p:txBody>
+      </p:sp>
+      <p:pic>
+        <p:nvPicPr>
+          <p:cNvPr id="1026" name="Picture 2" descr="Wilfred vander Deijl"/>
+          <p:cNvPicPr>
+            <a:picLocks noChangeAspect="1" noChangeArrowheads="1"/>
+          </p:cNvPicPr>
+          <p:nvPr/>
+        </p:nvPicPr>
+        <p:blipFill>
+          <a:blip r:embed="rId7" cstate="print">
+            <a:extLst>
+              <a:ext uri="{28A0092B-C50C-407E-A947-70E740481C1C}">
+                <a14:useLocalDpi xmlns:a14="http://schemas.microsoft.com/office/drawing/2010/main" val="0"/>
+              </a:ext>
+            </a:extLst>
+          </a:blip>
+          <a:srcRect/>
+          <a:stretch>
+            <a:fillRect/>
+          </a:stretch>
+        </p:blipFill>
+        <p:spPr bwMode="auto">
+          <a:xfrm>
+            <a:off x="5500225" y="3327128"/>
+            <a:ext cx="427800" cy="427800"/>
+          </a:xfrm>
+          <a:prstGeom prst="wedgeRoundRectCallout">
+            <a:avLst>
+              <a:gd name="adj1" fmla="val 99024"/>
+              <a:gd name="adj2" fmla="val 34533"/>
+              <a:gd name="adj3" fmla="val 16667"/>
+            </a:avLst>
+          </a:prstGeom>
+          <a:noFill/>
+          <a:extLst>
+            <a:ext uri="{909E8E84-426E-40DD-AFC4-6F175D3DCCD1}">
+              <a14:hiddenFill xmlns:a14="http://schemas.microsoft.com/office/drawing/2010/main">
+                <a:solidFill>
+                  <a:srgbClr val="FFFFFF"/>
+                </a:solidFill>
+              </a14:hiddenFill>
+            </a:ext>
+          </a:extLst>
+        </p:spPr>
+      </p:pic>
+      <p:sp>
+        <p:nvSpPr>
+          <p:cNvPr id="12" name="Cube 11"/>
+          <p:cNvSpPr/>
+          <p:nvPr/>
+        </p:nvSpPr>
+        <p:spPr>
+          <a:xfrm>
+            <a:off x="6084168" y="3890787"/>
+            <a:ext cx="936104" cy="720080"/>
+          </a:xfrm>
+          <a:prstGeom prst="cube">
+            <a:avLst/>
+          </a:prstGeom>
+        </p:spPr>
+        <p:style>
+          <a:lnRef idx="1">
+            <a:schemeClr val="accent2"/>
+          </a:lnRef>
+          <a:fillRef idx="3">
+            <a:schemeClr val="accent2"/>
+          </a:fillRef>
+          <a:effectRef idx="2">
+            <a:schemeClr val="accent2"/>
+          </a:effectRef>
+          <a:fontRef idx="minor">
+            <a:schemeClr val="lt1"/>
+          </a:fontRef>
+        </p:style>
+        <p:txBody>
+          <a:bodyPr rtlCol="0" anchor="ctr"/>
+          <a:lstStyle/>
+          <a:p>
+            <a:pPr algn="ctr"/>
+            <a:r>
+              <a:rPr lang="nl-NL" sz="1600" dirty="0" err="1" smtClean="0"/>
+              <a:t>IoT</a:t>
+            </a:r>
+            <a:r>
+              <a:rPr lang="nl-NL" sz="1600" dirty="0" smtClean="0"/>
+              <a:t> CS</a:t>
             </a:r>
             <a:endParaRPr lang="en-US" sz="1600" dirty="0"/>
           </a:p>

</xml_diff>

<commit_message>
Extended slide with all cloud service stacks
</commit_message>
<xml_diff>
--- a/ofmw-forum2016-valencia-demo.pptx
+++ b/ofmw-forum2016-valencia-demo.pptx
@@ -293,7 +293,7 @@
           <a:p>
             <a:fld id="{8A80D3F4-BE92-40ED-BB36-22F03F9BF743}" type="datetimeFigureOut">
               <a:rPr lang="en-US" smtClean="0"/>
-              <a:t>2/24/2016</a:t>
+              <a:t>2/28/2016</a:t>
             </a:fld>
             <a:endParaRPr lang="en-US"/>
           </a:p>
@@ -463,7 +463,7 @@
           <a:p>
             <a:fld id="{8A80D3F4-BE92-40ED-BB36-22F03F9BF743}" type="datetimeFigureOut">
               <a:rPr lang="en-US" smtClean="0"/>
-              <a:t>2/24/2016</a:t>
+              <a:t>2/28/2016</a:t>
             </a:fld>
             <a:endParaRPr lang="en-US"/>
           </a:p>
@@ -643,7 +643,7 @@
           <a:p>
             <a:fld id="{8A80D3F4-BE92-40ED-BB36-22F03F9BF743}" type="datetimeFigureOut">
               <a:rPr lang="en-US" smtClean="0"/>
-              <a:t>2/24/2016</a:t>
+              <a:t>2/28/2016</a:t>
             </a:fld>
             <a:endParaRPr lang="en-US"/>
           </a:p>
@@ -813,7 +813,7 @@
           <a:p>
             <a:fld id="{8A80D3F4-BE92-40ED-BB36-22F03F9BF743}" type="datetimeFigureOut">
               <a:rPr lang="en-US" smtClean="0"/>
-              <a:t>2/24/2016</a:t>
+              <a:t>2/28/2016</a:t>
             </a:fld>
             <a:endParaRPr lang="en-US"/>
           </a:p>
@@ -1059,7 +1059,7 @@
           <a:p>
             <a:fld id="{8A80D3F4-BE92-40ED-BB36-22F03F9BF743}" type="datetimeFigureOut">
               <a:rPr lang="en-US" smtClean="0"/>
-              <a:t>2/24/2016</a:t>
+              <a:t>2/28/2016</a:t>
             </a:fld>
             <a:endParaRPr lang="en-US"/>
           </a:p>
@@ -1347,7 +1347,7 @@
           <a:p>
             <a:fld id="{8A80D3F4-BE92-40ED-BB36-22F03F9BF743}" type="datetimeFigureOut">
               <a:rPr lang="en-US" smtClean="0"/>
-              <a:t>2/24/2016</a:t>
+              <a:t>2/28/2016</a:t>
             </a:fld>
             <a:endParaRPr lang="en-US"/>
           </a:p>
@@ -1769,7 +1769,7 @@
           <a:p>
             <a:fld id="{8A80D3F4-BE92-40ED-BB36-22F03F9BF743}" type="datetimeFigureOut">
               <a:rPr lang="en-US" smtClean="0"/>
-              <a:t>2/24/2016</a:t>
+              <a:t>2/28/2016</a:t>
             </a:fld>
             <a:endParaRPr lang="en-US"/>
           </a:p>
@@ -1887,7 +1887,7 @@
           <a:p>
             <a:fld id="{8A80D3F4-BE92-40ED-BB36-22F03F9BF743}" type="datetimeFigureOut">
               <a:rPr lang="en-US" smtClean="0"/>
-              <a:t>2/24/2016</a:t>
+              <a:t>2/28/2016</a:t>
             </a:fld>
             <a:endParaRPr lang="en-US"/>
           </a:p>
@@ -1982,7 +1982,7 @@
           <a:p>
             <a:fld id="{8A80D3F4-BE92-40ED-BB36-22F03F9BF743}" type="datetimeFigureOut">
               <a:rPr lang="en-US" smtClean="0"/>
-              <a:t>2/24/2016</a:t>
+              <a:t>2/28/2016</a:t>
             </a:fld>
             <a:endParaRPr lang="en-US"/>
           </a:p>
@@ -2259,7 +2259,7 @@
           <a:p>
             <a:fld id="{8A80D3F4-BE92-40ED-BB36-22F03F9BF743}" type="datetimeFigureOut">
               <a:rPr lang="en-US" smtClean="0"/>
-              <a:t>2/24/2016</a:t>
+              <a:t>2/28/2016</a:t>
             </a:fld>
             <a:endParaRPr lang="en-US"/>
           </a:p>
@@ -2512,7 +2512,7 @@
           <a:p>
             <a:fld id="{8A80D3F4-BE92-40ED-BB36-22F03F9BF743}" type="datetimeFigureOut">
               <a:rPr lang="en-US" smtClean="0"/>
-              <a:t>2/24/2016</a:t>
+              <a:t>2/28/2016</a:t>
             </a:fld>
             <a:endParaRPr lang="en-US"/>
           </a:p>
@@ -2725,7 +2725,7 @@
           <a:p>
             <a:fld id="{8A80D3F4-BE92-40ED-BB36-22F03F9BF743}" type="datetimeFigureOut">
               <a:rPr lang="en-US" smtClean="0"/>
-              <a:t>2/24/2016</a:t>
+              <a:t>2/28/2016</a:t>
             </a:fld>
             <a:endParaRPr lang="en-US"/>
           </a:p>
@@ -32076,7 +32076,7 @@
         </p:nvSpPr>
         <p:spPr>
           <a:xfrm>
-            <a:off x="6735152" y="2279074"/>
+            <a:off x="7956376" y="2393269"/>
             <a:ext cx="1008112" cy="720080"/>
           </a:xfrm>
           <a:prstGeom prst="cube">
@@ -32130,7 +32130,7 @@
         </p:nvSpPr>
         <p:spPr>
           <a:xfrm>
-            <a:off x="6735152" y="1703010"/>
+            <a:off x="7956376" y="1817205"/>
             <a:ext cx="1008112" cy="720080"/>
           </a:xfrm>
           <a:prstGeom prst="cube">
@@ -32184,7 +32184,7 @@
         </p:nvSpPr>
         <p:spPr>
           <a:xfrm>
-            <a:off x="6735152" y="1118562"/>
+            <a:off x="7956376" y="1232757"/>
             <a:ext cx="1008112" cy="720080"/>
           </a:xfrm>
           <a:prstGeom prst="cube">
@@ -32322,7 +32322,7 @@
         </p:nvSpPr>
         <p:spPr>
           <a:xfrm>
-            <a:off x="7956376" y="3337101"/>
+            <a:off x="6732240" y="2191155"/>
             <a:ext cx="1008112" cy="720080"/>
           </a:xfrm>
           <a:prstGeom prst="cube">
@@ -32376,7 +32376,7 @@
         </p:nvSpPr>
         <p:spPr>
           <a:xfrm>
-            <a:off x="7956376" y="2761037"/>
+            <a:off x="6732240" y="1615091"/>
             <a:ext cx="1008112" cy="720080"/>
           </a:xfrm>
           <a:prstGeom prst="cube">
@@ -32430,7 +32430,7 @@
         </p:nvSpPr>
         <p:spPr>
           <a:xfrm>
-            <a:off x="7956376" y="2132856"/>
+            <a:off x="6732240" y="986910"/>
             <a:ext cx="1008112" cy="720080"/>
           </a:xfrm>
           <a:prstGeom prst="cube">
@@ -32484,7 +32484,7 @@
         </p:nvSpPr>
         <p:spPr>
           <a:xfrm>
-            <a:off x="7956376" y="1556792"/>
+            <a:off x="6732240" y="410846"/>
             <a:ext cx="1008112" cy="720080"/>
           </a:xfrm>
           <a:prstGeom prst="cube">
@@ -32526,7 +32526,7 @@
         </p:nvSpPr>
         <p:spPr>
           <a:xfrm>
-            <a:off x="4139952" y="1793421"/>
+            <a:off x="4139952" y="1376772"/>
             <a:ext cx="1080120" cy="2139635"/>
           </a:xfrm>
           <a:prstGeom prst="cube">
@@ -32570,7 +32570,7 @@
         </p:nvSpPr>
         <p:spPr>
           <a:xfrm>
-            <a:off x="4211960" y="1289366"/>
+            <a:off x="4211960" y="872717"/>
             <a:ext cx="936104" cy="720080"/>
           </a:xfrm>
           <a:prstGeom prst="cube">
@@ -33212,7 +33212,7 @@
         </p:nvSpPr>
         <p:spPr>
           <a:xfrm>
-            <a:off x="4427984" y="1181353"/>
+            <a:off x="4427984" y="764704"/>
             <a:ext cx="216024" cy="216025"/>
           </a:xfrm>
           <a:prstGeom prst="cube">
@@ -33252,7 +33252,7 @@
         </p:nvSpPr>
         <p:spPr>
           <a:xfrm>
-            <a:off x="4788024" y="1196752"/>
+            <a:off x="4788024" y="780103"/>
             <a:ext cx="216024" cy="216025"/>
           </a:xfrm>
           <a:prstGeom prst="cube">
@@ -33372,7 +33372,7 @@
         </p:nvSpPr>
         <p:spPr>
           <a:xfrm>
-            <a:off x="8352420" y="1478602"/>
+            <a:off x="7128284" y="332656"/>
             <a:ext cx="216024" cy="216025"/>
           </a:xfrm>
           <a:prstGeom prst="cube">
@@ -33412,7 +33412,7 @@
         </p:nvSpPr>
         <p:spPr>
           <a:xfrm>
-            <a:off x="6948264" y="1010549"/>
+            <a:off x="8169488" y="1124744"/>
             <a:ext cx="216024" cy="216025"/>
           </a:xfrm>
           <a:prstGeom prst="cube">
@@ -33452,7 +33452,7 @@
         </p:nvSpPr>
         <p:spPr>
           <a:xfrm>
-            <a:off x="7056276" y="1118562"/>
+            <a:off x="8277500" y="1232757"/>
             <a:ext cx="182932" cy="170804"/>
           </a:xfrm>
           <a:prstGeom prst="cube">
@@ -33492,7 +33492,7 @@
         </p:nvSpPr>
         <p:spPr>
           <a:xfrm>
-            <a:off x="7341396" y="1052736"/>
+            <a:off x="8562620" y="1166931"/>
             <a:ext cx="182932" cy="170804"/>
           </a:xfrm>
           <a:prstGeom prst="cube">
@@ -33644,6 +33644,678 @@
           </a:p>
         </p:txBody>
       </p:sp>
+      <p:sp>
+        <p:nvSpPr>
+          <p:cNvPr id="51" name="Cube 50"/>
+          <p:cNvSpPr/>
+          <p:nvPr/>
+        </p:nvSpPr>
+        <p:spPr>
+          <a:xfrm>
+            <a:off x="1763260" y="65805"/>
+            <a:ext cx="216024" cy="216025"/>
+          </a:xfrm>
+          <a:prstGeom prst="cube">
+            <a:avLst/>
+          </a:prstGeom>
+        </p:spPr>
+        <p:style>
+          <a:lnRef idx="2">
+            <a:schemeClr val="accent1">
+              <a:shade val="50000"/>
+            </a:schemeClr>
+          </a:lnRef>
+          <a:fillRef idx="1">
+            <a:schemeClr val="accent1"/>
+          </a:fillRef>
+          <a:effectRef idx="0">
+            <a:schemeClr val="accent1"/>
+          </a:effectRef>
+          <a:fontRef idx="minor">
+            <a:schemeClr val="lt1"/>
+          </a:fontRef>
+        </p:style>
+        <p:txBody>
+          <a:bodyPr rtlCol="0" anchor="ctr"/>
+          <a:lstStyle/>
+          <a:p>
+            <a:pPr algn="ctr"/>
+            <a:endParaRPr lang="en-US"/>
+          </a:p>
+        </p:txBody>
+      </p:sp>
+      <p:cxnSp>
+        <p:nvCxnSpPr>
+          <p:cNvPr id="7" name="Straight Arrow Connector 6"/>
+          <p:cNvCxnSpPr>
+            <a:stCxn id="51" idx="4"/>
+            <a:endCxn id="50" idx="1"/>
+          </p:cNvCxnSpPr>
+          <p:nvPr/>
+        </p:nvCxnSpPr>
+        <p:spPr>
+          <a:xfrm>
+            <a:off x="1925278" y="200821"/>
+            <a:ext cx="1287571" cy="2516968"/>
+          </a:xfrm>
+          <a:prstGeom prst="straightConnector1">
+            <a:avLst/>
+          </a:prstGeom>
+          <a:ln>
+            <a:solidFill>
+              <a:schemeClr val="accent2">
+                <a:lumMod val="75000"/>
+              </a:schemeClr>
+            </a:solidFill>
+            <a:tailEnd type="arrow"/>
+          </a:ln>
+        </p:spPr>
+        <p:style>
+          <a:lnRef idx="1">
+            <a:schemeClr val="accent1"/>
+          </a:lnRef>
+          <a:fillRef idx="0">
+            <a:schemeClr val="accent1"/>
+          </a:fillRef>
+          <a:effectRef idx="0">
+            <a:schemeClr val="accent1"/>
+          </a:effectRef>
+          <a:fontRef idx="minor">
+            <a:schemeClr val="tx1"/>
+          </a:fontRef>
+        </p:style>
+      </p:cxnSp>
+      <p:cxnSp>
+        <p:nvCxnSpPr>
+          <p:cNvPr id="15" name="Straight Arrow Connector 14"/>
+          <p:cNvCxnSpPr>
+            <a:stCxn id="50" idx="0"/>
+            <a:endCxn id="40" idx="1"/>
+          </p:cNvCxnSpPr>
+          <p:nvPr/>
+        </p:nvCxnSpPr>
+        <p:spPr>
+          <a:xfrm flipV="1">
+            <a:off x="3266855" y="818710"/>
+            <a:ext cx="1242138" cy="1845073"/>
+          </a:xfrm>
+          <a:prstGeom prst="straightConnector1">
+            <a:avLst/>
+          </a:prstGeom>
+          <a:ln>
+            <a:solidFill>
+              <a:schemeClr val="accent2">
+                <a:lumMod val="75000"/>
+              </a:schemeClr>
+            </a:solidFill>
+            <a:tailEnd type="arrow"/>
+          </a:ln>
+        </p:spPr>
+        <p:style>
+          <a:lnRef idx="1">
+            <a:schemeClr val="accent1"/>
+          </a:lnRef>
+          <a:fillRef idx="0">
+            <a:schemeClr val="accent1"/>
+          </a:fillRef>
+          <a:effectRef idx="0">
+            <a:schemeClr val="accent1"/>
+          </a:effectRef>
+          <a:fontRef idx="minor">
+            <a:schemeClr val="tx1"/>
+          </a:fontRef>
+        </p:style>
+      </p:cxnSp>
+      <p:cxnSp>
+        <p:nvCxnSpPr>
+          <p:cNvPr id="34" name="Straight Arrow Connector 33"/>
+          <p:cNvCxnSpPr>
+            <a:stCxn id="40" idx="4"/>
+            <a:endCxn id="42" idx="2"/>
+          </p:cNvCxnSpPr>
+          <p:nvPr/>
+        </p:nvCxnSpPr>
+        <p:spPr>
+          <a:xfrm>
+            <a:off x="4590002" y="899720"/>
+            <a:ext cx="1134126" cy="776689"/>
+          </a:xfrm>
+          <a:prstGeom prst="straightConnector1">
+            <a:avLst/>
+          </a:prstGeom>
+          <a:ln>
+            <a:solidFill>
+              <a:schemeClr val="accent2">
+                <a:lumMod val="75000"/>
+              </a:schemeClr>
+            </a:solidFill>
+            <a:tailEnd type="arrow"/>
+          </a:ln>
+        </p:spPr>
+        <p:style>
+          <a:lnRef idx="1">
+            <a:schemeClr val="accent1"/>
+          </a:lnRef>
+          <a:fillRef idx="0">
+            <a:schemeClr val="accent1"/>
+          </a:fillRef>
+          <a:effectRef idx="0">
+            <a:schemeClr val="accent1"/>
+          </a:effectRef>
+          <a:fontRef idx="minor">
+            <a:schemeClr val="tx1"/>
+          </a:fontRef>
+        </p:style>
+      </p:cxnSp>
+      <p:cxnSp>
+        <p:nvCxnSpPr>
+          <p:cNvPr id="52" name="Straight Arrow Connector 51"/>
+          <p:cNvCxnSpPr>
+            <a:stCxn id="42" idx="0"/>
+            <a:endCxn id="44" idx="2"/>
+          </p:cNvCxnSpPr>
+          <p:nvPr/>
+        </p:nvCxnSpPr>
+        <p:spPr>
+          <a:xfrm flipV="1">
+            <a:off x="5859143" y="467672"/>
+            <a:ext cx="1269141" cy="1073721"/>
+          </a:xfrm>
+          <a:prstGeom prst="straightConnector1">
+            <a:avLst/>
+          </a:prstGeom>
+          <a:ln>
+            <a:solidFill>
+              <a:schemeClr val="accent2">
+                <a:lumMod val="75000"/>
+              </a:schemeClr>
+            </a:solidFill>
+            <a:tailEnd type="arrow"/>
+          </a:ln>
+        </p:spPr>
+        <p:style>
+          <a:lnRef idx="1">
+            <a:schemeClr val="accent1"/>
+          </a:lnRef>
+          <a:fillRef idx="0">
+            <a:schemeClr val="accent1"/>
+          </a:fillRef>
+          <a:effectRef idx="0">
+            <a:schemeClr val="accent1"/>
+          </a:effectRef>
+          <a:fontRef idx="minor">
+            <a:schemeClr val="tx1"/>
+          </a:fontRef>
+        </p:style>
+      </p:cxnSp>
+      <p:cxnSp>
+        <p:nvCxnSpPr>
+          <p:cNvPr id="54" name="Straight Arrow Connector 53"/>
+          <p:cNvCxnSpPr>
+            <a:stCxn id="43" idx="4"/>
+            <a:endCxn id="48" idx="0"/>
+          </p:cNvCxnSpPr>
+          <p:nvPr/>
+        </p:nvCxnSpPr>
+        <p:spPr>
+          <a:xfrm>
+            <a:off x="6318194" y="1691808"/>
+            <a:ext cx="942193" cy="2112259"/>
+          </a:xfrm>
+          <a:prstGeom prst="straightConnector1">
+            <a:avLst/>
+          </a:prstGeom>
+          <a:ln>
+            <a:solidFill>
+              <a:schemeClr val="accent2">
+                <a:lumMod val="75000"/>
+              </a:schemeClr>
+            </a:solidFill>
+            <a:headEnd type="arrow" w="med" len="med"/>
+            <a:tailEnd type="none" w="med" len="med"/>
+          </a:ln>
+        </p:spPr>
+        <p:style>
+          <a:lnRef idx="1">
+            <a:schemeClr val="accent1"/>
+          </a:lnRef>
+          <a:fillRef idx="0">
+            <a:schemeClr val="accent1"/>
+          </a:fillRef>
+          <a:effectRef idx="0">
+            <a:schemeClr val="accent1"/>
+          </a:effectRef>
+          <a:fontRef idx="minor">
+            <a:schemeClr val="tx1"/>
+          </a:fontRef>
+        </p:style>
+      </p:cxnSp>
+      <p:cxnSp>
+        <p:nvCxnSpPr>
+          <p:cNvPr id="57" name="Straight Arrow Connector 56"/>
+          <p:cNvCxnSpPr>
+            <a:stCxn id="43" idx="5"/>
+            <a:endCxn id="46" idx="2"/>
+          </p:cNvCxnSpPr>
+          <p:nvPr/>
+        </p:nvCxnSpPr>
+        <p:spPr>
+          <a:xfrm flipV="1">
+            <a:off x="6372200" y="1339510"/>
+            <a:ext cx="1905300" cy="298292"/>
+          </a:xfrm>
+          <a:prstGeom prst="straightConnector1">
+            <a:avLst/>
+          </a:prstGeom>
+          <a:ln>
+            <a:solidFill>
+              <a:schemeClr val="accent2">
+                <a:lumMod val="75000"/>
+              </a:schemeClr>
+            </a:solidFill>
+            <a:tailEnd type="arrow"/>
+          </a:ln>
+        </p:spPr>
+        <p:style>
+          <a:lnRef idx="1">
+            <a:schemeClr val="accent1"/>
+          </a:lnRef>
+          <a:fillRef idx="0">
+            <a:schemeClr val="accent1"/>
+          </a:fillRef>
+          <a:effectRef idx="0">
+            <a:schemeClr val="accent1"/>
+          </a:effectRef>
+          <a:fontRef idx="minor">
+            <a:schemeClr val="tx1"/>
+          </a:fontRef>
+        </p:style>
+      </p:cxnSp>
+      <p:cxnSp>
+        <p:nvCxnSpPr>
+          <p:cNvPr id="61" name="Straight Arrow Connector 60"/>
+          <p:cNvCxnSpPr>
+            <a:stCxn id="41" idx="5"/>
+            <a:endCxn id="42" idx="0"/>
+          </p:cNvCxnSpPr>
+          <p:nvPr/>
+        </p:nvCxnSpPr>
+        <p:spPr>
+          <a:xfrm>
+            <a:off x="5004048" y="861113"/>
+            <a:ext cx="855095" cy="680280"/>
+          </a:xfrm>
+          <a:prstGeom prst="straightConnector1">
+            <a:avLst/>
+          </a:prstGeom>
+          <a:ln>
+            <a:solidFill>
+              <a:schemeClr val="accent2">
+                <a:lumMod val="75000"/>
+              </a:schemeClr>
+            </a:solidFill>
+            <a:tailEnd type="arrow"/>
+          </a:ln>
+        </p:spPr>
+        <p:style>
+          <a:lnRef idx="1">
+            <a:schemeClr val="accent1"/>
+          </a:lnRef>
+          <a:fillRef idx="0">
+            <a:schemeClr val="accent1"/>
+          </a:fillRef>
+          <a:effectRef idx="0">
+            <a:schemeClr val="accent1"/>
+          </a:effectRef>
+          <a:fontRef idx="minor">
+            <a:schemeClr val="tx1"/>
+          </a:fontRef>
+        </p:style>
+      </p:cxnSp>
+      <p:cxnSp>
+        <p:nvCxnSpPr>
+          <p:cNvPr id="63" name="Straight Arrow Connector 62"/>
+          <p:cNvCxnSpPr>
+            <a:stCxn id="49" idx="5"/>
+            <a:endCxn id="48" idx="2"/>
+          </p:cNvCxnSpPr>
+          <p:nvPr/>
+        </p:nvCxnSpPr>
+        <p:spPr>
+          <a:xfrm flipV="1">
+            <a:off x="4933328" y="3939083"/>
+            <a:ext cx="2192044" cy="833906"/>
+          </a:xfrm>
+          <a:prstGeom prst="straightConnector1">
+            <a:avLst/>
+          </a:prstGeom>
+          <a:ln>
+            <a:solidFill>
+              <a:schemeClr val="accent2">
+                <a:lumMod val="75000"/>
+              </a:schemeClr>
+            </a:solidFill>
+            <a:tailEnd type="arrow"/>
+          </a:ln>
+        </p:spPr>
+        <p:style>
+          <a:lnRef idx="1">
+            <a:schemeClr val="accent1"/>
+          </a:lnRef>
+          <a:fillRef idx="0">
+            <a:schemeClr val="accent1"/>
+          </a:fillRef>
+          <a:effectRef idx="0">
+            <a:schemeClr val="accent1"/>
+          </a:effectRef>
+          <a:fontRef idx="minor">
+            <a:schemeClr val="tx1"/>
+          </a:fontRef>
+        </p:style>
+      </p:cxnSp>
+      <p:cxnSp>
+        <p:nvCxnSpPr>
+          <p:cNvPr id="68" name="Straight Arrow Connector 67"/>
+          <p:cNvCxnSpPr>
+            <a:stCxn id="42" idx="5"/>
+            <a:endCxn id="45" idx="2"/>
+          </p:cNvCxnSpPr>
+          <p:nvPr/>
+        </p:nvCxnSpPr>
+        <p:spPr>
+          <a:xfrm flipV="1">
+            <a:off x="5940152" y="1259760"/>
+            <a:ext cx="2229336" cy="362643"/>
+          </a:xfrm>
+          <a:prstGeom prst="straightConnector1">
+            <a:avLst/>
+          </a:prstGeom>
+          <a:ln>
+            <a:solidFill>
+              <a:schemeClr val="accent2">
+                <a:lumMod val="75000"/>
+              </a:schemeClr>
+            </a:solidFill>
+            <a:tailEnd type="arrow"/>
+          </a:ln>
+        </p:spPr>
+        <p:style>
+          <a:lnRef idx="1">
+            <a:schemeClr val="accent1"/>
+          </a:lnRef>
+          <a:fillRef idx="0">
+            <a:schemeClr val="accent1"/>
+          </a:fillRef>
+          <a:effectRef idx="0">
+            <a:schemeClr val="accent1"/>
+          </a:effectRef>
+          <a:fontRef idx="minor">
+            <a:schemeClr val="tx1"/>
+          </a:fontRef>
+        </p:style>
+      </p:cxnSp>
+      <p:cxnSp>
+        <p:nvCxnSpPr>
+          <p:cNvPr id="70" name="Straight Arrow Connector 69"/>
+          <p:cNvCxnSpPr>
+            <a:stCxn id="50" idx="2"/>
+            <a:endCxn id="28" idx="5"/>
+          </p:cNvCxnSpPr>
+          <p:nvPr/>
+        </p:nvCxnSpPr>
+        <p:spPr>
+          <a:xfrm flipH="1">
+            <a:off x="1835696" y="2798799"/>
+            <a:ext cx="1296144" cy="589338"/>
+          </a:xfrm>
+          <a:prstGeom prst="straightConnector1">
+            <a:avLst/>
+          </a:prstGeom>
+          <a:ln>
+            <a:tailEnd type="arrow"/>
+          </a:ln>
+        </p:spPr>
+        <p:style>
+          <a:lnRef idx="1">
+            <a:schemeClr val="accent1"/>
+          </a:lnRef>
+          <a:fillRef idx="0">
+            <a:schemeClr val="accent1"/>
+          </a:fillRef>
+          <a:effectRef idx="0">
+            <a:schemeClr val="accent1"/>
+          </a:effectRef>
+          <a:fontRef idx="minor">
+            <a:schemeClr val="tx1"/>
+          </a:fontRef>
+        </p:style>
+      </p:cxnSp>
+      <p:cxnSp>
+        <p:nvCxnSpPr>
+          <p:cNvPr id="72" name="Straight Arrow Connector 71"/>
+          <p:cNvCxnSpPr>
+            <a:stCxn id="50" idx="3"/>
+            <a:endCxn id="38" idx="0"/>
+          </p:cNvCxnSpPr>
+          <p:nvPr/>
+        </p:nvCxnSpPr>
+        <p:spPr>
+          <a:xfrm flipH="1">
+            <a:off x="2069722" y="2879808"/>
+            <a:ext cx="1143127" cy="1014866"/>
+          </a:xfrm>
+          <a:prstGeom prst="straightConnector1">
+            <a:avLst/>
+          </a:prstGeom>
+          <a:ln>
+            <a:tailEnd type="arrow"/>
+          </a:ln>
+        </p:spPr>
+        <p:style>
+          <a:lnRef idx="1">
+            <a:schemeClr val="accent1"/>
+          </a:lnRef>
+          <a:fillRef idx="0">
+            <a:schemeClr val="accent1"/>
+          </a:fillRef>
+          <a:effectRef idx="0">
+            <a:schemeClr val="accent1"/>
+          </a:effectRef>
+          <a:fontRef idx="minor">
+            <a:schemeClr val="tx1"/>
+          </a:fontRef>
+        </p:style>
+      </p:cxnSp>
+      <p:grpSp>
+        <p:nvGrpSpPr>
+          <p:cNvPr id="76" name="Group 75"/>
+          <p:cNvGrpSpPr/>
+          <p:nvPr/>
+        </p:nvGrpSpPr>
+        <p:grpSpPr>
+          <a:xfrm>
+            <a:off x="7956376" y="65805"/>
+            <a:ext cx="1138637" cy="622468"/>
+            <a:chOff x="6034350" y="890197"/>
+            <a:chExt cx="2052551" cy="992031"/>
+          </a:xfrm>
+        </p:grpSpPr>
+        <p:sp>
+          <p:nvSpPr>
+            <p:cNvPr id="73" name="Cloud 72"/>
+            <p:cNvSpPr/>
+            <p:nvPr/>
+          </p:nvSpPr>
+          <p:spPr>
+            <a:xfrm>
+              <a:off x="6034350" y="912281"/>
+              <a:ext cx="2052551" cy="969947"/>
+            </a:xfrm>
+            <a:prstGeom prst="cloud">
+              <a:avLst/>
+            </a:prstGeom>
+          </p:spPr>
+          <p:style>
+            <a:lnRef idx="1">
+              <a:schemeClr val="accent5"/>
+            </a:lnRef>
+            <a:fillRef idx="2">
+              <a:schemeClr val="accent5"/>
+            </a:fillRef>
+            <a:effectRef idx="1">
+              <a:schemeClr val="accent5"/>
+            </a:effectRef>
+            <a:fontRef idx="minor">
+              <a:schemeClr val="dk1"/>
+            </a:fontRef>
+          </p:style>
+          <p:txBody>
+            <a:bodyPr rtlCol="0" anchor="ctr"/>
+            <a:lstStyle/>
+            <a:p>
+              <a:pPr algn="ctr"/>
+              <a:endParaRPr lang="en-US"/>
+            </a:p>
+          </p:txBody>
+        </p:sp>
+        <p:pic>
+          <p:nvPicPr>
+            <p:cNvPr id="74" name="Picture 2" descr="https://i.kinja-img.com/gawker-media/image/upload/s--orhKhzhJ--/c_fill,fl_progressive,g_north,h_358,q_80,w_636/18iwgcfj83c3gpng.png"/>
+            <p:cNvPicPr>
+              <a:picLocks noChangeAspect="1" noChangeArrowheads="1"/>
+            </p:cNvPicPr>
+            <p:nvPr/>
+          </p:nvPicPr>
+          <p:blipFill>
+            <a:blip r:embed="rId2" cstate="print">
+              <a:clrChange>
+                <a:clrFrom>
+                  <a:srgbClr val="FFFFFF"/>
+                </a:clrFrom>
+                <a:clrTo>
+                  <a:srgbClr val="FFFFFF">
+                    <a:alpha val="0"/>
+                  </a:srgbClr>
+                </a:clrTo>
+              </a:clrChange>
+              <a:extLst>
+                <a:ext uri="{28A0092B-C50C-407E-A947-70E740481C1C}">
+                  <a14:useLocalDpi xmlns:a14="http://schemas.microsoft.com/office/drawing/2010/main" val="0"/>
+                </a:ext>
+              </a:extLst>
+            </a:blip>
+            <a:srcRect/>
+            <a:stretch>
+              <a:fillRect/>
+            </a:stretch>
+          </p:blipFill>
+          <p:spPr bwMode="auto">
+            <a:xfrm>
+              <a:off x="6297934" y="936180"/>
+              <a:ext cx="1091580" cy="614443"/>
+            </a:xfrm>
+            <a:prstGeom prst="rect">
+              <a:avLst/>
+            </a:prstGeom>
+            <a:noFill/>
+            <a:extLst>
+              <a:ext uri="{909E8E84-426E-40DD-AFC4-6F175D3DCCD1}">
+                <a14:hiddenFill xmlns:a14="http://schemas.microsoft.com/office/drawing/2010/main">
+                  <a:solidFill>
+                    <a:srgbClr val="FFFFFF"/>
+                  </a:solidFill>
+                </a14:hiddenFill>
+              </a:ext>
+            </a:extLst>
+          </p:spPr>
+        </p:pic>
+        <p:pic>
+          <p:nvPicPr>
+            <p:cNvPr id="75" name="Picture 4" descr="http://the.echonest.com/static/img/logos/250x200_lt.gif"/>
+            <p:cNvPicPr>
+              <a:picLocks noChangeAspect="1" noChangeArrowheads="1"/>
+            </p:cNvPicPr>
+            <p:nvPr/>
+          </p:nvPicPr>
+          <p:blipFill>
+            <a:blip r:embed="rId3" cstate="print">
+              <a:clrChange>
+                <a:clrFrom>
+                  <a:srgbClr val="FFFFFF"/>
+                </a:clrFrom>
+                <a:clrTo>
+                  <a:srgbClr val="FFFFFF">
+                    <a:alpha val="0"/>
+                  </a:srgbClr>
+                </a:clrTo>
+              </a:clrChange>
+              <a:extLst>
+                <a:ext uri="{28A0092B-C50C-407E-A947-70E740481C1C}">
+                  <a14:useLocalDpi xmlns:a14="http://schemas.microsoft.com/office/drawing/2010/main" val="0"/>
+                </a:ext>
+              </a:extLst>
+            </a:blip>
+            <a:srcRect/>
+            <a:stretch>
+              <a:fillRect/>
+            </a:stretch>
+          </p:blipFill>
+          <p:spPr bwMode="auto">
+            <a:xfrm>
+              <a:off x="6843724" y="890197"/>
+              <a:ext cx="1182560" cy="946048"/>
+            </a:xfrm>
+            <a:prstGeom prst="rect">
+              <a:avLst/>
+            </a:prstGeom>
+            <a:noFill/>
+            <a:extLst>
+              <a:ext uri="{909E8E84-426E-40DD-AFC4-6F175D3DCCD1}">
+                <a14:hiddenFill xmlns:a14="http://schemas.microsoft.com/office/drawing/2010/main">
+                  <a:solidFill>
+                    <a:srgbClr val="FFFFFF"/>
+                  </a:solidFill>
+                </a14:hiddenFill>
+              </a:ext>
+            </a:extLst>
+          </p:spPr>
+        </p:pic>
+      </p:grpSp>
+      <p:cxnSp>
+        <p:nvCxnSpPr>
+          <p:cNvPr id="78" name="Straight Arrow Connector 77"/>
+          <p:cNvCxnSpPr>
+            <a:stCxn id="44" idx="5"/>
+          </p:cNvCxnSpPr>
+          <p:nvPr/>
+        </p:nvCxnSpPr>
+        <p:spPr>
+          <a:xfrm flipV="1">
+            <a:off x="7344308" y="200821"/>
+            <a:ext cx="758289" cy="212845"/>
+          </a:xfrm>
+          <a:prstGeom prst="straightConnector1">
+            <a:avLst/>
+          </a:prstGeom>
+          <a:ln>
+            <a:tailEnd type="arrow"/>
+          </a:ln>
+        </p:spPr>
+        <p:style>
+          <a:lnRef idx="1">
+            <a:schemeClr val="accent1"/>
+          </a:lnRef>
+          <a:fillRef idx="0">
+            <a:schemeClr val="accent1"/>
+          </a:fillRef>
+          <a:effectRef idx="0">
+            <a:schemeClr val="accent1"/>
+          </a:effectRef>
+          <a:fontRef idx="minor">
+            <a:schemeClr val="tx1"/>
+          </a:fontRef>
+        </p:style>
+      </p:cxnSp>
     </p:spTree>
     <p:extLst>
       <p:ext uri="{BB962C8B-B14F-4D97-AF65-F5344CB8AC3E}">

</xml_diff>

<commit_message>
Added: details on JET application; also fault handling in BPEL for when Artist API is not accessible properly
</commit_message>
<xml_diff>
--- a/ofmw-forum2016-valencia-demo.pptx
+++ b/ofmw-forum2016-valencia-demo.pptx
@@ -8,7 +8,7 @@
     <p:sldId id="256" r:id="rId2"/>
     <p:sldId id="257" r:id="rId3"/>
     <p:sldId id="258" r:id="rId4"/>
-    <p:sldId id="259" r:id="rId5"/>
+    <p:sldId id="262" r:id="rId5"/>
     <p:sldId id="260" r:id="rId6"/>
     <p:sldId id="261" r:id="rId7"/>
   </p:sldIdLst>
@@ -30636,7 +30636,9 @@
       </p:sp>
       <p:sp>
         <p:nvSpPr>
-          <p:cNvPr id="40" name="Rounded Rectangle 39"/>
+          <p:cNvPr id="40" name="Rounded Rectangle 39">
+            <a:hlinkClick r:id="rId6"/>
+          </p:cNvPr>
           <p:cNvSpPr/>
           <p:nvPr/>
         </p:nvSpPr>
@@ -30650,17 +30652,17 @@
           </a:prstGeom>
         </p:spPr>
         <p:style>
-          <a:lnRef idx="1">
+          <a:lnRef idx="0">
             <a:schemeClr val="accent2"/>
           </a:lnRef>
-          <a:fillRef idx="2">
+          <a:fillRef idx="3">
             <a:schemeClr val="accent2"/>
           </a:fillRef>
-          <a:effectRef idx="1">
+          <a:effectRef idx="3">
             <a:schemeClr val="accent2"/>
           </a:effectRef>
           <a:fontRef idx="minor">
-            <a:schemeClr val="dk1"/>
+            <a:schemeClr val="lt1"/>
           </a:fontRef>
         </p:style>
         <p:txBody>
@@ -30669,21 +30671,37 @@
           <a:p>
             <a:pPr algn="ctr"/>
             <a:r>
-              <a:rPr lang="nl-NL" sz="1600" dirty="0" smtClean="0"/>
+              <a:rPr lang="nl-NL" sz="1600" dirty="0">
+                <a:solidFill>
+                  <a:schemeClr val="lt1"/>
+                </a:solidFill>
+              </a:rPr>
               <a:t>JET on </a:t>
             </a:r>
           </a:p>
           <a:p>
             <a:pPr algn="ctr"/>
             <a:r>
-              <a:rPr lang="nl-NL" sz="1600" dirty="0" err="1" smtClean="0"/>
+              <a:rPr lang="nl-NL" sz="1600" dirty="0" err="1">
+                <a:solidFill>
+                  <a:schemeClr val="lt1"/>
+                </a:solidFill>
+              </a:rPr>
               <a:t>AppContainer</a:t>
             </a:r>
             <a:r>
-              <a:rPr lang="nl-NL" sz="1600" dirty="0" smtClean="0"/>
+              <a:rPr lang="nl-NL" sz="1600" dirty="0">
+                <a:solidFill>
+                  <a:schemeClr val="lt1"/>
+                </a:solidFill>
+              </a:rPr>
               <a:t> CS (or JCS)</a:t>
             </a:r>
-            <a:endParaRPr lang="en-US" sz="1600" dirty="0"/>
+            <a:endParaRPr lang="en-US" sz="1600" dirty="0">
+              <a:solidFill>
+                <a:schemeClr val="lt1"/>
+              </a:solidFill>
+            </a:endParaRPr>
           </a:p>
         </p:txBody>
       </p:sp>
@@ -30706,7 +30724,10 @@
               <a:gd name="adj1" fmla="val 20072"/>
             </a:avLst>
           </a:prstGeom>
-          <a:ln>
+          <a:ln w="38100">
+            <a:solidFill>
+              <a:srgbClr val="C00000"/>
+            </a:solidFill>
             <a:tailEnd type="arrow"/>
           </a:ln>
         </p:spPr>
@@ -30742,7 +30763,10 @@
           <a:prstGeom prst="bentConnector2">
             <a:avLst/>
           </a:prstGeom>
-          <a:ln>
+          <a:ln w="38100">
+            <a:solidFill>
+              <a:srgbClr val="C00000"/>
+            </a:solidFill>
             <a:tailEnd type="arrow"/>
           </a:ln>
         </p:spPr>
@@ -30778,7 +30802,10 @@
           <a:prstGeom prst="bentConnector3">
             <a:avLst/>
           </a:prstGeom>
-          <a:ln>
+          <a:ln w="38100">
+            <a:solidFill>
+              <a:srgbClr val="C00000"/>
+            </a:solidFill>
             <a:tailEnd type="arrow"/>
           </a:ln>
         </p:spPr>
@@ -30811,7 +30838,10 @@
           <a:prstGeom prst="bentConnector3">
             <a:avLst/>
           </a:prstGeom>
-          <a:ln>
+          <a:ln w="38100">
+            <a:solidFill>
+              <a:srgbClr val="C00000"/>
+            </a:solidFill>
             <a:tailEnd type="arrow"/>
           </a:ln>
         </p:spPr>
@@ -30869,7 +30899,7 @@
       <p:sp>
         <p:nvSpPr>
           <p:cNvPr id="61" name="Rounded Rectangle 60">
-            <a:hlinkClick r:id="rId6"/>
+            <a:hlinkClick r:id="rId7"/>
           </p:cNvPr>
           <p:cNvSpPr/>
           <p:nvPr/>
@@ -30927,7 +30957,10 @@
           <a:prstGeom prst="bentConnector2">
             <a:avLst/>
           </a:prstGeom>
-          <a:ln>
+          <a:ln w="38100">
+            <a:solidFill>
+              <a:srgbClr val="C00000"/>
+            </a:solidFill>
             <a:tailEnd type="arrow"/>
           </a:ln>
         </p:spPr>
@@ -31740,7 +31773,7 @@
           <p:nvPr/>
         </p:nvPicPr>
         <p:blipFill>
-          <a:blip r:embed="rId7" cstate="print">
+          <a:blip r:embed="rId8" cstate="print">
             <a:clrChange>
               <a:clrFrom>
                 <a:srgbClr val="FFFFFF"/>
@@ -31791,7 +31824,7 @@
           <p:nvPr/>
         </p:nvPicPr>
         <p:blipFill>
-          <a:blip r:embed="rId8">
+          <a:blip r:embed="rId9">
             <a:clrChange>
               <a:clrFrom>
                 <a:srgbClr val="FFFFFF"/>
@@ -31850,7 +31883,10 @@
           <a:prstGeom prst="bentConnector3">
             <a:avLst/>
           </a:prstGeom>
-          <a:ln>
+          <a:ln w="38100">
+            <a:solidFill>
+              <a:srgbClr val="C00000"/>
+            </a:solidFill>
             <a:tailEnd type="arrow"/>
           </a:ln>
         </p:spPr>
@@ -31872,7 +31908,7 @@
     </p:spTree>
     <p:extLst>
       <p:ext uri="{BB962C8B-B14F-4D97-AF65-F5344CB8AC3E}">
-        <p14:creationId xmlns:p14="http://schemas.microsoft.com/office/powerpoint/2010/main" val="1356073827"/>
+        <p14:creationId xmlns:p14="http://schemas.microsoft.com/office/powerpoint/2010/main" val="1422945009"/>
       </p:ext>
     </p:extLst>
   </p:cSld>

</xml_diff>

<commit_message>
Support for Tweeting about new act proposal from SOA CS via ICS
- included in presentation
- extended the SOA Composite implementation with REST call to ICS (via
proxy)
</commit_message>
<xml_diff>
--- a/ofmw-forum2016-valencia-demo.pptx
+++ b/ofmw-forum2016-valencia-demo.pptx
@@ -293,7 +293,7 @@
           <a:p>
             <a:fld id="{8A80D3F4-BE92-40ED-BB36-22F03F9BF743}" type="datetimeFigureOut">
               <a:rPr lang="en-US" smtClean="0"/>
-              <a:t>2/28/2016</a:t>
+              <a:t>3/2/2016</a:t>
             </a:fld>
             <a:endParaRPr lang="en-US"/>
           </a:p>
@@ -463,7 +463,7 @@
           <a:p>
             <a:fld id="{8A80D3F4-BE92-40ED-BB36-22F03F9BF743}" type="datetimeFigureOut">
               <a:rPr lang="en-US" smtClean="0"/>
-              <a:t>2/28/2016</a:t>
+              <a:t>3/2/2016</a:t>
             </a:fld>
             <a:endParaRPr lang="en-US"/>
           </a:p>
@@ -643,7 +643,7 @@
           <a:p>
             <a:fld id="{8A80D3F4-BE92-40ED-BB36-22F03F9BF743}" type="datetimeFigureOut">
               <a:rPr lang="en-US" smtClean="0"/>
-              <a:t>2/28/2016</a:t>
+              <a:t>3/2/2016</a:t>
             </a:fld>
             <a:endParaRPr lang="en-US"/>
           </a:p>
@@ -813,7 +813,7 @@
           <a:p>
             <a:fld id="{8A80D3F4-BE92-40ED-BB36-22F03F9BF743}" type="datetimeFigureOut">
               <a:rPr lang="en-US" smtClean="0"/>
-              <a:t>2/28/2016</a:t>
+              <a:t>3/2/2016</a:t>
             </a:fld>
             <a:endParaRPr lang="en-US"/>
           </a:p>
@@ -1059,7 +1059,7 @@
           <a:p>
             <a:fld id="{8A80D3F4-BE92-40ED-BB36-22F03F9BF743}" type="datetimeFigureOut">
               <a:rPr lang="en-US" smtClean="0"/>
-              <a:t>2/28/2016</a:t>
+              <a:t>3/2/2016</a:t>
             </a:fld>
             <a:endParaRPr lang="en-US"/>
           </a:p>
@@ -1347,7 +1347,7 @@
           <a:p>
             <a:fld id="{8A80D3F4-BE92-40ED-BB36-22F03F9BF743}" type="datetimeFigureOut">
               <a:rPr lang="en-US" smtClean="0"/>
-              <a:t>2/28/2016</a:t>
+              <a:t>3/2/2016</a:t>
             </a:fld>
             <a:endParaRPr lang="en-US"/>
           </a:p>
@@ -1769,7 +1769,7 @@
           <a:p>
             <a:fld id="{8A80D3F4-BE92-40ED-BB36-22F03F9BF743}" type="datetimeFigureOut">
               <a:rPr lang="en-US" smtClean="0"/>
-              <a:t>2/28/2016</a:t>
+              <a:t>3/2/2016</a:t>
             </a:fld>
             <a:endParaRPr lang="en-US"/>
           </a:p>
@@ -1887,7 +1887,7 @@
           <a:p>
             <a:fld id="{8A80D3F4-BE92-40ED-BB36-22F03F9BF743}" type="datetimeFigureOut">
               <a:rPr lang="en-US" smtClean="0"/>
-              <a:t>2/28/2016</a:t>
+              <a:t>3/2/2016</a:t>
             </a:fld>
             <a:endParaRPr lang="en-US"/>
           </a:p>
@@ -1982,7 +1982,7 @@
           <a:p>
             <a:fld id="{8A80D3F4-BE92-40ED-BB36-22F03F9BF743}" type="datetimeFigureOut">
               <a:rPr lang="en-US" smtClean="0"/>
-              <a:t>2/28/2016</a:t>
+              <a:t>3/2/2016</a:t>
             </a:fld>
             <a:endParaRPr lang="en-US"/>
           </a:p>
@@ -2259,7 +2259,7 @@
           <a:p>
             <a:fld id="{8A80D3F4-BE92-40ED-BB36-22F03F9BF743}" type="datetimeFigureOut">
               <a:rPr lang="en-US" smtClean="0"/>
-              <a:t>2/28/2016</a:t>
+              <a:t>3/2/2016</a:t>
             </a:fld>
             <a:endParaRPr lang="en-US"/>
           </a:p>
@@ -2512,7 +2512,7 @@
           <a:p>
             <a:fld id="{8A80D3F4-BE92-40ED-BB36-22F03F9BF743}" type="datetimeFigureOut">
               <a:rPr lang="en-US" smtClean="0"/>
-              <a:t>2/28/2016</a:t>
+              <a:t>3/2/2016</a:t>
             </a:fld>
             <a:endParaRPr lang="en-US"/>
           </a:p>
@@ -2725,7 +2725,7 @@
           <a:p>
             <a:fld id="{8A80D3F4-BE92-40ED-BB36-22F03F9BF743}" type="datetimeFigureOut">
               <a:rPr lang="en-US" smtClean="0"/>
-              <a:t>2/28/2016</a:t>
+              <a:t>3/2/2016</a:t>
             </a:fld>
             <a:endParaRPr lang="en-US"/>
           </a:p>
@@ -3629,15 +3629,12 @@
       <p:cxnSp>
         <p:nvCxnSpPr>
           <p:cNvPr id="16" name="Elbow Connector 15"/>
-          <p:cNvCxnSpPr>
-            <a:stCxn id="8" idx="3"/>
-            <a:endCxn id="10" idx="1"/>
-          </p:cNvCxnSpPr>
+          <p:cNvCxnSpPr/>
           <p:nvPr/>
         </p:nvCxnSpPr>
         <p:spPr>
           <a:xfrm flipV="1">
-            <a:off x="2843808" y="2996952"/>
+            <a:off x="2843808" y="3140968"/>
             <a:ext cx="2088232" cy="504056"/>
           </a:xfrm>
           <a:prstGeom prst="bentConnector3">
@@ -4271,15 +4268,12 @@
       <p:cxnSp>
         <p:nvCxnSpPr>
           <p:cNvPr id="49" name="Elbow Connector 48"/>
-          <p:cNvCxnSpPr>
-            <a:stCxn id="10" idx="3"/>
-            <a:endCxn id="11" idx="1"/>
-          </p:cNvCxnSpPr>
+          <p:cNvCxnSpPr/>
           <p:nvPr/>
         </p:nvCxnSpPr>
         <p:spPr>
           <a:xfrm>
-            <a:off x="6084168" y="2996952"/>
+            <a:off x="6084168" y="2852936"/>
             <a:ext cx="669193" cy="12700"/>
           </a:xfrm>
           <a:prstGeom prst="bentConnector3">
@@ -4858,6 +4852,79 @@
           </a:xfrm>
           <a:prstGeom prst="bentConnector3">
             <a:avLst/>
+          </a:prstGeom>
+          <a:ln>
+            <a:tailEnd type="arrow"/>
+          </a:ln>
+        </p:spPr>
+        <p:style>
+          <a:lnRef idx="1">
+            <a:schemeClr val="accent1"/>
+          </a:lnRef>
+          <a:fillRef idx="0">
+            <a:schemeClr val="accent1"/>
+          </a:fillRef>
+          <a:effectRef idx="0">
+            <a:schemeClr val="accent1"/>
+          </a:effectRef>
+          <a:fontRef idx="minor">
+            <a:schemeClr val="tx1"/>
+          </a:fontRef>
+        </p:style>
+      </p:cxnSp>
+      <p:cxnSp>
+        <p:nvCxnSpPr>
+          <p:cNvPr id="3" name="Elbow Connector 2"/>
+          <p:cNvCxnSpPr>
+            <a:stCxn id="11" idx="1"/>
+            <a:endCxn id="10" idx="3"/>
+          </p:cNvCxnSpPr>
+          <p:nvPr/>
+        </p:nvCxnSpPr>
+        <p:spPr>
+          <a:xfrm rot="10800000">
+            <a:off x="6084169" y="2996952"/>
+            <a:ext cx="669193" cy="12700"/>
+          </a:xfrm>
+          <a:prstGeom prst="bentConnector3">
+            <a:avLst/>
+          </a:prstGeom>
+          <a:ln>
+            <a:tailEnd type="arrow"/>
+          </a:ln>
+        </p:spPr>
+        <p:style>
+          <a:lnRef idx="1">
+            <a:schemeClr val="accent1"/>
+          </a:lnRef>
+          <a:fillRef idx="0">
+            <a:schemeClr val="accent1"/>
+          </a:fillRef>
+          <a:effectRef idx="0">
+            <a:schemeClr val="accent1"/>
+          </a:effectRef>
+          <a:fontRef idx="minor">
+            <a:schemeClr val="tx1"/>
+          </a:fontRef>
+        </p:style>
+      </p:cxnSp>
+      <p:cxnSp>
+        <p:nvCxnSpPr>
+          <p:cNvPr id="15" name="Elbow Connector 14"/>
+          <p:cNvCxnSpPr>
+            <a:stCxn id="10" idx="1"/>
+          </p:cNvCxnSpPr>
+          <p:nvPr/>
+        </p:nvCxnSpPr>
+        <p:spPr>
+          <a:xfrm rot="10800000">
+            <a:off x="2483768" y="2276872"/>
+            <a:ext cx="2448272" cy="720080"/>
+          </a:xfrm>
+          <a:prstGeom prst="bentConnector3">
+            <a:avLst>
+              <a:gd name="adj1" fmla="val 8113"/>
+            </a:avLst>
           </a:prstGeom>
           <a:ln>
             <a:tailEnd type="arrow"/>
@@ -11921,42 +11988,6 @@
           </a:fontRef>
         </p:style>
       </p:cxnSp>
-      <p:cxnSp>
-        <p:nvCxnSpPr>
-          <p:cNvPr id="16" name="Elbow Connector 15"/>
-          <p:cNvCxnSpPr>
-            <a:stCxn id="8" idx="3"/>
-            <a:endCxn id="10" idx="1"/>
-          </p:cNvCxnSpPr>
-          <p:nvPr/>
-        </p:nvCxnSpPr>
-        <p:spPr>
-          <a:xfrm flipV="1">
-            <a:off x="2843808" y="2996952"/>
-            <a:ext cx="2088232" cy="504056"/>
-          </a:xfrm>
-          <a:prstGeom prst="bentConnector3">
-            <a:avLst/>
-          </a:prstGeom>
-          <a:ln>
-            <a:tailEnd type="arrow"/>
-          </a:ln>
-        </p:spPr>
-        <p:style>
-          <a:lnRef idx="1">
-            <a:schemeClr val="accent1"/>
-          </a:lnRef>
-          <a:fillRef idx="0">
-            <a:schemeClr val="accent1"/>
-          </a:fillRef>
-          <a:effectRef idx="0">
-            <a:schemeClr val="accent1"/>
-          </a:effectRef>
-          <a:fontRef idx="minor">
-            <a:schemeClr val="tx1"/>
-          </a:fontRef>
-        </p:style>
-      </p:cxnSp>
       <p:sp>
         <p:nvSpPr>
           <p:cNvPr id="17" name="Rounded Rectangle 16"/>
@@ -12542,42 +12573,6 @@
             <a:ext cx="1413721" cy="1584176"/>
           </a:xfrm>
           <a:prstGeom prst="bentConnector2">
-            <a:avLst/>
-          </a:prstGeom>
-          <a:ln>
-            <a:tailEnd type="arrow"/>
-          </a:ln>
-        </p:spPr>
-        <p:style>
-          <a:lnRef idx="1">
-            <a:schemeClr val="accent1"/>
-          </a:lnRef>
-          <a:fillRef idx="0">
-            <a:schemeClr val="accent1"/>
-          </a:fillRef>
-          <a:effectRef idx="0">
-            <a:schemeClr val="accent1"/>
-          </a:effectRef>
-          <a:fontRef idx="minor">
-            <a:schemeClr val="tx1"/>
-          </a:fontRef>
-        </p:style>
-      </p:cxnSp>
-      <p:cxnSp>
-        <p:nvCxnSpPr>
-          <p:cNvPr id="49" name="Elbow Connector 48"/>
-          <p:cNvCxnSpPr>
-            <a:stCxn id="10" idx="3"/>
-            <a:endCxn id="11" idx="1"/>
-          </p:cNvCxnSpPr>
-          <p:nvPr/>
-        </p:nvCxnSpPr>
-        <p:spPr>
-          <a:xfrm>
-            <a:off x="6084168" y="2996952"/>
-            <a:ext cx="669193" cy="12700"/>
-          </a:xfrm>
-          <a:prstGeom prst="bentConnector3">
             <a:avLst/>
           </a:prstGeom>
           <a:ln>
@@ -13434,97 +13429,251 @@
           <a:p>
             <a:pPr algn="ctr"/>
             <a:r>
-              <a:rPr lang="nl-NL" sz="1400" dirty="0" err="1" smtClean="0"/>
+              <a:rPr lang="nl-NL" sz="1200" dirty="0" err="1"/>
               <a:t>Expose</a:t>
             </a:r>
             <a:r>
-              <a:rPr lang="nl-NL" sz="1400" dirty="0" smtClean="0"/>
+              <a:rPr lang="nl-NL" sz="1200" dirty="0"/>
               <a:t> REST API [for PCS </a:t>
             </a:r>
             <a:r>
-              <a:rPr lang="nl-NL" sz="1400" dirty="0" err="1" smtClean="0"/>
+              <a:rPr lang="nl-NL" sz="1200" dirty="0" err="1"/>
               <a:t>to</a:t>
             </a:r>
             <a:r>
-              <a:rPr lang="nl-NL" sz="1400" dirty="0" smtClean="0"/>
+              <a:rPr lang="nl-NL" sz="1200" dirty="0"/>
               <a:t> </a:t>
             </a:r>
             <a:r>
-              <a:rPr lang="nl-NL" sz="1400" dirty="0" err="1" smtClean="0"/>
+              <a:rPr lang="nl-NL" sz="1200" dirty="0" err="1"/>
               <a:t>invoke</a:t>
             </a:r>
             <a:r>
-              <a:rPr lang="nl-NL" sz="1400" dirty="0" smtClean="0"/>
+              <a:rPr lang="nl-NL" sz="1200" dirty="0"/>
               <a:t>] </a:t>
             </a:r>
             <a:r>
-              <a:rPr lang="nl-NL" sz="1400" dirty="0" err="1" smtClean="0"/>
+              <a:rPr lang="nl-NL" sz="1200" dirty="0" err="1"/>
               <a:t>to</a:t>
             </a:r>
             <a:r>
-              <a:rPr lang="nl-NL" sz="1400" dirty="0" smtClean="0"/>
+              <a:rPr lang="nl-NL" sz="1200" dirty="0"/>
               <a:t> register a </a:t>
             </a:r>
             <a:r>
-              <a:rPr lang="nl-NL" sz="1400" dirty="0" err="1" smtClean="0"/>
+              <a:rPr lang="nl-NL" sz="1200" dirty="0" err="1"/>
               <a:t>proposed</a:t>
             </a:r>
             <a:r>
-              <a:rPr lang="nl-NL" sz="1400" dirty="0" smtClean="0"/>
+              <a:rPr lang="nl-NL" sz="1200" dirty="0"/>
               <a:t> artist </a:t>
             </a:r>
             <a:r>
-              <a:rPr lang="nl-NL" sz="1400" dirty="0" err="1" smtClean="0"/>
+              <a:rPr lang="nl-NL" sz="1200" dirty="0" err="1"/>
               <a:t>and</a:t>
             </a:r>
             <a:r>
-              <a:rPr lang="nl-NL" sz="1400" dirty="0" smtClean="0"/>
+              <a:rPr lang="nl-NL" sz="1200" dirty="0"/>
               <a:t> a </a:t>
             </a:r>
             <a:r>
-              <a:rPr lang="nl-NL" sz="1400" dirty="0" err="1" smtClean="0"/>
+              <a:rPr lang="nl-NL" sz="1200" dirty="0" err="1"/>
               <a:t>supporting</a:t>
             </a:r>
             <a:r>
-              <a:rPr lang="nl-NL" sz="1400" dirty="0" smtClean="0"/>
+              <a:rPr lang="nl-NL" sz="1200" dirty="0"/>
               <a:t> image; record artist details </a:t>
             </a:r>
             <a:r>
-              <a:rPr lang="nl-NL" sz="1400" dirty="0" err="1" smtClean="0"/>
+              <a:rPr lang="nl-NL" sz="1200" dirty="0" err="1"/>
               <a:t>persistently</a:t>
             </a:r>
             <a:r>
-              <a:rPr lang="nl-NL" sz="1400" dirty="0" smtClean="0"/>
+              <a:rPr lang="nl-NL" sz="1200" dirty="0"/>
               <a:t> [</a:t>
             </a:r>
             <a:r>
-              <a:rPr lang="nl-NL" sz="1400" dirty="0" err="1" smtClean="0"/>
+              <a:rPr lang="nl-NL" sz="1200" dirty="0" err="1"/>
               <a:t>with</a:t>
             </a:r>
             <a:r>
-              <a:rPr lang="nl-NL" sz="1400" dirty="0" smtClean="0"/>
+              <a:rPr lang="nl-NL" sz="1200" dirty="0"/>
               <a:t> </a:t>
             </a:r>
             <a:r>
-              <a:rPr lang="nl-NL" sz="1400" dirty="0" err="1" smtClean="0"/>
+              <a:rPr lang="nl-NL" sz="1200" dirty="0" err="1"/>
               <a:t>some</a:t>
             </a:r>
             <a:r>
-              <a:rPr lang="nl-NL" sz="1400" dirty="0" smtClean="0"/>
+              <a:rPr lang="nl-NL" sz="1200" dirty="0"/>
               <a:t> </a:t>
             </a:r>
             <a:r>
-              <a:rPr lang="nl-NL" sz="1400" dirty="0" err="1" smtClean="0"/>
+              <a:rPr lang="nl-NL" sz="1200" dirty="0" err="1"/>
               <a:t>enrichment</a:t>
             </a:r>
             <a:r>
-              <a:rPr lang="nl-NL" sz="1400" dirty="0" smtClean="0"/>
-              <a:t>]</a:t>
-            </a:r>
-            <a:endParaRPr lang="en-US" sz="1400" dirty="0"/>
+              <a:rPr lang="nl-NL" sz="1200" dirty="0"/>
+              <a:t>]; </a:t>
+            </a:r>
+            <a:r>
+              <a:rPr lang="nl-NL" sz="1200" dirty="0" err="1"/>
+              <a:t>publish</a:t>
+            </a:r>
+            <a:r>
+              <a:rPr lang="nl-NL" sz="1200" dirty="0"/>
+              <a:t> Tweet </a:t>
+            </a:r>
+            <a:r>
+              <a:rPr lang="nl-NL" sz="1200" dirty="0" err="1"/>
+              <a:t>about</a:t>
+            </a:r>
+            <a:r>
+              <a:rPr lang="nl-NL" sz="1200" dirty="0"/>
+              <a:t> new </a:t>
+            </a:r>
+            <a:r>
+              <a:rPr lang="nl-NL" sz="1200" dirty="0" err="1"/>
+              <a:t>proposal</a:t>
+            </a:r>
+            <a:endParaRPr lang="en-US" sz="1200" dirty="0"/>
           </a:p>
         </p:txBody>
       </p:sp>
+      <p:cxnSp>
+        <p:nvCxnSpPr>
+          <p:cNvPr id="50" name="Elbow Connector 49"/>
+          <p:cNvCxnSpPr/>
+          <p:nvPr/>
+        </p:nvCxnSpPr>
+        <p:spPr>
+          <a:xfrm flipV="1">
+            <a:off x="2843808" y="3140968"/>
+            <a:ext cx="2088232" cy="504056"/>
+          </a:xfrm>
+          <a:prstGeom prst="bentConnector3">
+            <a:avLst/>
+          </a:prstGeom>
+          <a:ln>
+            <a:tailEnd type="arrow"/>
+          </a:ln>
+        </p:spPr>
+        <p:style>
+          <a:lnRef idx="1">
+            <a:schemeClr val="accent1"/>
+          </a:lnRef>
+          <a:fillRef idx="0">
+            <a:schemeClr val="accent1"/>
+          </a:fillRef>
+          <a:effectRef idx="0">
+            <a:schemeClr val="accent1"/>
+          </a:effectRef>
+          <a:fontRef idx="minor">
+            <a:schemeClr val="tx1"/>
+          </a:fontRef>
+        </p:style>
+      </p:cxnSp>
+      <p:cxnSp>
+        <p:nvCxnSpPr>
+          <p:cNvPr id="52" name="Elbow Connector 51"/>
+          <p:cNvCxnSpPr/>
+          <p:nvPr/>
+        </p:nvCxnSpPr>
+        <p:spPr>
+          <a:xfrm>
+            <a:off x="6084168" y="2852936"/>
+            <a:ext cx="669193" cy="12700"/>
+          </a:xfrm>
+          <a:prstGeom prst="bentConnector3">
+            <a:avLst/>
+          </a:prstGeom>
+          <a:ln>
+            <a:tailEnd type="arrow"/>
+          </a:ln>
+        </p:spPr>
+        <p:style>
+          <a:lnRef idx="1">
+            <a:schemeClr val="accent1"/>
+          </a:lnRef>
+          <a:fillRef idx="0">
+            <a:schemeClr val="accent1"/>
+          </a:fillRef>
+          <a:effectRef idx="0">
+            <a:schemeClr val="accent1"/>
+          </a:effectRef>
+          <a:fontRef idx="minor">
+            <a:schemeClr val="tx1"/>
+          </a:fontRef>
+        </p:style>
+      </p:cxnSp>
+      <p:cxnSp>
+        <p:nvCxnSpPr>
+          <p:cNvPr id="54" name="Elbow Connector 53"/>
+          <p:cNvCxnSpPr/>
+          <p:nvPr/>
+        </p:nvCxnSpPr>
+        <p:spPr>
+          <a:xfrm rot="10800000">
+            <a:off x="6084169" y="3128268"/>
+            <a:ext cx="669193" cy="12700"/>
+          </a:xfrm>
+          <a:prstGeom prst="bentConnector3">
+            <a:avLst/>
+          </a:prstGeom>
+          <a:ln>
+            <a:tailEnd type="arrow"/>
+          </a:ln>
+        </p:spPr>
+        <p:style>
+          <a:lnRef idx="1">
+            <a:schemeClr val="accent1"/>
+          </a:lnRef>
+          <a:fillRef idx="0">
+            <a:schemeClr val="accent1"/>
+          </a:fillRef>
+          <a:effectRef idx="0">
+            <a:schemeClr val="accent1"/>
+          </a:effectRef>
+          <a:fontRef idx="minor">
+            <a:schemeClr val="tx1"/>
+          </a:fontRef>
+        </p:style>
+      </p:cxnSp>
+      <p:cxnSp>
+        <p:nvCxnSpPr>
+          <p:cNvPr id="56" name="Elbow Connector 55"/>
+          <p:cNvCxnSpPr/>
+          <p:nvPr/>
+        </p:nvCxnSpPr>
+        <p:spPr>
+          <a:xfrm rot="10800000">
+            <a:off x="2483768" y="2276872"/>
+            <a:ext cx="2448272" cy="720080"/>
+          </a:xfrm>
+          <a:prstGeom prst="bentConnector3">
+            <a:avLst>
+              <a:gd name="adj1" fmla="val 8113"/>
+            </a:avLst>
+          </a:prstGeom>
+          <a:ln>
+            <a:tailEnd type="arrow"/>
+          </a:ln>
+        </p:spPr>
+        <p:style>
+          <a:lnRef idx="1">
+            <a:schemeClr val="accent1"/>
+          </a:lnRef>
+          <a:fillRef idx="0">
+            <a:schemeClr val="accent1"/>
+          </a:fillRef>
+          <a:effectRef idx="0">
+            <a:schemeClr val="accent1"/>
+          </a:effectRef>
+          <a:fontRef idx="minor">
+            <a:schemeClr val="tx1"/>
+          </a:fontRef>
+        </p:style>
+      </p:cxnSp>
     </p:spTree>
     <p:extLst>
       <p:ext uri="{BB962C8B-B14F-4D97-AF65-F5344CB8AC3E}">
@@ -20571,15 +20720,12 @@
       <p:cxnSp>
         <p:nvCxnSpPr>
           <p:cNvPr id="16" name="Elbow Connector 15"/>
-          <p:cNvCxnSpPr>
-            <a:stCxn id="8" idx="3"/>
-            <a:endCxn id="10" idx="1"/>
-          </p:cNvCxnSpPr>
+          <p:cNvCxnSpPr/>
           <p:nvPr/>
         </p:nvCxnSpPr>
         <p:spPr>
           <a:xfrm flipV="1">
-            <a:off x="2843808" y="2598165"/>
+            <a:off x="2843808" y="2742181"/>
             <a:ext cx="2156658" cy="902843"/>
           </a:xfrm>
           <a:prstGeom prst="bentConnector3">
@@ -21126,15 +21272,12 @@
       <p:cxnSp>
         <p:nvCxnSpPr>
           <p:cNvPr id="49" name="Elbow Connector 48"/>
-          <p:cNvCxnSpPr>
-            <a:stCxn id="10" idx="3"/>
-            <a:endCxn id="11" idx="1"/>
-          </p:cNvCxnSpPr>
+          <p:cNvCxnSpPr/>
           <p:nvPr/>
         </p:nvCxnSpPr>
         <p:spPr>
           <a:xfrm flipV="1">
-            <a:off x="6152594" y="2260897"/>
+            <a:off x="6152594" y="2443660"/>
             <a:ext cx="671959" cy="337268"/>
           </a:xfrm>
           <a:prstGeom prst="bentConnector3">
@@ -21978,13 +22121,13 @@
         </p:nvSpPr>
         <p:spPr>
           <a:xfrm>
-            <a:off x="6588224" y="44624"/>
-            <a:ext cx="2450505" cy="959314"/>
+            <a:off x="6488574" y="44624"/>
+            <a:ext cx="2550155" cy="959314"/>
           </a:xfrm>
           <a:prstGeom prst="wedgeRectCallout">
             <a:avLst>
-              <a:gd name="adj1" fmla="val -22170"/>
-              <a:gd name="adj2" fmla="val 71402"/>
+              <a:gd name="adj1" fmla="val -53"/>
+              <a:gd name="adj2" fmla="val 60712"/>
             </a:avLst>
           </a:prstGeom>
         </p:spPr>
@@ -22008,92 +22151,112 @@
           <a:p>
             <a:pPr algn="ctr"/>
             <a:r>
-              <a:rPr lang="nl-NL" sz="1200" dirty="0" err="1" smtClean="0"/>
+              <a:rPr lang="nl-NL" sz="1200" dirty="0" err="1"/>
               <a:t>Expose</a:t>
             </a:r>
             <a:r>
-              <a:rPr lang="nl-NL" sz="1200" dirty="0" smtClean="0"/>
+              <a:rPr lang="nl-NL" sz="1200" dirty="0"/>
               <a:t> REST API [for PCS </a:t>
             </a:r>
             <a:r>
-              <a:rPr lang="nl-NL" sz="1200" dirty="0" err="1" smtClean="0"/>
+              <a:rPr lang="nl-NL" sz="1200" dirty="0" err="1"/>
               <a:t>to</a:t>
             </a:r>
             <a:r>
-              <a:rPr lang="nl-NL" sz="1200" dirty="0" smtClean="0"/>
+              <a:rPr lang="nl-NL" sz="1200" dirty="0"/>
               <a:t> </a:t>
             </a:r>
             <a:r>
-              <a:rPr lang="nl-NL" sz="1200" dirty="0" err="1" smtClean="0"/>
+              <a:rPr lang="nl-NL" sz="1200" dirty="0" err="1"/>
               <a:t>invoke</a:t>
             </a:r>
             <a:r>
-              <a:rPr lang="nl-NL" sz="1200" dirty="0" smtClean="0"/>
+              <a:rPr lang="nl-NL" sz="1200" dirty="0"/>
               <a:t>] </a:t>
             </a:r>
             <a:r>
-              <a:rPr lang="nl-NL" sz="1200" dirty="0" err="1" smtClean="0"/>
+              <a:rPr lang="nl-NL" sz="1200" dirty="0" err="1"/>
               <a:t>to</a:t>
             </a:r>
             <a:r>
-              <a:rPr lang="nl-NL" sz="1200" dirty="0" smtClean="0"/>
+              <a:rPr lang="nl-NL" sz="1200" dirty="0"/>
               <a:t> register a </a:t>
             </a:r>
             <a:r>
-              <a:rPr lang="nl-NL" sz="1200" dirty="0" err="1" smtClean="0"/>
+              <a:rPr lang="nl-NL" sz="1200" dirty="0" err="1"/>
               <a:t>proposed</a:t>
             </a:r>
             <a:r>
-              <a:rPr lang="nl-NL" sz="1200" dirty="0" smtClean="0"/>
+              <a:rPr lang="nl-NL" sz="1200" dirty="0"/>
               <a:t> artist </a:t>
             </a:r>
             <a:r>
-              <a:rPr lang="nl-NL" sz="1200" dirty="0" err="1" smtClean="0"/>
+              <a:rPr lang="nl-NL" sz="1200" dirty="0" err="1"/>
               <a:t>and</a:t>
             </a:r>
             <a:r>
-              <a:rPr lang="nl-NL" sz="1200" dirty="0" smtClean="0"/>
+              <a:rPr lang="nl-NL" sz="1200" dirty="0"/>
               <a:t> a </a:t>
             </a:r>
             <a:r>
-              <a:rPr lang="nl-NL" sz="1200" dirty="0" err="1" smtClean="0"/>
+              <a:rPr lang="nl-NL" sz="1200" dirty="0" err="1"/>
               <a:t>supporting</a:t>
             </a:r>
             <a:r>
-              <a:rPr lang="nl-NL" sz="1200" dirty="0" smtClean="0"/>
+              <a:rPr lang="nl-NL" sz="1200" dirty="0"/>
               <a:t> image; record artist details </a:t>
             </a:r>
             <a:r>
-              <a:rPr lang="nl-NL" sz="1200" dirty="0" err="1" smtClean="0"/>
+              <a:rPr lang="nl-NL" sz="1200" dirty="0" err="1"/>
               <a:t>persistently</a:t>
             </a:r>
             <a:r>
-              <a:rPr lang="nl-NL" sz="1200" dirty="0" smtClean="0"/>
+              <a:rPr lang="nl-NL" sz="1200" dirty="0"/>
               <a:t> [</a:t>
             </a:r>
             <a:r>
-              <a:rPr lang="nl-NL" sz="1200" dirty="0" err="1" smtClean="0"/>
+              <a:rPr lang="nl-NL" sz="1200" dirty="0" err="1"/>
               <a:t>with</a:t>
             </a:r>
             <a:r>
-              <a:rPr lang="nl-NL" sz="1200" dirty="0" smtClean="0"/>
+              <a:rPr lang="nl-NL" sz="1200" dirty="0"/>
               <a:t> </a:t>
             </a:r>
             <a:r>
-              <a:rPr lang="nl-NL" sz="1200" dirty="0" err="1" smtClean="0"/>
+              <a:rPr lang="nl-NL" sz="1200" dirty="0" err="1"/>
               <a:t>some</a:t>
             </a:r>
             <a:r>
-              <a:rPr lang="nl-NL" sz="1200" dirty="0" smtClean="0"/>
+              <a:rPr lang="nl-NL" sz="1200" dirty="0"/>
               <a:t> </a:t>
             </a:r>
             <a:r>
-              <a:rPr lang="nl-NL" sz="1200" dirty="0" err="1" smtClean="0"/>
+              <a:rPr lang="nl-NL" sz="1200" dirty="0" err="1"/>
               <a:t>enrichment</a:t>
             </a:r>
             <a:r>
-              <a:rPr lang="nl-NL" sz="1200" dirty="0" smtClean="0"/>
-              <a:t>]</a:t>
+              <a:rPr lang="nl-NL" sz="1200" dirty="0"/>
+              <a:t>]; </a:t>
+            </a:r>
+            <a:r>
+              <a:rPr lang="nl-NL" sz="1200" dirty="0" err="1"/>
+              <a:t>publish</a:t>
+            </a:r>
+            <a:r>
+              <a:rPr lang="nl-NL" sz="1200" dirty="0"/>
+              <a:t> Tweet </a:t>
+            </a:r>
+            <a:r>
+              <a:rPr lang="nl-NL" sz="1200" dirty="0" err="1"/>
+              <a:t>about</a:t>
+            </a:r>
+            <a:r>
+              <a:rPr lang="nl-NL" sz="1200" dirty="0"/>
+              <a:t> new </a:t>
+            </a:r>
+            <a:r>
+              <a:rPr lang="nl-NL" sz="1200" dirty="0" err="1"/>
+              <a:t>proposal</a:t>
             </a:r>
             <a:endParaRPr lang="en-US" sz="1200" dirty="0"/>
           </a:p>
@@ -23138,6 +23301,81 @@
           </a:p>
         </p:txBody>
       </p:sp>
+      <p:cxnSp>
+        <p:nvCxnSpPr>
+          <p:cNvPr id="78" name="Elbow Connector 77"/>
+          <p:cNvCxnSpPr>
+            <a:stCxn id="10" idx="1"/>
+          </p:cNvCxnSpPr>
+          <p:nvPr/>
+        </p:nvCxnSpPr>
+        <p:spPr>
+          <a:xfrm rot="10800000">
+            <a:off x="2339752" y="1988839"/>
+            <a:ext cx="2660714" cy="609326"/>
+          </a:xfrm>
+          <a:prstGeom prst="bentConnector3">
+            <a:avLst>
+              <a:gd name="adj1" fmla="val 40364"/>
+            </a:avLst>
+          </a:prstGeom>
+          <a:ln>
+            <a:tailEnd type="arrow"/>
+          </a:ln>
+        </p:spPr>
+        <p:style>
+          <a:lnRef idx="1">
+            <a:schemeClr val="accent1"/>
+          </a:lnRef>
+          <a:fillRef idx="0">
+            <a:schemeClr val="accent1"/>
+          </a:fillRef>
+          <a:effectRef idx="0">
+            <a:schemeClr val="accent1"/>
+          </a:effectRef>
+          <a:fontRef idx="minor">
+            <a:schemeClr val="tx1"/>
+          </a:fontRef>
+        </p:style>
+      </p:cxnSp>
+      <p:cxnSp>
+        <p:nvCxnSpPr>
+          <p:cNvPr id="29" name="Elbow Connector 28"/>
+          <p:cNvCxnSpPr>
+            <a:stCxn id="11" idx="1"/>
+            <a:endCxn id="10" idx="3"/>
+          </p:cNvCxnSpPr>
+          <p:nvPr/>
+        </p:nvCxnSpPr>
+        <p:spPr>
+          <a:xfrm rot="10800000" flipV="1">
+            <a:off x="6152595" y="2260897"/>
+            <a:ext cx="671959" cy="337268"/>
+          </a:xfrm>
+          <a:prstGeom prst="bentConnector3">
+            <a:avLst>
+              <a:gd name="adj1" fmla="val 76707"/>
+            </a:avLst>
+          </a:prstGeom>
+          <a:ln>
+            <a:tailEnd type="arrow"/>
+          </a:ln>
+        </p:spPr>
+        <p:style>
+          <a:lnRef idx="1">
+            <a:schemeClr val="accent1"/>
+          </a:lnRef>
+          <a:fillRef idx="0">
+            <a:schemeClr val="accent1"/>
+          </a:fillRef>
+          <a:effectRef idx="0">
+            <a:schemeClr val="accent1"/>
+          </a:effectRef>
+          <a:fontRef idx="minor">
+            <a:schemeClr val="tx1"/>
+          </a:fontRef>
+        </p:style>
+      </p:cxnSp>
     </p:spTree>
     <p:extLst>
       <p:ext uri="{BB962C8B-B14F-4D97-AF65-F5344CB8AC3E}">
@@ -29819,17 +30057,17 @@
           </a:prstGeom>
         </p:spPr>
         <p:style>
-          <a:lnRef idx="1">
+          <a:lnRef idx="0">
             <a:schemeClr val="accent2"/>
           </a:lnRef>
-          <a:fillRef idx="2">
+          <a:fillRef idx="3">
             <a:schemeClr val="accent2"/>
           </a:fillRef>
-          <a:effectRef idx="1">
+          <a:effectRef idx="3">
             <a:schemeClr val="accent2"/>
           </a:effectRef>
           <a:fontRef idx="minor">
-            <a:schemeClr val="dk1"/>
+            <a:schemeClr val="lt1"/>
           </a:fontRef>
         </p:style>
         <p:txBody>
@@ -29838,14 +30076,26 @@
           <a:p>
             <a:pPr algn="ctr"/>
             <a:r>
-              <a:rPr lang="nl-NL" dirty="0" err="1" smtClean="0"/>
+              <a:rPr lang="nl-NL" dirty="0" err="1">
+                <a:solidFill>
+                  <a:schemeClr val="lt1"/>
+                </a:solidFill>
+              </a:rPr>
               <a:t>IoT</a:t>
             </a:r>
             <a:r>
-              <a:rPr lang="nl-NL" dirty="0" smtClean="0"/>
+              <a:rPr lang="nl-NL" dirty="0">
+                <a:solidFill>
+                  <a:schemeClr val="lt1"/>
+                </a:solidFill>
+              </a:rPr>
               <a:t> CS</a:t>
             </a:r>
-            <a:endParaRPr lang="en-US" dirty="0"/>
+            <a:endParaRPr lang="en-US" dirty="0">
+              <a:solidFill>
+                <a:schemeClr val="lt1"/>
+              </a:solidFill>
+            </a:endParaRPr>
           </a:p>
         </p:txBody>
       </p:sp>
@@ -29939,52 +30189,8 @@
       </p:sp>
       <p:sp>
         <p:nvSpPr>
-          <p:cNvPr id="10" name="Rounded Rectangle 9">
+          <p:cNvPr id="11" name="Rounded Rectangle 10">
             <a:hlinkClick r:id="rId3"/>
-          </p:cNvPr>
-          <p:cNvSpPr/>
-          <p:nvPr/>
-        </p:nvSpPr>
-        <p:spPr>
-          <a:xfrm>
-            <a:off x="4932040" y="2744924"/>
-            <a:ext cx="1152128" cy="504056"/>
-          </a:xfrm>
-          <a:prstGeom prst="roundRect">
-            <a:avLst/>
-          </a:prstGeom>
-        </p:spPr>
-        <p:style>
-          <a:lnRef idx="0">
-            <a:schemeClr val="accent2"/>
-          </a:lnRef>
-          <a:fillRef idx="3">
-            <a:schemeClr val="accent2"/>
-          </a:fillRef>
-          <a:effectRef idx="3">
-            <a:schemeClr val="accent2"/>
-          </a:effectRef>
-          <a:fontRef idx="minor">
-            <a:schemeClr val="lt1"/>
-          </a:fontRef>
-        </p:style>
-        <p:txBody>
-          <a:bodyPr rtlCol="0" anchor="ctr"/>
-          <a:lstStyle/>
-          <a:p>
-            <a:pPr algn="ctr"/>
-            <a:r>
-              <a:rPr lang="nl-NL" dirty="0" smtClean="0"/>
-              <a:t>ICS</a:t>
-            </a:r>
-            <a:endParaRPr lang="en-US" dirty="0"/>
-          </a:p>
-        </p:txBody>
-      </p:sp>
-      <p:sp>
-        <p:nvSpPr>
-          <p:cNvPr id="11" name="Rounded Rectangle 10">
-            <a:hlinkClick r:id="rId4"/>
           </p:cNvPr>
           <p:cNvSpPr/>
           <p:nvPr/>
@@ -30195,15 +30401,12 @@
       <p:cxnSp>
         <p:nvCxnSpPr>
           <p:cNvPr id="16" name="Elbow Connector 15"/>
-          <p:cNvCxnSpPr>
-            <a:stCxn id="8" idx="3"/>
-            <a:endCxn id="10" idx="1"/>
-          </p:cNvCxnSpPr>
+          <p:cNvCxnSpPr/>
           <p:nvPr/>
         </p:nvCxnSpPr>
         <p:spPr>
           <a:xfrm flipV="1">
-            <a:off x="2843808" y="2996952"/>
+            <a:off x="2843808" y="3140968"/>
             <a:ext cx="2088232" cy="504056"/>
           </a:xfrm>
           <a:prstGeom prst="bentConnector3">
@@ -30467,7 +30670,10 @@
           <a:prstGeom prst="bentConnector3">
             <a:avLst/>
           </a:prstGeom>
-          <a:ln>
+          <a:ln w="38100">
+            <a:solidFill>
+              <a:srgbClr val="C00000"/>
+            </a:solidFill>
             <a:tailEnd type="arrow"/>
           </a:ln>
         </p:spPr>
@@ -30593,7 +30799,7 @@
       <p:sp>
         <p:nvSpPr>
           <p:cNvPr id="39" name="Rounded Rectangle 38">
-            <a:hlinkClick r:id="rId5"/>
+            <a:hlinkClick r:id="rId4"/>
           </p:cNvPr>
           <p:cNvSpPr/>
           <p:nvPr/>
@@ -30637,7 +30843,7 @@
       <p:sp>
         <p:nvSpPr>
           <p:cNvPr id="40" name="Rounded Rectangle 39">
-            <a:hlinkClick r:id="rId6"/>
+            <a:hlinkClick r:id="rId5"/>
           </p:cNvPr>
           <p:cNvSpPr/>
           <p:nvPr/>
@@ -30788,15 +30994,12 @@
       <p:cxnSp>
         <p:nvCxnSpPr>
           <p:cNvPr id="49" name="Elbow Connector 48"/>
-          <p:cNvCxnSpPr>
-            <a:stCxn id="10" idx="3"/>
-            <a:endCxn id="11" idx="1"/>
-          </p:cNvCxnSpPr>
+          <p:cNvCxnSpPr/>
           <p:nvPr/>
         </p:nvCxnSpPr>
         <p:spPr>
           <a:xfrm>
-            <a:off x="6084168" y="2996952"/>
+            <a:off x="6084168" y="3128268"/>
             <a:ext cx="669193" cy="12700"/>
           </a:xfrm>
           <a:prstGeom prst="bentConnector3">
@@ -30899,7 +31102,7 @@
       <p:sp>
         <p:nvSpPr>
           <p:cNvPr id="61" name="Rounded Rectangle 60">
-            <a:hlinkClick r:id="rId7"/>
+            <a:hlinkClick r:id="rId6"/>
           </p:cNvPr>
           <p:cNvSpPr/>
           <p:nvPr/>
@@ -31605,8 +31808,8 @@
         </p:nvSpPr>
         <p:spPr>
           <a:xfrm>
-            <a:off x="5480598" y="908537"/>
-            <a:ext cx="2211128" cy="828275"/>
+            <a:off x="5480597" y="908537"/>
+            <a:ext cx="2424891" cy="828275"/>
           </a:xfrm>
           <a:prstGeom prst="wedgeRectCallout">
             <a:avLst>
@@ -31720,7 +31923,27 @@
             </a:r>
             <a:r>
               <a:rPr lang="nl-NL" sz="1100" dirty="0" smtClean="0"/>
-              <a:t>]</a:t>
+              <a:t>]; </a:t>
+            </a:r>
+            <a:r>
+              <a:rPr lang="nl-NL" sz="1100" dirty="0" err="1" smtClean="0"/>
+              <a:t>publish</a:t>
+            </a:r>
+            <a:r>
+              <a:rPr lang="nl-NL" sz="1100" dirty="0" smtClean="0"/>
+              <a:t> Tweet </a:t>
+            </a:r>
+            <a:r>
+              <a:rPr lang="nl-NL" sz="1100" dirty="0" err="1" smtClean="0"/>
+              <a:t>about</a:t>
+            </a:r>
+            <a:r>
+              <a:rPr lang="nl-NL" sz="1100" dirty="0" smtClean="0"/>
+              <a:t> new </a:t>
+            </a:r>
+            <a:r>
+              <a:rPr lang="nl-NL" sz="1100" dirty="0" err="1" smtClean="0"/>
+              <a:t>proposal</a:t>
             </a:r>
             <a:endParaRPr lang="en-US" sz="1100" dirty="0"/>
           </a:p>
@@ -31773,7 +31996,7 @@
           <p:nvPr/>
         </p:nvPicPr>
         <p:blipFill>
-          <a:blip r:embed="rId8" cstate="print">
+          <a:blip r:embed="rId7" cstate="print">
             <a:clrChange>
               <a:clrFrom>
                 <a:srgbClr val="FFFFFF"/>
@@ -31824,7 +32047,7 @@
           <p:nvPr/>
         </p:nvPicPr>
         <p:blipFill>
-          <a:blip r:embed="rId9">
+          <a:blip r:embed="rId8">
             <a:clrChange>
               <a:clrFrom>
                 <a:srgbClr val="FFFFFF"/>
@@ -31905,6 +32128,250 @@
           </a:fontRef>
         </p:style>
       </p:cxnSp>
+      <p:cxnSp>
+        <p:nvCxnSpPr>
+          <p:cNvPr id="18" name="Elbow Connector 17"/>
+          <p:cNvCxnSpPr/>
+          <p:nvPr/>
+        </p:nvCxnSpPr>
+        <p:spPr>
+          <a:xfrm rot="10800000">
+            <a:off x="6084169" y="2924944"/>
+            <a:ext cx="669193" cy="12700"/>
+          </a:xfrm>
+          <a:prstGeom prst="bentConnector3">
+            <a:avLst/>
+          </a:prstGeom>
+          <a:ln w="38100">
+            <a:solidFill>
+              <a:srgbClr val="C00000"/>
+            </a:solidFill>
+            <a:tailEnd type="arrow"/>
+          </a:ln>
+        </p:spPr>
+        <p:style>
+          <a:lnRef idx="1">
+            <a:schemeClr val="accent1"/>
+          </a:lnRef>
+          <a:fillRef idx="0">
+            <a:schemeClr val="accent1"/>
+          </a:fillRef>
+          <a:effectRef idx="0">
+            <a:schemeClr val="accent1"/>
+          </a:effectRef>
+          <a:fontRef idx="minor">
+            <a:schemeClr val="tx1"/>
+          </a:fontRef>
+        </p:style>
+      </p:cxnSp>
+      <p:cxnSp>
+        <p:nvCxnSpPr>
+          <p:cNvPr id="29" name="Elbow Connector 28"/>
+          <p:cNvCxnSpPr/>
+          <p:nvPr/>
+        </p:nvCxnSpPr>
+        <p:spPr>
+          <a:xfrm rot="10800000">
+            <a:off x="2483768" y="2209163"/>
+            <a:ext cx="2448272" cy="635084"/>
+          </a:xfrm>
+          <a:prstGeom prst="bentConnector3">
+            <a:avLst>
+              <a:gd name="adj1" fmla="val 9859"/>
+            </a:avLst>
+          </a:prstGeom>
+          <a:ln w="38100">
+            <a:solidFill>
+              <a:srgbClr val="C00000"/>
+            </a:solidFill>
+            <a:tailEnd type="arrow"/>
+          </a:ln>
+        </p:spPr>
+        <p:style>
+          <a:lnRef idx="1">
+            <a:schemeClr val="accent1"/>
+          </a:lnRef>
+          <a:fillRef idx="0">
+            <a:schemeClr val="accent1"/>
+          </a:fillRef>
+          <a:effectRef idx="0">
+            <a:schemeClr val="accent1"/>
+          </a:effectRef>
+          <a:fontRef idx="minor">
+            <a:schemeClr val="tx1"/>
+          </a:fontRef>
+        </p:style>
+      </p:cxnSp>
+      <p:sp>
+        <p:nvSpPr>
+          <p:cNvPr id="2" name="Freeform 1"/>
+          <p:cNvSpPr/>
+          <p:nvPr/>
+        </p:nvSpPr>
+        <p:spPr>
+          <a:xfrm>
+            <a:off x="2572284" y="1916832"/>
+            <a:ext cx="2597302" cy="1273323"/>
+          </a:xfrm>
+          <a:custGeom>
+            <a:avLst/>
+            <a:gdLst>
+              <a:gd name="connsiteX0" fmla="*/ 2153540 w 2597302"/>
+              <a:gd name="connsiteY0" fmla="*/ 0 h 1273323"/>
+              <a:gd name="connsiteX1" fmla="*/ 2529555 w 2597302"/>
+              <a:gd name="connsiteY1" fmla="*/ 376014 h 1273323"/>
+              <a:gd name="connsiteX2" fmla="*/ 2580830 w 2597302"/>
+              <a:gd name="connsiteY2" fmla="*/ 786213 h 1273323"/>
+              <a:gd name="connsiteX3" fmla="*/ 2341548 w 2597302"/>
+              <a:gd name="connsiteY3" fmla="*/ 1110953 h 1273323"/>
+              <a:gd name="connsiteX4" fmla="*/ 1444239 w 2597302"/>
+              <a:gd name="connsiteY4" fmla="*/ 1016949 h 1273323"/>
+              <a:gd name="connsiteX5" fmla="*/ 273466 w 2597302"/>
+              <a:gd name="connsiteY5" fmla="*/ 1059678 h 1273323"/>
+              <a:gd name="connsiteX6" fmla="*/ 0 w 2597302"/>
+              <a:gd name="connsiteY6" fmla="*/ 1273323 h 1273323"/>
+            </a:gdLst>
+            <a:ahLst/>
+            <a:cxnLst>
+              <a:cxn ang="0">
+                <a:pos x="connsiteX0" y="connsiteY0"/>
+              </a:cxn>
+              <a:cxn ang="0">
+                <a:pos x="connsiteX1" y="connsiteY1"/>
+              </a:cxn>
+              <a:cxn ang="0">
+                <a:pos x="connsiteX2" y="connsiteY2"/>
+              </a:cxn>
+              <a:cxn ang="0">
+                <a:pos x="connsiteX3" y="connsiteY3"/>
+              </a:cxn>
+              <a:cxn ang="0">
+                <a:pos x="connsiteX4" y="connsiteY4"/>
+              </a:cxn>
+              <a:cxn ang="0">
+                <a:pos x="connsiteX5" y="connsiteY5"/>
+              </a:cxn>
+              <a:cxn ang="0">
+                <a:pos x="connsiteX6" y="connsiteY6"/>
+              </a:cxn>
+            </a:cxnLst>
+            <a:rect l="l" t="t" r="r" b="b"/>
+            <a:pathLst>
+              <a:path w="2597302" h="1273323">
+                <a:moveTo>
+                  <a:pt x="2153540" y="0"/>
+                </a:moveTo>
+                <a:cubicBezTo>
+                  <a:pt x="2305940" y="122489"/>
+                  <a:pt x="2458340" y="244979"/>
+                  <a:pt x="2529555" y="376014"/>
+                </a:cubicBezTo>
+                <a:cubicBezTo>
+                  <a:pt x="2600770" y="507049"/>
+                  <a:pt x="2612164" y="663723"/>
+                  <a:pt x="2580830" y="786213"/>
+                </a:cubicBezTo>
+                <a:cubicBezTo>
+                  <a:pt x="2549496" y="908703"/>
+                  <a:pt x="2530980" y="1072497"/>
+                  <a:pt x="2341548" y="1110953"/>
+                </a:cubicBezTo>
+                <a:cubicBezTo>
+                  <a:pt x="2152116" y="1149409"/>
+                  <a:pt x="1788919" y="1025495"/>
+                  <a:pt x="1444239" y="1016949"/>
+                </a:cubicBezTo>
+                <a:cubicBezTo>
+                  <a:pt x="1099559" y="1008403"/>
+                  <a:pt x="514172" y="1016949"/>
+                  <a:pt x="273466" y="1059678"/>
+                </a:cubicBezTo>
+                <a:cubicBezTo>
+                  <a:pt x="32760" y="1102407"/>
+                  <a:pt x="16380" y="1187865"/>
+                  <a:pt x="0" y="1273323"/>
+                </a:cubicBezTo>
+              </a:path>
+            </a:pathLst>
+          </a:custGeom>
+          <a:noFill/>
+          <a:ln>
+            <a:solidFill>
+              <a:srgbClr val="C00000"/>
+            </a:solidFill>
+            <a:headEnd type="none" w="med" len="med"/>
+            <a:tailEnd type="arrow" w="med" len="med"/>
+          </a:ln>
+        </p:spPr>
+        <p:style>
+          <a:lnRef idx="2">
+            <a:schemeClr val="accent1">
+              <a:shade val="50000"/>
+            </a:schemeClr>
+          </a:lnRef>
+          <a:fillRef idx="1">
+            <a:schemeClr val="accent1"/>
+          </a:fillRef>
+          <a:effectRef idx="0">
+            <a:schemeClr val="accent1"/>
+          </a:effectRef>
+          <a:fontRef idx="minor">
+            <a:schemeClr val="lt1"/>
+          </a:fontRef>
+        </p:style>
+        <p:txBody>
+          <a:bodyPr rtlCol="0" anchor="ctr"/>
+          <a:lstStyle/>
+          <a:p>
+            <a:pPr algn="ctr"/>
+            <a:endParaRPr lang="en-US"/>
+          </a:p>
+        </p:txBody>
+      </p:sp>
+      <p:sp>
+        <p:nvSpPr>
+          <p:cNvPr id="10" name="Rounded Rectangle 9">
+            <a:hlinkClick r:id="rId9"/>
+          </p:cNvPr>
+          <p:cNvSpPr/>
+          <p:nvPr/>
+        </p:nvSpPr>
+        <p:spPr>
+          <a:xfrm>
+            <a:off x="4932040" y="2744924"/>
+            <a:ext cx="1152128" cy="504056"/>
+          </a:xfrm>
+          <a:prstGeom prst="roundRect">
+            <a:avLst/>
+          </a:prstGeom>
+        </p:spPr>
+        <p:style>
+          <a:lnRef idx="0">
+            <a:schemeClr val="accent2"/>
+          </a:lnRef>
+          <a:fillRef idx="3">
+            <a:schemeClr val="accent2"/>
+          </a:fillRef>
+          <a:effectRef idx="3">
+            <a:schemeClr val="accent2"/>
+          </a:effectRef>
+          <a:fontRef idx="minor">
+            <a:schemeClr val="lt1"/>
+          </a:fontRef>
+        </p:style>
+        <p:txBody>
+          <a:bodyPr rtlCol="0" anchor="ctr"/>
+          <a:lstStyle/>
+          <a:p>
+            <a:pPr algn="ctr"/>
+            <a:r>
+              <a:rPr lang="nl-NL" dirty="0" smtClean="0"/>
+              <a:t>ICS</a:t>
+            </a:r>
+            <a:endParaRPr lang="en-US" dirty="0"/>
+          </a:p>
+        </p:txBody>
+      </p:sp>
     </p:spTree>
     <p:extLst>
       <p:ext uri="{BB962C8B-B14F-4D97-AF65-F5344CB8AC3E}">
@@ -31942,6 +32409,44 @@
           <a:chExt cx="0" cy="0"/>
         </a:xfrm>
       </p:grpSpPr>
+      <p:sp>
+        <p:nvSpPr>
+          <p:cNvPr id="6" name="Cloud 5"/>
+          <p:cNvSpPr/>
+          <p:nvPr/>
+        </p:nvSpPr>
+        <p:spPr>
+          <a:xfrm>
+            <a:off x="2721546" y="55633"/>
+            <a:ext cx="1332148" cy="713898"/>
+          </a:xfrm>
+          <a:prstGeom prst="cloud">
+            <a:avLst/>
+          </a:prstGeom>
+        </p:spPr>
+        <p:style>
+          <a:lnRef idx="1">
+            <a:schemeClr val="accent1"/>
+          </a:lnRef>
+          <a:fillRef idx="2">
+            <a:schemeClr val="accent1"/>
+          </a:fillRef>
+          <a:effectRef idx="1">
+            <a:schemeClr val="accent1"/>
+          </a:effectRef>
+          <a:fontRef idx="minor">
+            <a:schemeClr val="dk1"/>
+          </a:fontRef>
+        </p:style>
+        <p:txBody>
+          <a:bodyPr rtlCol="0" anchor="ctr"/>
+          <a:lstStyle/>
+          <a:p>
+            <a:pPr algn="ctr"/>
+            <a:endParaRPr lang="en-US"/>
+          </a:p>
+        </p:txBody>
+      </p:sp>
       <p:sp>
         <p:nvSpPr>
           <p:cNvPr id="5" name="Cube 4"/>
@@ -33248,47 +33753,7 @@
         </p:nvSpPr>
         <p:spPr>
           <a:xfrm>
-            <a:off x="4427984" y="764704"/>
-            <a:ext cx="216024" cy="216025"/>
-          </a:xfrm>
-          <a:prstGeom prst="cube">
-            <a:avLst/>
-          </a:prstGeom>
-        </p:spPr>
-        <p:style>
-          <a:lnRef idx="2">
-            <a:schemeClr val="accent1">
-              <a:shade val="50000"/>
-            </a:schemeClr>
-          </a:lnRef>
-          <a:fillRef idx="1">
-            <a:schemeClr val="accent1"/>
-          </a:fillRef>
-          <a:effectRef idx="0">
-            <a:schemeClr val="accent1"/>
-          </a:effectRef>
-          <a:fontRef idx="minor">
-            <a:schemeClr val="lt1"/>
-          </a:fontRef>
-        </p:style>
-        <p:txBody>
-          <a:bodyPr rtlCol="0" anchor="ctr"/>
-          <a:lstStyle/>
-          <a:p>
-            <a:pPr algn="ctr"/>
-            <a:endParaRPr lang="en-US"/>
-          </a:p>
-        </p:txBody>
-      </p:sp>
-      <p:sp>
-        <p:nvSpPr>
-          <p:cNvPr id="41" name="Cube 40"/>
-          <p:cNvSpPr/>
-          <p:nvPr/>
-        </p:nvSpPr>
-        <p:spPr>
-          <a:xfrm>
-            <a:off x="4788024" y="780103"/>
+            <a:off x="4319972" y="818710"/>
             <a:ext cx="216024" cy="216025"/>
           </a:xfrm>
           <a:prstGeom prst="cube">
@@ -33772,8 +34237,8 @@
         </p:nvCxnSpPr>
         <p:spPr>
           <a:xfrm flipV="1">
-            <a:off x="3266855" y="818710"/>
-            <a:ext cx="1242138" cy="1845073"/>
+            <a:off x="3266855" y="872716"/>
+            <a:ext cx="1134126" cy="1791067"/>
           </a:xfrm>
           <a:prstGeom prst="straightConnector1">
             <a:avLst/>
@@ -33813,8 +34278,8 @@
         </p:nvCxnSpPr>
         <p:spPr>
           <a:xfrm>
-            <a:off x="4590002" y="899720"/>
-            <a:ext cx="1134126" cy="776689"/>
+            <a:off x="4481990" y="953726"/>
+            <a:ext cx="1242138" cy="722683"/>
           </a:xfrm>
           <a:prstGeom prst="straightConnector1">
             <a:avLst/>
@@ -33971,15 +34436,15 @@
         <p:nvCxnSpPr>
           <p:cNvPr id="61" name="Straight Arrow Connector 60"/>
           <p:cNvCxnSpPr>
-            <a:stCxn id="41" idx="5"/>
-            <a:endCxn id="42" idx="0"/>
+            <a:stCxn id="41" idx="4"/>
+            <a:endCxn id="42" idx="1"/>
           </p:cNvCxnSpPr>
           <p:nvPr/>
         </p:nvCxnSpPr>
         <p:spPr>
           <a:xfrm>
-            <a:off x="5004048" y="861113"/>
-            <a:ext cx="855095" cy="680280"/>
+            <a:off x="4856597" y="980729"/>
+            <a:ext cx="948540" cy="614670"/>
           </a:xfrm>
           <a:prstGeom prst="straightConnector1">
             <a:avLst/>
@@ -34334,6 +34799,250 @@
             <a:avLst/>
           </a:prstGeom>
           <a:ln>
+            <a:tailEnd type="arrow"/>
+          </a:ln>
+        </p:spPr>
+        <p:style>
+          <a:lnRef idx="1">
+            <a:schemeClr val="accent1"/>
+          </a:lnRef>
+          <a:fillRef idx="0">
+            <a:schemeClr val="accent1"/>
+          </a:fillRef>
+          <a:effectRef idx="0">
+            <a:schemeClr val="accent1"/>
+          </a:effectRef>
+          <a:fontRef idx="minor">
+            <a:schemeClr val="tx1"/>
+          </a:fontRef>
+        </p:style>
+      </p:cxnSp>
+      <p:pic>
+        <p:nvPicPr>
+          <p:cNvPr id="58" name="Picture 2" descr="https://g.twimg.com/Twitter_logo_blue.png"/>
+          <p:cNvPicPr>
+            <a:picLocks noChangeAspect="1" noChangeArrowheads="1"/>
+          </p:cNvPicPr>
+          <p:nvPr/>
+        </p:nvPicPr>
+        <p:blipFill>
+          <a:blip r:embed="rId4" cstate="print">
+            <a:extLst>
+              <a:ext uri="{28A0092B-C50C-407E-A947-70E740481C1C}">
+                <a14:useLocalDpi xmlns:a14="http://schemas.microsoft.com/office/drawing/2010/main" val="0"/>
+              </a:ext>
+            </a:extLst>
+          </a:blip>
+          <a:srcRect/>
+          <a:stretch>
+            <a:fillRect/>
+          </a:stretch>
+        </p:blipFill>
+        <p:spPr bwMode="auto">
+          <a:xfrm>
+            <a:off x="3087907" y="148462"/>
+            <a:ext cx="599425" cy="487731"/>
+          </a:xfrm>
+          <a:prstGeom prst="rect">
+            <a:avLst/>
+          </a:prstGeom>
+          <a:noFill/>
+          <a:extLst>
+            <a:ext uri="{909E8E84-426E-40DD-AFC4-6F175D3DCCD1}">
+              <a14:hiddenFill xmlns:a14="http://schemas.microsoft.com/office/drawing/2010/main">
+                <a:solidFill>
+                  <a:srgbClr val="FFFFFF"/>
+                </a:solidFill>
+              </a14:hiddenFill>
+            </a:ext>
+          </a:extLst>
+        </p:spPr>
+      </p:pic>
+      <p:sp>
+        <p:nvSpPr>
+          <p:cNvPr id="64" name="Cube 63"/>
+          <p:cNvSpPr/>
+          <p:nvPr/>
+        </p:nvSpPr>
+        <p:spPr>
+          <a:xfrm>
+            <a:off x="4572000" y="747233"/>
+            <a:ext cx="216024" cy="216025"/>
+          </a:xfrm>
+          <a:prstGeom prst="cube">
+            <a:avLst/>
+          </a:prstGeom>
+        </p:spPr>
+        <p:style>
+          <a:lnRef idx="2">
+            <a:schemeClr val="accent1">
+              <a:shade val="50000"/>
+            </a:schemeClr>
+          </a:lnRef>
+          <a:fillRef idx="1">
+            <a:schemeClr val="accent1"/>
+          </a:fillRef>
+          <a:effectRef idx="0">
+            <a:schemeClr val="accent1"/>
+          </a:effectRef>
+          <a:fontRef idx="minor">
+            <a:schemeClr val="lt1"/>
+          </a:fontRef>
+        </p:style>
+        <p:txBody>
+          <a:bodyPr rtlCol="0" anchor="ctr"/>
+          <a:lstStyle/>
+          <a:p>
+            <a:pPr algn="ctr"/>
+            <a:endParaRPr lang="en-US"/>
+          </a:p>
+        </p:txBody>
+      </p:sp>
+      <p:sp>
+        <p:nvSpPr>
+          <p:cNvPr id="41" name="Cube 40"/>
+          <p:cNvSpPr/>
+          <p:nvPr/>
+        </p:nvSpPr>
+        <p:spPr>
+          <a:xfrm>
+            <a:off x="4694579" y="845713"/>
+            <a:ext cx="216024" cy="216025"/>
+          </a:xfrm>
+          <a:prstGeom prst="cube">
+            <a:avLst/>
+          </a:prstGeom>
+        </p:spPr>
+        <p:style>
+          <a:lnRef idx="2">
+            <a:schemeClr val="accent1">
+              <a:shade val="50000"/>
+            </a:schemeClr>
+          </a:lnRef>
+          <a:fillRef idx="1">
+            <a:schemeClr val="accent1"/>
+          </a:fillRef>
+          <a:effectRef idx="0">
+            <a:schemeClr val="accent1"/>
+          </a:effectRef>
+          <a:fontRef idx="minor">
+            <a:schemeClr val="lt1"/>
+          </a:fontRef>
+        </p:style>
+        <p:txBody>
+          <a:bodyPr rtlCol="0" anchor="ctr"/>
+          <a:lstStyle/>
+          <a:p>
+            <a:pPr algn="ctr"/>
+            <a:endParaRPr lang="en-US"/>
+          </a:p>
+        </p:txBody>
+      </p:sp>
+      <p:cxnSp>
+        <p:nvCxnSpPr>
+          <p:cNvPr id="53" name="Straight Arrow Connector 52"/>
+          <p:cNvCxnSpPr>
+            <a:stCxn id="64" idx="1"/>
+            <a:endCxn id="58" idx="3"/>
+          </p:cNvCxnSpPr>
+          <p:nvPr/>
+        </p:nvCxnSpPr>
+        <p:spPr>
+          <a:xfrm flipH="1" flipV="1">
+            <a:off x="3687332" y="392328"/>
+            <a:ext cx="965677" cy="408911"/>
+          </a:xfrm>
+          <a:prstGeom prst="straightConnector1">
+            <a:avLst/>
+          </a:prstGeom>
+          <a:ln>
+            <a:solidFill>
+              <a:schemeClr val="accent2">
+                <a:lumMod val="75000"/>
+              </a:schemeClr>
+            </a:solidFill>
+            <a:tailEnd type="arrow"/>
+          </a:ln>
+        </p:spPr>
+        <p:style>
+          <a:lnRef idx="1">
+            <a:schemeClr val="accent1"/>
+          </a:lnRef>
+          <a:fillRef idx="0">
+            <a:schemeClr val="accent1"/>
+          </a:fillRef>
+          <a:effectRef idx="0">
+            <a:schemeClr val="accent1"/>
+          </a:effectRef>
+          <a:fontRef idx="minor">
+            <a:schemeClr val="tx1"/>
+          </a:fontRef>
+        </p:style>
+      </p:cxnSp>
+      <p:cxnSp>
+        <p:nvCxnSpPr>
+          <p:cNvPr id="56" name="Straight Arrow Connector 55"/>
+          <p:cNvCxnSpPr>
+            <a:stCxn id="42" idx="0"/>
+            <a:endCxn id="64" idx="0"/>
+          </p:cNvCxnSpPr>
+          <p:nvPr/>
+        </p:nvCxnSpPr>
+        <p:spPr>
+          <a:xfrm flipH="1" flipV="1">
+            <a:off x="4707015" y="747233"/>
+            <a:ext cx="1152128" cy="794160"/>
+          </a:xfrm>
+          <a:prstGeom prst="straightConnector1">
+            <a:avLst/>
+          </a:prstGeom>
+          <a:ln>
+            <a:solidFill>
+              <a:schemeClr val="accent2">
+                <a:lumMod val="75000"/>
+              </a:schemeClr>
+            </a:solidFill>
+            <a:tailEnd type="arrow"/>
+          </a:ln>
+        </p:spPr>
+        <p:style>
+          <a:lnRef idx="1">
+            <a:schemeClr val="accent1"/>
+          </a:lnRef>
+          <a:fillRef idx="0">
+            <a:schemeClr val="accent1"/>
+          </a:fillRef>
+          <a:effectRef idx="0">
+            <a:schemeClr val="accent1"/>
+          </a:effectRef>
+          <a:fontRef idx="minor">
+            <a:schemeClr val="tx1"/>
+          </a:fontRef>
+        </p:style>
+      </p:cxnSp>
+      <p:cxnSp>
+        <p:nvCxnSpPr>
+          <p:cNvPr id="66" name="Straight Arrow Connector 65"/>
+          <p:cNvCxnSpPr>
+            <a:stCxn id="58" idx="1"/>
+            <a:endCxn id="36" idx="0"/>
+          </p:cNvCxnSpPr>
+          <p:nvPr/>
+        </p:nvCxnSpPr>
+        <p:spPr>
+          <a:xfrm flipH="1" flipV="1">
+            <a:off x="1997714" y="173818"/>
+            <a:ext cx="1090193" cy="218510"/>
+          </a:xfrm>
+          <a:prstGeom prst="straightConnector1">
+            <a:avLst/>
+          </a:prstGeom>
+          <a:ln>
+            <a:solidFill>
+              <a:schemeClr val="accent2">
+                <a:lumMod val="75000"/>
+              </a:schemeClr>
+            </a:solidFill>
             <a:tailEnd type="arrow"/>
           </a:ln>
         </p:spPr>

</xml_diff>

<commit_message>
Added slide with overview of ICS position
</commit_message>
<xml_diff>
--- a/ofmw-forum2016-valencia-demo.pptx
+++ b/ofmw-forum2016-valencia-demo.pptx
@@ -11,6 +11,7 @@
     <p:sldId id="262" r:id="rId5"/>
     <p:sldId id="260" r:id="rId6"/>
     <p:sldId id="261" r:id="rId7"/>
+    <p:sldId id="263" r:id="rId8"/>
   </p:sldIdLst>
   <p:sldSz cx="9144000" cy="6858000" type="screen4x3"/>
   <p:notesSz cx="6858000" cy="9144000"/>
@@ -293,7 +294,7 @@
           <a:p>
             <a:fld id="{8A80D3F4-BE92-40ED-BB36-22F03F9BF743}" type="datetimeFigureOut">
               <a:rPr lang="en-US" smtClean="0"/>
-              <a:t>3/2/2016</a:t>
+              <a:t>3/4/2016</a:t>
             </a:fld>
             <a:endParaRPr lang="en-US"/>
           </a:p>
@@ -463,7 +464,7 @@
           <a:p>
             <a:fld id="{8A80D3F4-BE92-40ED-BB36-22F03F9BF743}" type="datetimeFigureOut">
               <a:rPr lang="en-US" smtClean="0"/>
-              <a:t>3/2/2016</a:t>
+              <a:t>3/4/2016</a:t>
             </a:fld>
             <a:endParaRPr lang="en-US"/>
           </a:p>
@@ -643,7 +644,7 @@
           <a:p>
             <a:fld id="{8A80D3F4-BE92-40ED-BB36-22F03F9BF743}" type="datetimeFigureOut">
               <a:rPr lang="en-US" smtClean="0"/>
-              <a:t>3/2/2016</a:t>
+              <a:t>3/4/2016</a:t>
             </a:fld>
             <a:endParaRPr lang="en-US"/>
           </a:p>
@@ -813,7 +814,7 @@
           <a:p>
             <a:fld id="{8A80D3F4-BE92-40ED-BB36-22F03F9BF743}" type="datetimeFigureOut">
               <a:rPr lang="en-US" smtClean="0"/>
-              <a:t>3/2/2016</a:t>
+              <a:t>3/4/2016</a:t>
             </a:fld>
             <a:endParaRPr lang="en-US"/>
           </a:p>
@@ -1059,7 +1060,7 @@
           <a:p>
             <a:fld id="{8A80D3F4-BE92-40ED-BB36-22F03F9BF743}" type="datetimeFigureOut">
               <a:rPr lang="en-US" smtClean="0"/>
-              <a:t>3/2/2016</a:t>
+              <a:t>3/4/2016</a:t>
             </a:fld>
             <a:endParaRPr lang="en-US"/>
           </a:p>
@@ -1347,7 +1348,7 @@
           <a:p>
             <a:fld id="{8A80D3F4-BE92-40ED-BB36-22F03F9BF743}" type="datetimeFigureOut">
               <a:rPr lang="en-US" smtClean="0"/>
-              <a:t>3/2/2016</a:t>
+              <a:t>3/4/2016</a:t>
             </a:fld>
             <a:endParaRPr lang="en-US"/>
           </a:p>
@@ -1769,7 +1770,7 @@
           <a:p>
             <a:fld id="{8A80D3F4-BE92-40ED-BB36-22F03F9BF743}" type="datetimeFigureOut">
               <a:rPr lang="en-US" smtClean="0"/>
-              <a:t>3/2/2016</a:t>
+              <a:t>3/4/2016</a:t>
             </a:fld>
             <a:endParaRPr lang="en-US"/>
           </a:p>
@@ -1887,7 +1888,7 @@
           <a:p>
             <a:fld id="{8A80D3F4-BE92-40ED-BB36-22F03F9BF743}" type="datetimeFigureOut">
               <a:rPr lang="en-US" smtClean="0"/>
-              <a:t>3/2/2016</a:t>
+              <a:t>3/4/2016</a:t>
             </a:fld>
             <a:endParaRPr lang="en-US"/>
           </a:p>
@@ -1982,7 +1983,7 @@
           <a:p>
             <a:fld id="{8A80D3F4-BE92-40ED-BB36-22F03F9BF743}" type="datetimeFigureOut">
               <a:rPr lang="en-US" smtClean="0"/>
-              <a:t>3/2/2016</a:t>
+              <a:t>3/4/2016</a:t>
             </a:fld>
             <a:endParaRPr lang="en-US"/>
           </a:p>
@@ -2259,7 +2260,7 @@
           <a:p>
             <a:fld id="{8A80D3F4-BE92-40ED-BB36-22F03F9BF743}" type="datetimeFigureOut">
               <a:rPr lang="en-US" smtClean="0"/>
-              <a:t>3/2/2016</a:t>
+              <a:t>3/4/2016</a:t>
             </a:fld>
             <a:endParaRPr lang="en-US"/>
           </a:p>
@@ -2512,7 +2513,7 @@
           <a:p>
             <a:fld id="{8A80D3F4-BE92-40ED-BB36-22F03F9BF743}" type="datetimeFigureOut">
               <a:rPr lang="en-US" smtClean="0"/>
-              <a:t>3/2/2016</a:t>
+              <a:t>3/4/2016</a:t>
             </a:fld>
             <a:endParaRPr lang="en-US"/>
           </a:p>
@@ -2725,7 +2726,7 @@
           <a:p>
             <a:fld id="{8A80D3F4-BE92-40ED-BB36-22F03F9BF743}" type="datetimeFigureOut">
               <a:rPr lang="en-US" smtClean="0"/>
-              <a:t>3/2/2016</a:t>
+              <a:t>3/4/2016</a:t>
             </a:fld>
             <a:endParaRPr lang="en-US"/>
           </a:p>
@@ -36095,6 +36096,1952 @@
 </p:sld>
 </file>
 
+<file path=ppt/slides/slide7.xml><?xml version="1.0" encoding="utf-8"?>
+<p:sld xmlns:a="http://schemas.openxmlformats.org/drawingml/2006/main" xmlns:r="http://schemas.openxmlformats.org/officeDocument/2006/relationships" xmlns:p="http://schemas.openxmlformats.org/presentationml/2006/main">
+  <p:cSld>
+    <p:spTree>
+      <p:nvGrpSpPr>
+        <p:cNvPr id="1" name=""/>
+        <p:cNvGrpSpPr/>
+        <p:nvPr/>
+      </p:nvGrpSpPr>
+      <p:grpSpPr>
+        <a:xfrm>
+          <a:off x="0" y="0"/>
+          <a:ext cx="0" cy="0"/>
+          <a:chOff x="0" y="0"/>
+          <a:chExt cx="0" cy="0"/>
+        </a:xfrm>
+      </p:grpSpPr>
+      <p:sp>
+        <p:nvSpPr>
+          <p:cNvPr id="2" name="Cloud 1"/>
+          <p:cNvSpPr/>
+          <p:nvPr/>
+        </p:nvSpPr>
+        <p:spPr>
+          <a:xfrm>
+            <a:off x="3869922" y="44624"/>
+            <a:ext cx="1332148" cy="713898"/>
+          </a:xfrm>
+          <a:prstGeom prst="cloud">
+            <a:avLst/>
+          </a:prstGeom>
+        </p:spPr>
+        <p:style>
+          <a:lnRef idx="1">
+            <a:schemeClr val="accent1"/>
+          </a:lnRef>
+          <a:fillRef idx="2">
+            <a:schemeClr val="accent1"/>
+          </a:fillRef>
+          <a:effectRef idx="1">
+            <a:schemeClr val="accent1"/>
+          </a:effectRef>
+          <a:fontRef idx="minor">
+            <a:schemeClr val="dk1"/>
+          </a:fontRef>
+        </p:style>
+        <p:txBody>
+          <a:bodyPr rtlCol="0" anchor="ctr"/>
+          <a:lstStyle/>
+          <a:p>
+            <a:pPr algn="ctr"/>
+            <a:endParaRPr lang="en-US"/>
+          </a:p>
+        </p:txBody>
+      </p:sp>
+      <p:sp>
+        <p:nvSpPr>
+          <p:cNvPr id="5" name="Cube 4"/>
+          <p:cNvSpPr/>
+          <p:nvPr/>
+        </p:nvSpPr>
+        <p:spPr>
+          <a:xfrm>
+            <a:off x="7308304" y="3548303"/>
+            <a:ext cx="1008112" cy="904307"/>
+          </a:xfrm>
+          <a:prstGeom prst="cube">
+            <a:avLst/>
+          </a:prstGeom>
+        </p:spPr>
+        <p:style>
+          <a:lnRef idx="1">
+            <a:schemeClr val="accent2"/>
+          </a:lnRef>
+          <a:fillRef idx="3">
+            <a:schemeClr val="accent2"/>
+          </a:fillRef>
+          <a:effectRef idx="2">
+            <a:schemeClr val="accent2"/>
+          </a:effectRef>
+          <a:fontRef idx="minor">
+            <a:schemeClr val="lt1"/>
+          </a:fontRef>
+        </p:style>
+        <p:txBody>
+          <a:bodyPr rtlCol="0" anchor="ctr"/>
+          <a:lstStyle/>
+          <a:p>
+            <a:pPr algn="ctr"/>
+            <a:r>
+              <a:rPr lang="nl-NL" sz="1600" dirty="0" smtClean="0"/>
+              <a:t>SOA CS</a:t>
+            </a:r>
+            <a:endParaRPr lang="en-US" sz="1600" dirty="0"/>
+          </a:p>
+        </p:txBody>
+      </p:sp>
+      <p:sp>
+        <p:nvSpPr>
+          <p:cNvPr id="7" name="Cube 6"/>
+          <p:cNvSpPr/>
+          <p:nvPr/>
+        </p:nvSpPr>
+        <p:spPr>
+          <a:xfrm>
+            <a:off x="3869923" y="3320989"/>
+            <a:ext cx="1594774" cy="1046398"/>
+          </a:xfrm>
+          <a:prstGeom prst="cube">
+            <a:avLst>
+              <a:gd name="adj" fmla="val 32303"/>
+            </a:avLst>
+          </a:prstGeom>
+        </p:spPr>
+        <p:style>
+          <a:lnRef idx="0">
+            <a:schemeClr val="accent2"/>
+          </a:lnRef>
+          <a:fillRef idx="3">
+            <a:schemeClr val="accent2"/>
+          </a:fillRef>
+          <a:effectRef idx="3">
+            <a:schemeClr val="accent2"/>
+          </a:effectRef>
+          <a:fontRef idx="minor">
+            <a:schemeClr val="lt1"/>
+          </a:fontRef>
+        </p:style>
+        <p:txBody>
+          <a:bodyPr rtlCol="0" anchor="ctr"/>
+          <a:lstStyle/>
+          <a:p>
+            <a:pPr algn="ctr"/>
+            <a:r>
+              <a:rPr lang="nl-NL" sz="1600" dirty="0" smtClean="0"/>
+              <a:t>ICS</a:t>
+            </a:r>
+            <a:endParaRPr lang="en-US" sz="1600" dirty="0"/>
+          </a:p>
+        </p:txBody>
+      </p:sp>
+      <p:sp>
+        <p:nvSpPr>
+          <p:cNvPr id="8" name="Cube 7"/>
+          <p:cNvSpPr/>
+          <p:nvPr/>
+        </p:nvSpPr>
+        <p:spPr>
+          <a:xfrm>
+            <a:off x="2849253" y="5475810"/>
+            <a:ext cx="936104" cy="720080"/>
+          </a:xfrm>
+          <a:prstGeom prst="cube">
+            <a:avLst/>
+          </a:prstGeom>
+        </p:spPr>
+        <p:style>
+          <a:lnRef idx="1">
+            <a:schemeClr val="accent2"/>
+          </a:lnRef>
+          <a:fillRef idx="3">
+            <a:schemeClr val="accent2"/>
+          </a:fillRef>
+          <a:effectRef idx="2">
+            <a:schemeClr val="accent2"/>
+          </a:effectRef>
+          <a:fontRef idx="minor">
+            <a:schemeClr val="lt1"/>
+          </a:fontRef>
+        </p:style>
+        <p:txBody>
+          <a:bodyPr rtlCol="0" anchor="ctr"/>
+          <a:lstStyle/>
+          <a:p>
+            <a:pPr algn="ctr"/>
+            <a:r>
+              <a:rPr lang="nl-NL" sz="1600" dirty="0"/>
+              <a:t>P</a:t>
+            </a:r>
+            <a:r>
+              <a:rPr lang="nl-NL" sz="1600" dirty="0" smtClean="0"/>
+              <a:t>CS</a:t>
+            </a:r>
+            <a:endParaRPr lang="en-US" sz="1600" dirty="0"/>
+          </a:p>
+        </p:txBody>
+      </p:sp>
+      <p:sp>
+        <p:nvSpPr>
+          <p:cNvPr id="10" name="Cube 9"/>
+          <p:cNvSpPr/>
+          <p:nvPr/>
+        </p:nvSpPr>
+        <p:spPr>
+          <a:xfrm>
+            <a:off x="593558" y="2154037"/>
+            <a:ext cx="936104" cy="720080"/>
+          </a:xfrm>
+          <a:prstGeom prst="cube">
+            <a:avLst/>
+          </a:prstGeom>
+        </p:spPr>
+        <p:style>
+          <a:lnRef idx="1">
+            <a:schemeClr val="accent2"/>
+          </a:lnRef>
+          <a:fillRef idx="3">
+            <a:schemeClr val="accent2"/>
+          </a:fillRef>
+          <a:effectRef idx="2">
+            <a:schemeClr val="accent2"/>
+          </a:effectRef>
+          <a:fontRef idx="minor">
+            <a:schemeClr val="lt1"/>
+          </a:fontRef>
+        </p:style>
+        <p:txBody>
+          <a:bodyPr rtlCol="0" anchor="ctr"/>
+          <a:lstStyle/>
+          <a:p>
+            <a:pPr algn="ctr"/>
+            <a:r>
+              <a:rPr lang="nl-NL" sz="1600" dirty="0" err="1" smtClean="0"/>
+              <a:t>IoT</a:t>
+            </a:r>
+            <a:r>
+              <a:rPr lang="nl-NL" sz="1600" dirty="0" smtClean="0"/>
+              <a:t> CS</a:t>
+            </a:r>
+            <a:endParaRPr lang="en-US" sz="1600" dirty="0"/>
+          </a:p>
+        </p:txBody>
+      </p:sp>
+      <p:sp>
+        <p:nvSpPr>
+          <p:cNvPr id="11" name="Cube 10"/>
+          <p:cNvSpPr/>
+          <p:nvPr/>
+        </p:nvSpPr>
+        <p:spPr>
+          <a:xfrm>
+            <a:off x="4319972" y="3266982"/>
+            <a:ext cx="216024" cy="216025"/>
+          </a:xfrm>
+          <a:prstGeom prst="cube">
+            <a:avLst/>
+          </a:prstGeom>
+        </p:spPr>
+        <p:style>
+          <a:lnRef idx="2">
+            <a:schemeClr val="accent1">
+              <a:shade val="50000"/>
+            </a:schemeClr>
+          </a:lnRef>
+          <a:fillRef idx="1">
+            <a:schemeClr val="accent1"/>
+          </a:fillRef>
+          <a:effectRef idx="0">
+            <a:schemeClr val="accent1"/>
+          </a:effectRef>
+          <a:fontRef idx="minor">
+            <a:schemeClr val="lt1"/>
+          </a:fontRef>
+        </p:style>
+        <p:txBody>
+          <a:bodyPr rtlCol="0" anchor="ctr"/>
+          <a:lstStyle/>
+          <a:p>
+            <a:pPr algn="ctr"/>
+            <a:endParaRPr lang="en-US"/>
+          </a:p>
+        </p:txBody>
+      </p:sp>
+      <p:sp>
+        <p:nvSpPr>
+          <p:cNvPr id="12" name="Cube 11"/>
+          <p:cNvSpPr/>
+          <p:nvPr/>
+        </p:nvSpPr>
+        <p:spPr>
+          <a:xfrm>
+            <a:off x="7560332" y="3545304"/>
+            <a:ext cx="216024" cy="216025"/>
+          </a:xfrm>
+          <a:prstGeom prst="cube">
+            <a:avLst/>
+          </a:prstGeom>
+        </p:spPr>
+        <p:style>
+          <a:lnRef idx="2">
+            <a:schemeClr val="accent1">
+              <a:shade val="50000"/>
+            </a:schemeClr>
+          </a:lnRef>
+          <a:fillRef idx="1">
+            <a:schemeClr val="accent1"/>
+          </a:fillRef>
+          <a:effectRef idx="0">
+            <a:schemeClr val="accent1"/>
+          </a:effectRef>
+          <a:fontRef idx="minor">
+            <a:schemeClr val="lt1"/>
+          </a:fontRef>
+        </p:style>
+        <p:txBody>
+          <a:bodyPr rtlCol="0" anchor="ctr"/>
+          <a:lstStyle/>
+          <a:p>
+            <a:pPr algn="ctr"/>
+            <a:endParaRPr lang="en-US"/>
+          </a:p>
+        </p:txBody>
+      </p:sp>
+      <p:sp>
+        <p:nvSpPr>
+          <p:cNvPr id="13" name="Cube 12"/>
+          <p:cNvSpPr/>
+          <p:nvPr/>
+        </p:nvSpPr>
+        <p:spPr>
+          <a:xfrm>
+            <a:off x="7884368" y="3391072"/>
+            <a:ext cx="216024" cy="216025"/>
+          </a:xfrm>
+          <a:prstGeom prst="cube">
+            <a:avLst/>
+          </a:prstGeom>
+        </p:spPr>
+        <p:style>
+          <a:lnRef idx="2">
+            <a:schemeClr val="accent1">
+              <a:shade val="50000"/>
+            </a:schemeClr>
+          </a:lnRef>
+          <a:fillRef idx="1">
+            <a:schemeClr val="accent1"/>
+          </a:fillRef>
+          <a:effectRef idx="0">
+            <a:schemeClr val="accent1"/>
+          </a:effectRef>
+          <a:fontRef idx="minor">
+            <a:schemeClr val="lt1"/>
+          </a:fontRef>
+        </p:style>
+        <p:txBody>
+          <a:bodyPr rtlCol="0" anchor="ctr"/>
+          <a:lstStyle/>
+          <a:p>
+            <a:pPr algn="ctr"/>
+            <a:endParaRPr lang="en-US"/>
+          </a:p>
+        </p:txBody>
+      </p:sp>
+      <p:sp>
+        <p:nvSpPr>
+          <p:cNvPr id="14" name="Cube 13"/>
+          <p:cNvSpPr/>
+          <p:nvPr/>
+        </p:nvSpPr>
+        <p:spPr>
+          <a:xfrm>
+            <a:off x="3209293" y="5367797"/>
+            <a:ext cx="216024" cy="216025"/>
+          </a:xfrm>
+          <a:prstGeom prst="cube">
+            <a:avLst/>
+          </a:prstGeom>
+        </p:spPr>
+        <p:style>
+          <a:lnRef idx="2">
+            <a:schemeClr val="accent1">
+              <a:shade val="50000"/>
+            </a:schemeClr>
+          </a:lnRef>
+          <a:fillRef idx="1">
+            <a:schemeClr val="accent1"/>
+          </a:fillRef>
+          <a:effectRef idx="0">
+            <a:schemeClr val="accent1"/>
+          </a:effectRef>
+          <a:fontRef idx="minor">
+            <a:schemeClr val="lt1"/>
+          </a:fontRef>
+        </p:style>
+        <p:txBody>
+          <a:bodyPr rtlCol="0" anchor="ctr"/>
+          <a:lstStyle/>
+          <a:p>
+            <a:pPr algn="ctr"/>
+            <a:endParaRPr lang="en-US"/>
+          </a:p>
+        </p:txBody>
+      </p:sp>
+      <p:sp>
+        <p:nvSpPr>
+          <p:cNvPr id="15" name="Cube 14"/>
+          <p:cNvSpPr/>
+          <p:nvPr/>
+        </p:nvSpPr>
+        <p:spPr>
+          <a:xfrm>
+            <a:off x="935596" y="2046024"/>
+            <a:ext cx="216024" cy="216025"/>
+          </a:xfrm>
+          <a:prstGeom prst="cube">
+            <a:avLst/>
+          </a:prstGeom>
+        </p:spPr>
+        <p:style>
+          <a:lnRef idx="2">
+            <a:schemeClr val="accent1">
+              <a:shade val="50000"/>
+            </a:schemeClr>
+          </a:lnRef>
+          <a:fillRef idx="1">
+            <a:schemeClr val="accent1"/>
+          </a:fillRef>
+          <a:effectRef idx="0">
+            <a:schemeClr val="accent1"/>
+          </a:effectRef>
+          <a:fontRef idx="minor">
+            <a:schemeClr val="lt1"/>
+          </a:fontRef>
+        </p:style>
+        <p:txBody>
+          <a:bodyPr rtlCol="0" anchor="ctr"/>
+          <a:lstStyle/>
+          <a:p>
+            <a:pPr algn="ctr"/>
+            <a:endParaRPr lang="en-US"/>
+          </a:p>
+        </p:txBody>
+      </p:sp>
+      <p:cxnSp>
+        <p:nvCxnSpPr>
+          <p:cNvPr id="17" name="Straight Arrow Connector 16"/>
+          <p:cNvCxnSpPr>
+            <a:stCxn id="14" idx="1"/>
+            <a:endCxn id="52" idx="3"/>
+          </p:cNvCxnSpPr>
+          <p:nvPr/>
+        </p:nvCxnSpPr>
+        <p:spPr>
+          <a:xfrm flipV="1">
+            <a:off x="3290302" y="3635407"/>
+            <a:ext cx="1263079" cy="1786396"/>
+          </a:xfrm>
+          <a:prstGeom prst="straightConnector1">
+            <a:avLst/>
+          </a:prstGeom>
+          <a:ln w="19050">
+            <a:solidFill>
+              <a:schemeClr val="accent2">
+                <a:lumMod val="50000"/>
+              </a:schemeClr>
+            </a:solidFill>
+            <a:tailEnd type="arrow"/>
+          </a:ln>
+        </p:spPr>
+        <p:style>
+          <a:lnRef idx="1">
+            <a:schemeClr val="accent1"/>
+          </a:lnRef>
+          <a:fillRef idx="0">
+            <a:schemeClr val="accent1"/>
+          </a:fillRef>
+          <a:effectRef idx="0">
+            <a:schemeClr val="accent1"/>
+          </a:effectRef>
+          <a:fontRef idx="minor">
+            <a:schemeClr val="tx1"/>
+          </a:fontRef>
+        </p:style>
+      </p:cxnSp>
+      <p:cxnSp>
+        <p:nvCxnSpPr>
+          <p:cNvPr id="18" name="Straight Arrow Connector 17"/>
+          <p:cNvCxnSpPr>
+            <a:stCxn id="53" idx="4"/>
+            <a:endCxn id="12" idx="2"/>
+          </p:cNvCxnSpPr>
+          <p:nvPr/>
+        </p:nvCxnSpPr>
+        <p:spPr>
+          <a:xfrm>
+            <a:off x="5074063" y="3526087"/>
+            <a:ext cx="2486269" cy="154233"/>
+          </a:xfrm>
+          <a:prstGeom prst="straightConnector1">
+            <a:avLst/>
+          </a:prstGeom>
+          <a:ln w="19050">
+            <a:solidFill>
+              <a:schemeClr val="accent2">
+                <a:lumMod val="50000"/>
+              </a:schemeClr>
+            </a:solidFill>
+            <a:tailEnd type="arrow"/>
+          </a:ln>
+        </p:spPr>
+        <p:style>
+          <a:lnRef idx="1">
+            <a:schemeClr val="accent1"/>
+          </a:lnRef>
+          <a:fillRef idx="0">
+            <a:schemeClr val="accent1"/>
+          </a:fillRef>
+          <a:effectRef idx="0">
+            <a:schemeClr val="accent1"/>
+          </a:effectRef>
+          <a:fontRef idx="minor">
+            <a:schemeClr val="tx1"/>
+          </a:fontRef>
+        </p:style>
+      </p:cxnSp>
+      <p:cxnSp>
+        <p:nvCxnSpPr>
+          <p:cNvPr id="19" name="Straight Arrow Connector 18"/>
+          <p:cNvCxnSpPr>
+            <a:stCxn id="23" idx="5"/>
+            <a:endCxn id="13" idx="2"/>
+          </p:cNvCxnSpPr>
+          <p:nvPr/>
+        </p:nvCxnSpPr>
+        <p:spPr>
+          <a:xfrm>
+            <a:off x="4910603" y="3374995"/>
+            <a:ext cx="2973765" cy="151093"/>
+          </a:xfrm>
+          <a:prstGeom prst="straightConnector1">
+            <a:avLst/>
+          </a:prstGeom>
+          <a:ln w="19050">
+            <a:solidFill>
+              <a:schemeClr val="accent2">
+                <a:lumMod val="50000"/>
+              </a:schemeClr>
+            </a:solidFill>
+            <a:tailEnd type="arrow"/>
+          </a:ln>
+        </p:spPr>
+        <p:style>
+          <a:lnRef idx="1">
+            <a:schemeClr val="accent1"/>
+          </a:lnRef>
+          <a:fillRef idx="0">
+            <a:schemeClr val="accent1"/>
+          </a:fillRef>
+          <a:effectRef idx="0">
+            <a:schemeClr val="accent1"/>
+          </a:effectRef>
+          <a:fontRef idx="minor">
+            <a:schemeClr val="tx1"/>
+          </a:fontRef>
+        </p:style>
+      </p:cxnSp>
+      <p:pic>
+        <p:nvPicPr>
+          <p:cNvPr id="21" name="Picture 2" descr="https://g.twimg.com/Twitter_logo_blue.png"/>
+          <p:cNvPicPr>
+            <a:picLocks noChangeAspect="1" noChangeArrowheads="1"/>
+          </p:cNvPicPr>
+          <p:nvPr/>
+        </p:nvPicPr>
+        <p:blipFill>
+          <a:blip r:embed="rId2" cstate="print">
+            <a:extLst>
+              <a:ext uri="{28A0092B-C50C-407E-A947-70E740481C1C}">
+                <a14:useLocalDpi xmlns:a14="http://schemas.microsoft.com/office/drawing/2010/main" val="0"/>
+              </a:ext>
+            </a:extLst>
+          </a:blip>
+          <a:srcRect/>
+          <a:stretch>
+            <a:fillRect/>
+          </a:stretch>
+        </p:blipFill>
+        <p:spPr bwMode="auto">
+          <a:xfrm>
+            <a:off x="4236283" y="240601"/>
+            <a:ext cx="599425" cy="487731"/>
+          </a:xfrm>
+          <a:prstGeom prst="rect">
+            <a:avLst/>
+          </a:prstGeom>
+          <a:noFill/>
+          <a:extLst>
+            <a:ext uri="{909E8E84-426E-40DD-AFC4-6F175D3DCCD1}">
+              <a14:hiddenFill xmlns:a14="http://schemas.microsoft.com/office/drawing/2010/main">
+                <a:solidFill>
+                  <a:srgbClr val="FFFFFF"/>
+                </a:solidFill>
+              </a14:hiddenFill>
+            </a:ext>
+          </a:extLst>
+        </p:spPr>
+      </p:pic>
+      <p:sp>
+        <p:nvSpPr>
+          <p:cNvPr id="22" name="Cube 21"/>
+          <p:cNvSpPr/>
+          <p:nvPr/>
+        </p:nvSpPr>
+        <p:spPr>
+          <a:xfrm>
+            <a:off x="4572000" y="3195505"/>
+            <a:ext cx="216024" cy="216025"/>
+          </a:xfrm>
+          <a:prstGeom prst="cube">
+            <a:avLst/>
+          </a:prstGeom>
+        </p:spPr>
+        <p:style>
+          <a:lnRef idx="2">
+            <a:schemeClr val="accent1">
+              <a:shade val="50000"/>
+            </a:schemeClr>
+          </a:lnRef>
+          <a:fillRef idx="1">
+            <a:schemeClr val="accent1"/>
+          </a:fillRef>
+          <a:effectRef idx="0">
+            <a:schemeClr val="accent1"/>
+          </a:effectRef>
+          <a:fontRef idx="minor">
+            <a:schemeClr val="lt1"/>
+          </a:fontRef>
+        </p:style>
+        <p:txBody>
+          <a:bodyPr rtlCol="0" anchor="ctr"/>
+          <a:lstStyle/>
+          <a:p>
+            <a:pPr algn="ctr"/>
+            <a:endParaRPr lang="en-US"/>
+          </a:p>
+        </p:txBody>
+      </p:sp>
+      <p:sp>
+        <p:nvSpPr>
+          <p:cNvPr id="23" name="Cube 22"/>
+          <p:cNvSpPr/>
+          <p:nvPr/>
+        </p:nvSpPr>
+        <p:spPr>
+          <a:xfrm>
+            <a:off x="4694579" y="3293985"/>
+            <a:ext cx="216024" cy="216025"/>
+          </a:xfrm>
+          <a:prstGeom prst="cube">
+            <a:avLst/>
+          </a:prstGeom>
+        </p:spPr>
+        <p:style>
+          <a:lnRef idx="2">
+            <a:schemeClr val="accent1">
+              <a:shade val="50000"/>
+            </a:schemeClr>
+          </a:lnRef>
+          <a:fillRef idx="1">
+            <a:schemeClr val="accent1"/>
+          </a:fillRef>
+          <a:effectRef idx="0">
+            <a:schemeClr val="accent1"/>
+          </a:effectRef>
+          <a:fontRef idx="minor">
+            <a:schemeClr val="lt1"/>
+          </a:fontRef>
+        </p:style>
+        <p:txBody>
+          <a:bodyPr rtlCol="0" anchor="ctr"/>
+          <a:lstStyle/>
+          <a:p>
+            <a:pPr algn="ctr"/>
+            <a:endParaRPr lang="en-US"/>
+          </a:p>
+        </p:txBody>
+      </p:sp>
+      <p:cxnSp>
+        <p:nvCxnSpPr>
+          <p:cNvPr id="24" name="Straight Arrow Connector 23"/>
+          <p:cNvCxnSpPr>
+            <a:stCxn id="22" idx="1"/>
+            <a:endCxn id="21" idx="2"/>
+          </p:cNvCxnSpPr>
+          <p:nvPr/>
+        </p:nvCxnSpPr>
+        <p:spPr>
+          <a:xfrm flipH="1" flipV="1">
+            <a:off x="4535996" y="728332"/>
+            <a:ext cx="117013" cy="2521179"/>
+          </a:xfrm>
+          <a:prstGeom prst="straightConnector1">
+            <a:avLst/>
+          </a:prstGeom>
+          <a:ln w="19050">
+            <a:solidFill>
+              <a:schemeClr val="accent2">
+                <a:lumMod val="50000"/>
+              </a:schemeClr>
+            </a:solidFill>
+            <a:tailEnd type="arrow"/>
+          </a:ln>
+        </p:spPr>
+        <p:style>
+          <a:lnRef idx="1">
+            <a:schemeClr val="accent1"/>
+          </a:lnRef>
+          <a:fillRef idx="0">
+            <a:schemeClr val="accent1"/>
+          </a:fillRef>
+          <a:effectRef idx="0">
+            <a:schemeClr val="accent1"/>
+          </a:effectRef>
+          <a:fontRef idx="minor">
+            <a:schemeClr val="tx1"/>
+          </a:fontRef>
+        </p:style>
+      </p:cxnSp>
+      <p:cxnSp>
+        <p:nvCxnSpPr>
+          <p:cNvPr id="27" name="Straight Arrow Connector 26"/>
+          <p:cNvCxnSpPr>
+            <a:stCxn id="15" idx="4"/>
+            <a:endCxn id="11" idx="2"/>
+          </p:cNvCxnSpPr>
+          <p:nvPr/>
+        </p:nvCxnSpPr>
+        <p:spPr>
+          <a:xfrm>
+            <a:off x="1097614" y="2181040"/>
+            <a:ext cx="3222358" cy="1220958"/>
+          </a:xfrm>
+          <a:prstGeom prst="straightConnector1">
+            <a:avLst/>
+          </a:prstGeom>
+          <a:ln w="19050">
+            <a:solidFill>
+              <a:schemeClr val="accent2">
+                <a:lumMod val="50000"/>
+              </a:schemeClr>
+            </a:solidFill>
+            <a:tailEnd type="arrow"/>
+          </a:ln>
+        </p:spPr>
+        <p:style>
+          <a:lnRef idx="1">
+            <a:schemeClr val="accent1"/>
+          </a:lnRef>
+          <a:fillRef idx="0">
+            <a:schemeClr val="accent1"/>
+          </a:fillRef>
+          <a:effectRef idx="0">
+            <a:schemeClr val="accent1"/>
+          </a:effectRef>
+          <a:fontRef idx="minor">
+            <a:schemeClr val="tx1"/>
+          </a:fontRef>
+        </p:style>
+      </p:cxnSp>
+      <p:pic>
+        <p:nvPicPr>
+          <p:cNvPr id="1026" name="Picture 2"/>
+          <p:cNvPicPr>
+            <a:picLocks noChangeAspect="1" noChangeArrowheads="1"/>
+          </p:cNvPicPr>
+          <p:nvPr/>
+        </p:nvPicPr>
+        <p:blipFill>
+          <a:blip r:embed="rId3">
+            <a:extLst>
+              <a:ext uri="{28A0092B-C50C-407E-A947-70E740481C1C}">
+                <a14:useLocalDpi xmlns:a14="http://schemas.microsoft.com/office/drawing/2010/main" val="0"/>
+              </a:ext>
+            </a:extLst>
+          </a:blip>
+          <a:srcRect/>
+          <a:stretch>
+            <a:fillRect/>
+          </a:stretch>
+        </p:blipFill>
+        <p:spPr bwMode="auto">
+          <a:xfrm>
+            <a:off x="3684564" y="1713903"/>
+            <a:ext cx="1819875" cy="664242"/>
+          </a:xfrm>
+          <a:prstGeom prst="rect">
+            <a:avLst/>
+          </a:prstGeom>
+          <a:ln>
+            <a:noFill/>
+          </a:ln>
+          <a:effectLst>
+            <a:outerShdw blurRad="292100" dist="139700" dir="2700000" algn="tl" rotWithShape="0">
+              <a:srgbClr val="333333">
+                <a:alpha val="65000"/>
+              </a:srgbClr>
+            </a:outerShdw>
+          </a:effectLst>
+          <a:extLst>
+            <a:ext uri="{909E8E84-426E-40DD-AFC4-6F175D3DCCD1}">
+              <a14:hiddenFill xmlns:a14="http://schemas.microsoft.com/office/drawing/2010/main">
+                <a:solidFill>
+                  <a:schemeClr val="accent1"/>
+                </a:solidFill>
+              </a14:hiddenFill>
+            </a:ext>
+            <a:ext uri="{91240B29-F687-4F45-9708-019B960494DF}">
+              <a14:hiddenLine xmlns:a14="http://schemas.microsoft.com/office/drawing/2010/main" w="9525">
+                <a:solidFill>
+                  <a:schemeClr val="tx1"/>
+                </a:solidFill>
+                <a:miter lim="800000"/>
+                <a:headEnd/>
+                <a:tailEnd/>
+              </a14:hiddenLine>
+            </a:ext>
+          </a:extLst>
+        </p:spPr>
+      </p:pic>
+      <p:pic>
+        <p:nvPicPr>
+          <p:cNvPr id="1027" name="Picture 3"/>
+          <p:cNvPicPr>
+            <a:picLocks noChangeAspect="1" noChangeArrowheads="1"/>
+          </p:cNvPicPr>
+          <p:nvPr/>
+        </p:nvPicPr>
+        <p:blipFill>
+          <a:blip r:embed="rId4">
+            <a:extLst>
+              <a:ext uri="{28A0092B-C50C-407E-A947-70E740481C1C}">
+                <a14:useLocalDpi xmlns:a14="http://schemas.microsoft.com/office/drawing/2010/main" val="0"/>
+              </a:ext>
+            </a:extLst>
+          </a:blip>
+          <a:srcRect/>
+          <a:stretch>
+            <a:fillRect/>
+          </a:stretch>
+        </p:blipFill>
+        <p:spPr bwMode="auto">
+          <a:xfrm>
+            <a:off x="1929333" y="2604421"/>
+            <a:ext cx="2282627" cy="591084"/>
+          </a:xfrm>
+          <a:prstGeom prst="rect">
+            <a:avLst/>
+          </a:prstGeom>
+          <a:ln>
+            <a:noFill/>
+          </a:ln>
+          <a:effectLst>
+            <a:outerShdw blurRad="292100" dist="139700" dir="2700000" algn="tl" rotWithShape="0">
+              <a:srgbClr val="333333">
+                <a:alpha val="65000"/>
+              </a:srgbClr>
+            </a:outerShdw>
+          </a:effectLst>
+          <a:extLst>
+            <a:ext uri="{909E8E84-426E-40DD-AFC4-6F175D3DCCD1}">
+              <a14:hiddenFill xmlns:a14="http://schemas.microsoft.com/office/drawing/2010/main">
+                <a:solidFill>
+                  <a:schemeClr val="accent1"/>
+                </a:solidFill>
+              </a14:hiddenFill>
+            </a:ext>
+            <a:ext uri="{91240B29-F687-4F45-9708-019B960494DF}">
+              <a14:hiddenLine xmlns:a14="http://schemas.microsoft.com/office/drawing/2010/main" w="9525">
+                <a:solidFill>
+                  <a:schemeClr val="tx1"/>
+                </a:solidFill>
+                <a:miter lim="800000"/>
+                <a:headEnd/>
+                <a:tailEnd/>
+              </a14:hiddenLine>
+            </a:ext>
+          </a:extLst>
+        </p:spPr>
+      </p:pic>
+      <p:sp>
+        <p:nvSpPr>
+          <p:cNvPr id="44" name="Rectangular Callout 43"/>
+          <p:cNvSpPr/>
+          <p:nvPr/>
+        </p:nvSpPr>
+        <p:spPr>
+          <a:xfrm>
+            <a:off x="5363460" y="401573"/>
+            <a:ext cx="2068049" cy="533873"/>
+          </a:xfrm>
+          <a:prstGeom prst="wedgeRectCallout">
+            <a:avLst>
+              <a:gd name="adj1" fmla="val -59246"/>
+              <a:gd name="adj2" fmla="val 214622"/>
+            </a:avLst>
+          </a:prstGeom>
+        </p:spPr>
+        <p:style>
+          <a:lnRef idx="2">
+            <a:schemeClr val="accent6">
+              <a:shade val="50000"/>
+            </a:schemeClr>
+          </a:lnRef>
+          <a:fillRef idx="1">
+            <a:schemeClr val="accent6"/>
+          </a:fillRef>
+          <a:effectRef idx="0">
+            <a:schemeClr val="accent6"/>
+          </a:effectRef>
+          <a:fontRef idx="minor">
+            <a:schemeClr val="lt1"/>
+          </a:fontRef>
+        </p:style>
+        <p:txBody>
+          <a:bodyPr rtlCol="0" anchor="ctr"/>
+          <a:lstStyle/>
+          <a:p>
+            <a:pPr algn="ctr"/>
+            <a:r>
+              <a:rPr lang="nl-NL" sz="1200" dirty="0" smtClean="0"/>
+              <a:t>REST</a:t>
+            </a:r>
+          </a:p>
+          <a:p>
+            <a:pPr algn="ctr"/>
+            <a:r>
+              <a:rPr lang="nl-NL" sz="1200" dirty="0" smtClean="0"/>
+              <a:t>(</a:t>
+            </a:r>
+            <a:r>
+              <a:rPr lang="nl-NL" sz="1200" dirty="0" err="1" smtClean="0"/>
+              <a:t>publishes</a:t>
+            </a:r>
+            <a:r>
+              <a:rPr lang="nl-NL" sz="1200" dirty="0" smtClean="0"/>
+              <a:t> a Tweet </a:t>
+            </a:r>
+            <a:r>
+              <a:rPr lang="nl-NL" sz="1200" dirty="0" err="1" smtClean="0"/>
+              <a:t>through</a:t>
+            </a:r>
+            <a:r>
+              <a:rPr lang="nl-NL" sz="1200" dirty="0" smtClean="0"/>
+              <a:t> </a:t>
+            </a:r>
+            <a:r>
+              <a:rPr lang="nl-NL" sz="1200" dirty="0" err="1" smtClean="0"/>
+              <a:t>SaibotAirport</a:t>
+            </a:r>
+            <a:r>
+              <a:rPr lang="nl-NL" sz="1200" dirty="0" smtClean="0"/>
+              <a:t> )</a:t>
+            </a:r>
+            <a:endParaRPr lang="en-US" sz="1200" dirty="0"/>
+          </a:p>
+        </p:txBody>
+      </p:sp>
+      <p:sp>
+        <p:nvSpPr>
+          <p:cNvPr id="45" name="Rectangular Callout 44"/>
+          <p:cNvSpPr/>
+          <p:nvPr/>
+        </p:nvSpPr>
+        <p:spPr>
+          <a:xfrm>
+            <a:off x="755576" y="548680"/>
+            <a:ext cx="2734123" cy="804095"/>
+          </a:xfrm>
+          <a:prstGeom prst="wedgeRectCallout">
+            <a:avLst>
+              <a:gd name="adj1" fmla="val 7477"/>
+              <a:gd name="adj2" fmla="val 213873"/>
+            </a:avLst>
+          </a:prstGeom>
+        </p:spPr>
+        <p:style>
+          <a:lnRef idx="2">
+            <a:schemeClr val="accent6">
+              <a:shade val="50000"/>
+            </a:schemeClr>
+          </a:lnRef>
+          <a:fillRef idx="1">
+            <a:schemeClr val="accent6"/>
+          </a:fillRef>
+          <a:effectRef idx="0">
+            <a:schemeClr val="accent6"/>
+          </a:effectRef>
+          <a:fontRef idx="minor">
+            <a:schemeClr val="lt1"/>
+          </a:fontRef>
+        </p:style>
+        <p:txBody>
+          <a:bodyPr rtlCol="0" anchor="ctr"/>
+          <a:lstStyle/>
+          <a:p>
+            <a:pPr algn="ctr"/>
+            <a:r>
+              <a:rPr lang="nl-NL" sz="1200" dirty="0" smtClean="0"/>
+              <a:t>REST</a:t>
+            </a:r>
+          </a:p>
+          <a:p>
+            <a:pPr algn="ctr"/>
+            <a:r>
+              <a:rPr lang="nl-NL" sz="1200" dirty="0" smtClean="0"/>
+              <a:t>(hand off artist </a:t>
+            </a:r>
+            <a:r>
+              <a:rPr lang="nl-NL" sz="1200" dirty="0" err="1" smtClean="0"/>
+              <a:t>finding</a:t>
+            </a:r>
+            <a:r>
+              <a:rPr lang="nl-NL" sz="1200" dirty="0" smtClean="0"/>
+              <a:t> in </a:t>
+            </a:r>
+            <a:r>
+              <a:rPr lang="nl-NL" sz="1200" dirty="0" err="1" smtClean="0"/>
+              <a:t>proprietary</a:t>
+            </a:r>
+            <a:r>
+              <a:rPr lang="nl-NL" sz="1200" dirty="0" smtClean="0"/>
+              <a:t> </a:t>
+            </a:r>
+            <a:r>
+              <a:rPr lang="nl-NL" sz="1200" dirty="0" err="1" smtClean="0"/>
+              <a:t>IoT</a:t>
+            </a:r>
+            <a:r>
+              <a:rPr lang="nl-NL" sz="1200" dirty="0" smtClean="0"/>
+              <a:t> CS JSON format); </a:t>
+            </a:r>
+            <a:r>
+              <a:rPr lang="nl-NL" sz="1200" dirty="0" err="1" smtClean="0"/>
+              <a:t>currently</a:t>
+            </a:r>
+            <a:r>
+              <a:rPr lang="nl-NL" sz="1200" dirty="0" smtClean="0"/>
+              <a:t> </a:t>
+            </a:r>
+            <a:r>
+              <a:rPr lang="nl-NL" sz="1200" dirty="0" err="1" smtClean="0"/>
+              <a:t>forwarded</a:t>
+            </a:r>
+            <a:r>
+              <a:rPr lang="nl-NL" sz="1200" dirty="0" smtClean="0"/>
+              <a:t> </a:t>
+            </a:r>
+            <a:r>
+              <a:rPr lang="nl-NL" sz="1200" dirty="0" err="1" smtClean="0"/>
+              <a:t>to</a:t>
+            </a:r>
+            <a:r>
+              <a:rPr lang="nl-NL" sz="1200" dirty="0" smtClean="0"/>
+              <a:t> SOA CS – </a:t>
+            </a:r>
+            <a:r>
+              <a:rPr lang="nl-NL" sz="1200" dirty="0" err="1" smtClean="0"/>
+              <a:t>eventually</a:t>
+            </a:r>
+            <a:r>
+              <a:rPr lang="nl-NL" sz="1200" dirty="0" smtClean="0"/>
+              <a:t> </a:t>
+            </a:r>
+            <a:r>
+              <a:rPr lang="nl-NL" sz="1200" dirty="0" err="1" smtClean="0"/>
+              <a:t>routed</a:t>
+            </a:r>
+            <a:r>
+              <a:rPr lang="nl-NL" sz="1200" dirty="0" smtClean="0"/>
+              <a:t> </a:t>
+            </a:r>
+            <a:r>
+              <a:rPr lang="nl-NL" sz="1200" dirty="0" err="1" smtClean="0"/>
+              <a:t>to</a:t>
+            </a:r>
+            <a:r>
+              <a:rPr lang="nl-NL" sz="1200" dirty="0" smtClean="0"/>
+              <a:t> PCS</a:t>
+            </a:r>
+            <a:endParaRPr lang="en-US" sz="1200" dirty="0"/>
+          </a:p>
+        </p:txBody>
+      </p:sp>
+      <p:pic>
+        <p:nvPicPr>
+          <p:cNvPr id="1029" name="Picture 5"/>
+          <p:cNvPicPr>
+            <a:picLocks noChangeAspect="1" noChangeArrowheads="1"/>
+          </p:cNvPicPr>
+          <p:nvPr/>
+        </p:nvPicPr>
+        <p:blipFill>
+          <a:blip r:embed="rId5">
+            <a:extLst>
+              <a:ext uri="{28A0092B-C50C-407E-A947-70E740481C1C}">
+                <a14:useLocalDpi xmlns:a14="http://schemas.microsoft.com/office/drawing/2010/main" val="0"/>
+              </a:ext>
+            </a:extLst>
+          </a:blip>
+          <a:srcRect/>
+          <a:stretch>
+            <a:fillRect/>
+          </a:stretch>
+        </p:blipFill>
+        <p:spPr bwMode="auto">
+          <a:xfrm>
+            <a:off x="5307272" y="2711013"/>
+            <a:ext cx="2264664" cy="549932"/>
+          </a:xfrm>
+          <a:prstGeom prst="rect">
+            <a:avLst/>
+          </a:prstGeom>
+          <a:ln>
+            <a:noFill/>
+          </a:ln>
+          <a:effectLst>
+            <a:outerShdw blurRad="292100" dist="139700" dir="2700000" algn="tl" rotWithShape="0">
+              <a:srgbClr val="333333">
+                <a:alpha val="65000"/>
+              </a:srgbClr>
+            </a:outerShdw>
+          </a:effectLst>
+          <a:extLst>
+            <a:ext uri="{909E8E84-426E-40DD-AFC4-6F175D3DCCD1}">
+              <a14:hiddenFill xmlns:a14="http://schemas.microsoft.com/office/drawing/2010/main">
+                <a:solidFill>
+                  <a:schemeClr val="accent1"/>
+                </a:solidFill>
+              </a14:hiddenFill>
+            </a:ext>
+            <a:ext uri="{91240B29-F687-4F45-9708-019B960494DF}">
+              <a14:hiddenLine xmlns:a14="http://schemas.microsoft.com/office/drawing/2010/main" w="9525">
+                <a:solidFill>
+                  <a:schemeClr val="tx1"/>
+                </a:solidFill>
+                <a:miter lim="800000"/>
+                <a:headEnd/>
+                <a:tailEnd/>
+              </a14:hiddenLine>
+            </a:ext>
+          </a:extLst>
+        </p:spPr>
+      </p:pic>
+      <p:sp>
+        <p:nvSpPr>
+          <p:cNvPr id="47" name="Rectangular Callout 46"/>
+          <p:cNvSpPr/>
+          <p:nvPr/>
+        </p:nvSpPr>
+        <p:spPr>
+          <a:xfrm>
+            <a:off x="6114642" y="1325491"/>
+            <a:ext cx="2705830" cy="533873"/>
+          </a:xfrm>
+          <a:prstGeom prst="wedgeRectCallout">
+            <a:avLst>
+              <a:gd name="adj1" fmla="val -59246"/>
+              <a:gd name="adj2" fmla="val 214622"/>
+            </a:avLst>
+          </a:prstGeom>
+        </p:spPr>
+        <p:style>
+          <a:lnRef idx="2">
+            <a:schemeClr val="accent6">
+              <a:shade val="50000"/>
+            </a:schemeClr>
+          </a:lnRef>
+          <a:fillRef idx="1">
+            <a:schemeClr val="accent6"/>
+          </a:fillRef>
+          <a:effectRef idx="0">
+            <a:schemeClr val="accent6"/>
+          </a:effectRef>
+          <a:fontRef idx="minor">
+            <a:schemeClr val="lt1"/>
+          </a:fontRef>
+        </p:style>
+        <p:txBody>
+          <a:bodyPr rtlCol="0" anchor="ctr"/>
+          <a:lstStyle/>
+          <a:p>
+            <a:pPr algn="ctr"/>
+            <a:r>
+              <a:rPr lang="nl-NL" sz="1200" dirty="0" smtClean="0"/>
+              <a:t>SOAP</a:t>
+            </a:r>
+          </a:p>
+          <a:p>
+            <a:pPr algn="ctr"/>
+            <a:r>
+              <a:rPr lang="nl-NL" sz="1200" dirty="0" smtClean="0"/>
+              <a:t>(returns Y or N </a:t>
+            </a:r>
+            <a:r>
+              <a:rPr lang="nl-NL" sz="1200" dirty="0" err="1" smtClean="0"/>
+              <a:t>depending</a:t>
+            </a:r>
+            <a:r>
+              <a:rPr lang="nl-NL" sz="1200" dirty="0" smtClean="0"/>
+              <a:t> on </a:t>
+            </a:r>
+            <a:r>
+              <a:rPr lang="nl-NL" sz="1200" dirty="0" err="1" smtClean="0"/>
+              <a:t>whether</a:t>
+            </a:r>
+            <a:r>
+              <a:rPr lang="nl-NL" sz="1200" dirty="0" smtClean="0"/>
+              <a:t> a </a:t>
+            </a:r>
+            <a:r>
+              <a:rPr lang="nl-NL" sz="1200" dirty="0" err="1" smtClean="0"/>
+              <a:t>proposal</a:t>
+            </a:r>
+            <a:r>
+              <a:rPr lang="nl-NL" sz="1200" dirty="0" smtClean="0"/>
+              <a:t> </a:t>
+            </a:r>
+            <a:r>
+              <a:rPr lang="nl-NL" sz="1200" dirty="0" err="1" smtClean="0"/>
+              <a:t>exists</a:t>
+            </a:r>
+            <a:r>
+              <a:rPr lang="nl-NL" sz="1200" dirty="0" smtClean="0"/>
+              <a:t> </a:t>
+            </a:r>
+            <a:r>
+              <a:rPr lang="nl-NL" sz="1200" dirty="0" err="1" smtClean="0"/>
+              <a:t>using</a:t>
+            </a:r>
+            <a:r>
+              <a:rPr lang="nl-NL" sz="1200" dirty="0" smtClean="0"/>
+              <a:t> SOA CS)</a:t>
+            </a:r>
+            <a:endParaRPr lang="en-US" sz="1200" dirty="0"/>
+          </a:p>
+        </p:txBody>
+      </p:sp>
+      <p:cxnSp>
+        <p:nvCxnSpPr>
+          <p:cNvPr id="43" name="Straight Arrow Connector 42"/>
+          <p:cNvCxnSpPr>
+            <a:endCxn id="11" idx="2"/>
+          </p:cNvCxnSpPr>
+          <p:nvPr/>
+        </p:nvCxnSpPr>
+        <p:spPr>
+          <a:xfrm flipV="1">
+            <a:off x="251520" y="3401998"/>
+            <a:ext cx="4068452" cy="781162"/>
+          </a:xfrm>
+          <a:prstGeom prst="straightConnector1">
+            <a:avLst/>
+          </a:prstGeom>
+          <a:ln w="19050">
+            <a:solidFill>
+              <a:schemeClr val="accent2">
+                <a:lumMod val="50000"/>
+              </a:schemeClr>
+            </a:solidFill>
+            <a:tailEnd type="arrow"/>
+          </a:ln>
+        </p:spPr>
+        <p:style>
+          <a:lnRef idx="1">
+            <a:schemeClr val="accent1"/>
+          </a:lnRef>
+          <a:fillRef idx="0">
+            <a:schemeClr val="accent1"/>
+          </a:fillRef>
+          <a:effectRef idx="0">
+            <a:schemeClr val="accent1"/>
+          </a:effectRef>
+          <a:fontRef idx="minor">
+            <a:schemeClr val="tx1"/>
+          </a:fontRef>
+        </p:style>
+      </p:cxnSp>
+      <p:sp>
+        <p:nvSpPr>
+          <p:cNvPr id="52" name="Cube 51"/>
+          <p:cNvSpPr/>
+          <p:nvPr/>
+        </p:nvSpPr>
+        <p:spPr>
+          <a:xfrm>
+            <a:off x="4472372" y="3419382"/>
+            <a:ext cx="216024" cy="216025"/>
+          </a:xfrm>
+          <a:prstGeom prst="cube">
+            <a:avLst/>
+          </a:prstGeom>
+        </p:spPr>
+        <p:style>
+          <a:lnRef idx="2">
+            <a:schemeClr val="accent1">
+              <a:shade val="50000"/>
+            </a:schemeClr>
+          </a:lnRef>
+          <a:fillRef idx="1">
+            <a:schemeClr val="accent1"/>
+          </a:fillRef>
+          <a:effectRef idx="0">
+            <a:schemeClr val="accent1"/>
+          </a:effectRef>
+          <a:fontRef idx="minor">
+            <a:schemeClr val="lt1"/>
+          </a:fontRef>
+        </p:style>
+        <p:txBody>
+          <a:bodyPr rtlCol="0" anchor="ctr"/>
+          <a:lstStyle/>
+          <a:p>
+            <a:pPr algn="ctr"/>
+            <a:endParaRPr lang="en-US"/>
+          </a:p>
+        </p:txBody>
+      </p:sp>
+      <p:sp>
+        <p:nvSpPr>
+          <p:cNvPr id="53" name="Cube 52"/>
+          <p:cNvSpPr/>
+          <p:nvPr/>
+        </p:nvSpPr>
+        <p:spPr>
+          <a:xfrm>
+            <a:off x="4912045" y="3391071"/>
+            <a:ext cx="216024" cy="216025"/>
+          </a:xfrm>
+          <a:prstGeom prst="cube">
+            <a:avLst/>
+          </a:prstGeom>
+        </p:spPr>
+        <p:style>
+          <a:lnRef idx="2">
+            <a:schemeClr val="accent1">
+              <a:shade val="50000"/>
+            </a:schemeClr>
+          </a:lnRef>
+          <a:fillRef idx="1">
+            <a:schemeClr val="accent1"/>
+          </a:fillRef>
+          <a:effectRef idx="0">
+            <a:schemeClr val="accent1"/>
+          </a:effectRef>
+          <a:fontRef idx="minor">
+            <a:schemeClr val="lt1"/>
+          </a:fontRef>
+        </p:style>
+        <p:txBody>
+          <a:bodyPr rtlCol="0" anchor="ctr"/>
+          <a:lstStyle/>
+          <a:p>
+            <a:pPr algn="ctr"/>
+            <a:endParaRPr lang="en-US"/>
+          </a:p>
+        </p:txBody>
+      </p:sp>
+      <p:pic>
+        <p:nvPicPr>
+          <p:cNvPr id="1028" name="Picture 4"/>
+          <p:cNvPicPr>
+            <a:picLocks noChangeAspect="1" noChangeArrowheads="1"/>
+          </p:cNvPicPr>
+          <p:nvPr/>
+        </p:nvPicPr>
+        <p:blipFill>
+          <a:blip r:embed="rId6">
+            <a:extLst>
+              <a:ext uri="{28A0092B-C50C-407E-A947-70E740481C1C}">
+                <a14:useLocalDpi xmlns:a14="http://schemas.microsoft.com/office/drawing/2010/main" val="0"/>
+              </a:ext>
+            </a:extLst>
+          </a:blip>
+          <a:srcRect/>
+          <a:stretch>
+            <a:fillRect/>
+          </a:stretch>
+        </p:blipFill>
+        <p:spPr bwMode="auto">
+          <a:xfrm>
+            <a:off x="1689642" y="3454147"/>
+            <a:ext cx="1804282" cy="658143"/>
+          </a:xfrm>
+          <a:prstGeom prst="rect">
+            <a:avLst/>
+          </a:prstGeom>
+          <a:ln>
+            <a:noFill/>
+          </a:ln>
+          <a:effectLst>
+            <a:outerShdw blurRad="292100" dist="139700" dir="2700000" algn="tl" rotWithShape="0">
+              <a:srgbClr val="333333">
+                <a:alpha val="65000"/>
+              </a:srgbClr>
+            </a:outerShdw>
+          </a:effectLst>
+          <a:extLst>
+            <a:ext uri="{909E8E84-426E-40DD-AFC4-6F175D3DCCD1}">
+              <a14:hiddenFill xmlns:a14="http://schemas.microsoft.com/office/drawing/2010/main">
+                <a:solidFill>
+                  <a:schemeClr val="accent1"/>
+                </a:solidFill>
+              </a14:hiddenFill>
+            </a:ext>
+            <a:ext uri="{91240B29-F687-4F45-9708-019B960494DF}">
+              <a14:hiddenLine xmlns:a14="http://schemas.microsoft.com/office/drawing/2010/main" w="9525">
+                <a:solidFill>
+                  <a:schemeClr val="tx1"/>
+                </a:solidFill>
+                <a:miter lim="800000"/>
+                <a:headEnd/>
+                <a:tailEnd/>
+              </a14:hiddenLine>
+            </a:ext>
+          </a:extLst>
+        </p:spPr>
+      </p:pic>
+      <p:sp>
+        <p:nvSpPr>
+          <p:cNvPr id="49" name="Rectangular Callout 48"/>
+          <p:cNvSpPr/>
+          <p:nvPr/>
+        </p:nvSpPr>
+        <p:spPr>
+          <a:xfrm>
+            <a:off x="0" y="4560623"/>
+            <a:ext cx="2819127" cy="1023199"/>
+          </a:xfrm>
+          <a:prstGeom prst="wedgeRectCallout">
+            <a:avLst>
+              <a:gd name="adj1" fmla="val 28028"/>
+              <a:gd name="adj2" fmla="val -109862"/>
+            </a:avLst>
+          </a:prstGeom>
+        </p:spPr>
+        <p:style>
+          <a:lnRef idx="2">
+            <a:schemeClr val="accent6">
+              <a:shade val="50000"/>
+            </a:schemeClr>
+          </a:lnRef>
+          <a:fillRef idx="1">
+            <a:schemeClr val="accent6"/>
+          </a:fillRef>
+          <a:effectRef idx="0">
+            <a:schemeClr val="accent6"/>
+          </a:effectRef>
+          <a:fontRef idx="minor">
+            <a:schemeClr val="lt1"/>
+          </a:fontRef>
+        </p:style>
+        <p:txBody>
+          <a:bodyPr rtlCol="0" anchor="ctr"/>
+          <a:lstStyle/>
+          <a:p>
+            <a:pPr algn="ctr"/>
+            <a:r>
+              <a:rPr lang="nl-NL" sz="1200" dirty="0" smtClean="0"/>
+              <a:t>REST</a:t>
+            </a:r>
+            <a:endParaRPr lang="nl-NL" sz="1200" dirty="0"/>
+          </a:p>
+          <a:p>
+            <a:pPr algn="ctr"/>
+            <a:r>
+              <a:rPr lang="nl-NL" sz="1200" dirty="0" smtClean="0"/>
+              <a:t>(</a:t>
+            </a:r>
+            <a:r>
+              <a:rPr lang="nl-NL" sz="1200" dirty="0" err="1" smtClean="0"/>
+              <a:t>submit</a:t>
+            </a:r>
+            <a:r>
+              <a:rPr lang="nl-NL" sz="1200" dirty="0" smtClean="0"/>
+              <a:t> a </a:t>
+            </a:r>
+            <a:r>
+              <a:rPr lang="nl-NL" sz="1200" dirty="0" err="1" smtClean="0"/>
+              <a:t>proposal</a:t>
+            </a:r>
+            <a:r>
+              <a:rPr lang="nl-NL" sz="1200" dirty="0" smtClean="0"/>
+              <a:t> for </a:t>
+            </a:r>
+            <a:r>
+              <a:rPr lang="nl-NL" sz="1200" dirty="0" err="1" smtClean="0"/>
+              <a:t>an</a:t>
+            </a:r>
+            <a:r>
+              <a:rPr lang="nl-NL" sz="1200" dirty="0" smtClean="0"/>
+              <a:t> artist in  decent JSON format; </a:t>
+            </a:r>
+            <a:r>
+              <a:rPr lang="nl-NL" sz="1200" dirty="0" err="1" smtClean="0"/>
+              <a:t>currently</a:t>
+            </a:r>
+            <a:r>
+              <a:rPr lang="nl-NL" sz="1200" dirty="0" smtClean="0"/>
+              <a:t> links </a:t>
+            </a:r>
+            <a:r>
+              <a:rPr lang="nl-NL" sz="1200" dirty="0" err="1" smtClean="0"/>
+              <a:t>to</a:t>
+            </a:r>
+            <a:r>
+              <a:rPr lang="nl-NL" sz="1200" dirty="0" smtClean="0"/>
+              <a:t> SOA CS </a:t>
+            </a:r>
+            <a:r>
+              <a:rPr lang="nl-NL" sz="1200" dirty="0" err="1" smtClean="0"/>
+              <a:t>to</a:t>
+            </a:r>
+            <a:r>
+              <a:rPr lang="nl-NL" sz="1200" dirty="0" smtClean="0"/>
+              <a:t> </a:t>
+            </a:r>
+            <a:r>
+              <a:rPr lang="nl-NL" sz="1200" dirty="0" err="1" smtClean="0"/>
+              <a:t>create</a:t>
+            </a:r>
+            <a:r>
+              <a:rPr lang="nl-NL" sz="1200" dirty="0" smtClean="0"/>
+              <a:t> community </a:t>
+            </a:r>
+            <a:r>
+              <a:rPr lang="nl-NL" sz="1200" dirty="0" err="1" smtClean="0"/>
+              <a:t>derived</a:t>
+            </a:r>
+            <a:r>
+              <a:rPr lang="nl-NL" sz="1200" dirty="0" smtClean="0"/>
+              <a:t> artist </a:t>
+            </a:r>
+            <a:r>
+              <a:rPr lang="nl-NL" sz="1200" dirty="0" err="1" smtClean="0"/>
+              <a:t>proposal</a:t>
+            </a:r>
+            <a:r>
+              <a:rPr lang="nl-NL" sz="1200" dirty="0" smtClean="0"/>
+              <a:t>; later </a:t>
+            </a:r>
+            <a:r>
+              <a:rPr lang="nl-NL" sz="1200" dirty="0" err="1" smtClean="0"/>
+              <a:t>to</a:t>
+            </a:r>
+            <a:r>
+              <a:rPr lang="nl-NL" sz="1200" dirty="0" smtClean="0"/>
+              <a:t> </a:t>
+            </a:r>
+            <a:r>
+              <a:rPr lang="nl-NL" sz="1200" dirty="0" err="1" smtClean="0"/>
+              <a:t>be</a:t>
+            </a:r>
+            <a:r>
+              <a:rPr lang="nl-NL" sz="1200" dirty="0" smtClean="0"/>
+              <a:t> </a:t>
+            </a:r>
+            <a:r>
+              <a:rPr lang="nl-NL" sz="1200" dirty="0" err="1" smtClean="0"/>
+              <a:t>rerouted</a:t>
+            </a:r>
+            <a:r>
+              <a:rPr lang="nl-NL" sz="1200" dirty="0" smtClean="0"/>
+              <a:t> </a:t>
+            </a:r>
+            <a:r>
+              <a:rPr lang="nl-NL" sz="1200" dirty="0" err="1" smtClean="0"/>
+              <a:t>to</a:t>
+            </a:r>
+            <a:r>
+              <a:rPr lang="nl-NL" sz="1200" dirty="0" smtClean="0"/>
+              <a:t> PCS</a:t>
+            </a:r>
+            <a:endParaRPr lang="en-US" sz="1200" dirty="0"/>
+          </a:p>
+        </p:txBody>
+      </p:sp>
+      <p:pic>
+        <p:nvPicPr>
+          <p:cNvPr id="1030" name="Picture 6"/>
+          <p:cNvPicPr>
+            <a:picLocks noChangeAspect="1" noChangeArrowheads="1"/>
+          </p:cNvPicPr>
+          <p:nvPr/>
+        </p:nvPicPr>
+        <p:blipFill>
+          <a:blip r:embed="rId7">
+            <a:extLst>
+              <a:ext uri="{28A0092B-C50C-407E-A947-70E740481C1C}">
+                <a14:useLocalDpi xmlns:a14="http://schemas.microsoft.com/office/drawing/2010/main" val="0"/>
+              </a:ext>
+            </a:extLst>
+          </a:blip>
+          <a:srcRect/>
+          <a:stretch>
+            <a:fillRect/>
+          </a:stretch>
+        </p:blipFill>
+        <p:spPr bwMode="auto">
+          <a:xfrm>
+            <a:off x="4952509" y="3906775"/>
+            <a:ext cx="2283787" cy="545835"/>
+          </a:xfrm>
+          <a:prstGeom prst="rect">
+            <a:avLst/>
+          </a:prstGeom>
+          <a:ln>
+            <a:noFill/>
+          </a:ln>
+          <a:effectLst>
+            <a:outerShdw blurRad="292100" dist="139700" dir="2700000" algn="tl" rotWithShape="0">
+              <a:srgbClr val="333333">
+                <a:alpha val="65000"/>
+              </a:srgbClr>
+            </a:outerShdw>
+          </a:effectLst>
+          <a:extLst>
+            <a:ext uri="{909E8E84-426E-40DD-AFC4-6F175D3DCCD1}">
+              <a14:hiddenFill xmlns:a14="http://schemas.microsoft.com/office/drawing/2010/main">
+                <a:solidFill>
+                  <a:schemeClr val="accent1"/>
+                </a:solidFill>
+              </a14:hiddenFill>
+            </a:ext>
+            <a:ext uri="{91240B29-F687-4F45-9708-019B960494DF}">
+              <a14:hiddenLine xmlns:a14="http://schemas.microsoft.com/office/drawing/2010/main" w="9525">
+                <a:solidFill>
+                  <a:schemeClr val="tx1"/>
+                </a:solidFill>
+                <a:miter lim="800000"/>
+                <a:headEnd/>
+                <a:tailEnd/>
+              </a14:hiddenLine>
+            </a:ext>
+          </a:extLst>
+        </p:spPr>
+      </p:pic>
+      <p:sp>
+        <p:nvSpPr>
+          <p:cNvPr id="40" name="Rectangular Callout 39"/>
+          <p:cNvSpPr/>
+          <p:nvPr/>
+        </p:nvSpPr>
+        <p:spPr>
+          <a:xfrm>
+            <a:off x="6703220" y="4918598"/>
+            <a:ext cx="2107239" cy="814658"/>
+          </a:xfrm>
+          <a:prstGeom prst="wedgeRectCallout">
+            <a:avLst>
+              <a:gd name="adj1" fmla="val -60175"/>
+              <a:gd name="adj2" fmla="val -118004"/>
+            </a:avLst>
+          </a:prstGeom>
+        </p:spPr>
+        <p:style>
+          <a:lnRef idx="2">
+            <a:schemeClr val="accent6">
+              <a:shade val="50000"/>
+            </a:schemeClr>
+          </a:lnRef>
+          <a:fillRef idx="1">
+            <a:schemeClr val="accent6"/>
+          </a:fillRef>
+          <a:effectRef idx="0">
+            <a:schemeClr val="accent6"/>
+          </a:effectRef>
+          <a:fontRef idx="minor">
+            <a:schemeClr val="lt1"/>
+          </a:fontRef>
+        </p:style>
+        <p:txBody>
+          <a:bodyPr rtlCol="0" anchor="ctr"/>
+          <a:lstStyle/>
+          <a:p>
+            <a:pPr algn="ctr"/>
+            <a:r>
+              <a:rPr lang="nl-NL" sz="1200" dirty="0"/>
+              <a:t>SOAP</a:t>
+            </a:r>
+          </a:p>
+          <a:p>
+            <a:pPr algn="ctr"/>
+            <a:r>
+              <a:rPr lang="nl-NL" sz="1200" dirty="0" smtClean="0"/>
+              <a:t>(calls </a:t>
+            </a:r>
+            <a:r>
+              <a:rPr lang="nl-NL" sz="1200" dirty="0" err="1" smtClean="0"/>
+              <a:t>to</a:t>
+            </a:r>
+            <a:r>
+              <a:rPr lang="nl-NL" sz="1200" dirty="0" smtClean="0"/>
+              <a:t> SOA CS </a:t>
+            </a:r>
+            <a:r>
+              <a:rPr lang="nl-NL" sz="1200" dirty="0" err="1" smtClean="0"/>
+              <a:t>to</a:t>
+            </a:r>
+            <a:r>
+              <a:rPr lang="nl-NL" sz="1200" dirty="0" smtClean="0"/>
+              <a:t> </a:t>
+            </a:r>
+            <a:r>
+              <a:rPr lang="nl-NL" sz="1200" dirty="0" err="1" smtClean="0"/>
+              <a:t>create</a:t>
+            </a:r>
+            <a:r>
+              <a:rPr lang="nl-NL" sz="1200" dirty="0" smtClean="0"/>
+              <a:t> </a:t>
+            </a:r>
+            <a:r>
+              <a:rPr lang="nl-NL" sz="1200" dirty="0" err="1"/>
+              <a:t>enriched</a:t>
+            </a:r>
+            <a:r>
+              <a:rPr lang="nl-NL" sz="1200" dirty="0"/>
+              <a:t> </a:t>
+            </a:r>
+            <a:r>
+              <a:rPr lang="nl-NL" sz="1200" dirty="0" err="1"/>
+              <a:t>proposal</a:t>
+            </a:r>
+            <a:r>
+              <a:rPr lang="nl-NL" sz="1200" dirty="0"/>
+              <a:t> in </a:t>
+            </a:r>
+            <a:r>
+              <a:rPr lang="nl-NL" sz="1200" dirty="0" smtClean="0"/>
+              <a:t>DB; </a:t>
+            </a:r>
+            <a:r>
+              <a:rPr lang="nl-NL" sz="1200" dirty="0" err="1" smtClean="0"/>
+              <a:t>this</a:t>
+            </a:r>
+            <a:r>
+              <a:rPr lang="nl-NL" sz="1200" dirty="0" smtClean="0"/>
+              <a:t> service is </a:t>
+            </a:r>
+            <a:r>
+              <a:rPr lang="nl-NL" sz="1200" dirty="0" err="1" smtClean="0"/>
+              <a:t>to</a:t>
+            </a:r>
+            <a:r>
+              <a:rPr lang="nl-NL" sz="1200" dirty="0" smtClean="0"/>
+              <a:t> </a:t>
+            </a:r>
+            <a:r>
+              <a:rPr lang="nl-NL" sz="1200" dirty="0" err="1" smtClean="0"/>
+              <a:t>be</a:t>
+            </a:r>
+            <a:r>
+              <a:rPr lang="nl-NL" sz="1200" dirty="0" smtClean="0"/>
+              <a:t> </a:t>
+            </a:r>
+            <a:r>
+              <a:rPr lang="nl-NL" sz="1200" dirty="0" err="1" smtClean="0"/>
+              <a:t>called</a:t>
+            </a:r>
+            <a:r>
+              <a:rPr lang="nl-NL" sz="1200" dirty="0" smtClean="0"/>
+              <a:t> </a:t>
+            </a:r>
+            <a:r>
+              <a:rPr lang="nl-NL" sz="1200" dirty="0" err="1" smtClean="0"/>
+              <a:t>by</a:t>
+            </a:r>
+            <a:r>
+              <a:rPr lang="nl-NL" sz="1200" dirty="0" smtClean="0"/>
+              <a:t> PCS)</a:t>
+            </a:r>
+            <a:endParaRPr lang="en-US" sz="1200" dirty="0"/>
+          </a:p>
+        </p:txBody>
+      </p:sp>
+      <p:pic>
+        <p:nvPicPr>
+          <p:cNvPr id="1031" name="Picture 7"/>
+          <p:cNvPicPr>
+            <a:picLocks noChangeAspect="1" noChangeArrowheads="1"/>
+          </p:cNvPicPr>
+          <p:nvPr/>
+        </p:nvPicPr>
+        <p:blipFill>
+          <a:blip r:embed="rId8">
+            <a:extLst>
+              <a:ext uri="{28A0092B-C50C-407E-A947-70E740481C1C}">
+                <a14:useLocalDpi xmlns:a14="http://schemas.microsoft.com/office/drawing/2010/main" val="0"/>
+              </a:ext>
+            </a:extLst>
+          </a:blip>
+          <a:srcRect/>
+          <a:stretch>
+            <a:fillRect/>
+          </a:stretch>
+        </p:blipFill>
+        <p:spPr bwMode="auto">
+          <a:xfrm>
+            <a:off x="4223918" y="4333662"/>
+            <a:ext cx="1373370" cy="584936"/>
+          </a:xfrm>
+          <a:prstGeom prst="rect">
+            <a:avLst/>
+          </a:prstGeom>
+          <a:ln>
+            <a:noFill/>
+          </a:ln>
+          <a:effectLst>
+            <a:outerShdw blurRad="292100" dist="139700" dir="2700000" algn="tl" rotWithShape="0">
+              <a:srgbClr val="333333">
+                <a:alpha val="65000"/>
+              </a:srgbClr>
+            </a:outerShdw>
+          </a:effectLst>
+          <a:extLst>
+            <a:ext uri="{909E8E84-426E-40DD-AFC4-6F175D3DCCD1}">
+              <a14:hiddenFill xmlns:a14="http://schemas.microsoft.com/office/drawing/2010/main">
+                <a:solidFill>
+                  <a:schemeClr val="accent1"/>
+                </a:solidFill>
+              </a14:hiddenFill>
+            </a:ext>
+            <a:ext uri="{91240B29-F687-4F45-9708-019B960494DF}">
+              <a14:hiddenLine xmlns:a14="http://schemas.microsoft.com/office/drawing/2010/main" w="9525">
+                <a:solidFill>
+                  <a:schemeClr val="tx1"/>
+                </a:solidFill>
+                <a:miter lim="800000"/>
+                <a:headEnd/>
+                <a:tailEnd/>
+              </a14:hiddenLine>
+            </a:ext>
+          </a:extLst>
+        </p:spPr>
+      </p:pic>
+      <p:sp>
+        <p:nvSpPr>
+          <p:cNvPr id="63" name="Rectangular Callout 62"/>
+          <p:cNvSpPr/>
+          <p:nvPr/>
+        </p:nvSpPr>
+        <p:spPr>
+          <a:xfrm>
+            <a:off x="5141504" y="5583822"/>
+            <a:ext cx="2107239" cy="612068"/>
+          </a:xfrm>
+          <a:prstGeom prst="wedgeRectCallout">
+            <a:avLst>
+              <a:gd name="adj1" fmla="val -43548"/>
+              <a:gd name="adj2" fmla="val -167957"/>
+            </a:avLst>
+          </a:prstGeom>
+        </p:spPr>
+        <p:style>
+          <a:lnRef idx="2">
+            <a:schemeClr val="accent6">
+              <a:shade val="50000"/>
+            </a:schemeClr>
+          </a:lnRef>
+          <a:fillRef idx="1">
+            <a:schemeClr val="accent6"/>
+          </a:fillRef>
+          <a:effectRef idx="0">
+            <a:schemeClr val="accent6"/>
+          </a:effectRef>
+          <a:fontRef idx="minor">
+            <a:schemeClr val="lt1"/>
+          </a:fontRef>
+        </p:style>
+        <p:txBody>
+          <a:bodyPr rtlCol="0" anchor="ctr"/>
+          <a:lstStyle/>
+          <a:p>
+            <a:pPr algn="ctr"/>
+            <a:r>
+              <a:rPr lang="nl-NL" sz="1200" dirty="0" smtClean="0"/>
+              <a:t>REST API</a:t>
+            </a:r>
+            <a:endParaRPr lang="nl-NL" sz="1200" dirty="0"/>
+          </a:p>
+          <a:p>
+            <a:pPr algn="ctr"/>
+            <a:r>
+              <a:rPr lang="nl-NL" sz="1200" dirty="0" smtClean="0"/>
+              <a:t>(calls </a:t>
+            </a:r>
+            <a:r>
+              <a:rPr lang="nl-NL" sz="1200" dirty="0" err="1" smtClean="0"/>
+              <a:t>to</a:t>
+            </a:r>
+            <a:r>
+              <a:rPr lang="nl-NL" sz="1200" dirty="0" smtClean="0"/>
+              <a:t> SOA CS </a:t>
+            </a:r>
+            <a:r>
+              <a:rPr lang="nl-NL" sz="1200" dirty="0" err="1" smtClean="0"/>
+              <a:t>to</a:t>
+            </a:r>
+            <a:r>
+              <a:rPr lang="nl-NL" sz="1200" dirty="0" smtClean="0"/>
+              <a:t> </a:t>
+            </a:r>
+            <a:r>
+              <a:rPr lang="nl-NL" sz="1200" dirty="0" err="1" smtClean="0"/>
+              <a:t>create</a:t>
+            </a:r>
+            <a:r>
+              <a:rPr lang="nl-NL" sz="1200" dirty="0" smtClean="0"/>
+              <a:t> </a:t>
+            </a:r>
+            <a:r>
+              <a:rPr lang="nl-NL" sz="1200" dirty="0" err="1"/>
+              <a:t>enriched</a:t>
+            </a:r>
+            <a:r>
+              <a:rPr lang="nl-NL" sz="1200" dirty="0"/>
+              <a:t> </a:t>
+            </a:r>
+            <a:r>
+              <a:rPr lang="nl-NL" sz="1200" dirty="0" err="1"/>
+              <a:t>proposal</a:t>
+            </a:r>
+            <a:r>
+              <a:rPr lang="nl-NL" sz="1200" dirty="0"/>
+              <a:t> in </a:t>
+            </a:r>
+            <a:r>
+              <a:rPr lang="nl-NL" sz="1200" dirty="0" smtClean="0"/>
+              <a:t>DB)</a:t>
+            </a:r>
+            <a:endParaRPr lang="en-US" sz="1200" dirty="0"/>
+          </a:p>
+        </p:txBody>
+      </p:sp>
+    </p:spTree>
+    <p:extLst>
+      <p:ext uri="{BB962C8B-B14F-4D97-AF65-F5344CB8AC3E}">
+        <p14:creationId xmlns:p14="http://schemas.microsoft.com/office/powerpoint/2010/main" val="2748570154"/>
+      </p:ext>
+    </p:extLst>
+  </p:cSld>
+  <p:clrMapOvr>
+    <a:masterClrMapping/>
+  </p:clrMapOvr>
+</p:sld>
+</file>
+
 <file path=ppt/theme/theme1.xml><?xml version="1.0" encoding="utf-8"?>
 <a:theme xmlns:a="http://schemas.openxmlformats.org/drawingml/2006/main" name="Office Theme">
   <a:themeElements>

</xml_diff>

<commit_message>
Added IoT CS dropoff with route to PCS on slide about ICS
</commit_message>
<xml_diff>
--- a/ofmw-forum2016-valencia-demo.pptx
+++ b/ofmw-forum2016-valencia-demo.pptx
@@ -294,7 +294,7 @@
           <a:p>
             <a:fld id="{8A80D3F4-BE92-40ED-BB36-22F03F9BF743}" type="datetimeFigureOut">
               <a:rPr lang="en-US" smtClean="0"/>
-              <a:t>3/4/2016</a:t>
+              <a:t>3/6/2016</a:t>
             </a:fld>
             <a:endParaRPr lang="en-US"/>
           </a:p>
@@ -464,7 +464,7 @@
           <a:p>
             <a:fld id="{8A80D3F4-BE92-40ED-BB36-22F03F9BF743}" type="datetimeFigureOut">
               <a:rPr lang="en-US" smtClean="0"/>
-              <a:t>3/4/2016</a:t>
+              <a:t>3/6/2016</a:t>
             </a:fld>
             <a:endParaRPr lang="en-US"/>
           </a:p>
@@ -644,7 +644,7 @@
           <a:p>
             <a:fld id="{8A80D3F4-BE92-40ED-BB36-22F03F9BF743}" type="datetimeFigureOut">
               <a:rPr lang="en-US" smtClean="0"/>
-              <a:t>3/4/2016</a:t>
+              <a:t>3/6/2016</a:t>
             </a:fld>
             <a:endParaRPr lang="en-US"/>
           </a:p>
@@ -814,7 +814,7 @@
           <a:p>
             <a:fld id="{8A80D3F4-BE92-40ED-BB36-22F03F9BF743}" type="datetimeFigureOut">
               <a:rPr lang="en-US" smtClean="0"/>
-              <a:t>3/4/2016</a:t>
+              <a:t>3/6/2016</a:t>
             </a:fld>
             <a:endParaRPr lang="en-US"/>
           </a:p>
@@ -1060,7 +1060,7 @@
           <a:p>
             <a:fld id="{8A80D3F4-BE92-40ED-BB36-22F03F9BF743}" type="datetimeFigureOut">
               <a:rPr lang="en-US" smtClean="0"/>
-              <a:t>3/4/2016</a:t>
+              <a:t>3/6/2016</a:t>
             </a:fld>
             <a:endParaRPr lang="en-US"/>
           </a:p>
@@ -1348,7 +1348,7 @@
           <a:p>
             <a:fld id="{8A80D3F4-BE92-40ED-BB36-22F03F9BF743}" type="datetimeFigureOut">
               <a:rPr lang="en-US" smtClean="0"/>
-              <a:t>3/4/2016</a:t>
+              <a:t>3/6/2016</a:t>
             </a:fld>
             <a:endParaRPr lang="en-US"/>
           </a:p>
@@ -1770,7 +1770,7 @@
           <a:p>
             <a:fld id="{8A80D3F4-BE92-40ED-BB36-22F03F9BF743}" type="datetimeFigureOut">
               <a:rPr lang="en-US" smtClean="0"/>
-              <a:t>3/4/2016</a:t>
+              <a:t>3/6/2016</a:t>
             </a:fld>
             <a:endParaRPr lang="en-US"/>
           </a:p>
@@ -1888,7 +1888,7 @@
           <a:p>
             <a:fld id="{8A80D3F4-BE92-40ED-BB36-22F03F9BF743}" type="datetimeFigureOut">
               <a:rPr lang="en-US" smtClean="0"/>
-              <a:t>3/4/2016</a:t>
+              <a:t>3/6/2016</a:t>
             </a:fld>
             <a:endParaRPr lang="en-US"/>
           </a:p>
@@ -1983,7 +1983,7 @@
           <a:p>
             <a:fld id="{8A80D3F4-BE92-40ED-BB36-22F03F9BF743}" type="datetimeFigureOut">
               <a:rPr lang="en-US" smtClean="0"/>
-              <a:t>3/4/2016</a:t>
+              <a:t>3/6/2016</a:t>
             </a:fld>
             <a:endParaRPr lang="en-US"/>
           </a:p>
@@ -2260,7 +2260,7 @@
           <a:p>
             <a:fld id="{8A80D3F4-BE92-40ED-BB36-22F03F9BF743}" type="datetimeFigureOut">
               <a:rPr lang="en-US" smtClean="0"/>
-              <a:t>3/4/2016</a:t>
+              <a:t>3/6/2016</a:t>
             </a:fld>
             <a:endParaRPr lang="en-US"/>
           </a:p>
@@ -2513,7 +2513,7 @@
           <a:p>
             <a:fld id="{8A80D3F4-BE92-40ED-BB36-22F03F9BF743}" type="datetimeFigureOut">
               <a:rPr lang="en-US" smtClean="0"/>
-              <a:t>3/4/2016</a:t>
+              <a:t>3/6/2016</a:t>
             </a:fld>
             <a:endParaRPr lang="en-US"/>
           </a:p>
@@ -2726,7 +2726,7 @@
           <a:p>
             <a:fld id="{8A80D3F4-BE92-40ED-BB36-22F03F9BF743}" type="datetimeFigureOut">
               <a:rPr lang="en-US" smtClean="0"/>
-              <a:t>3/4/2016</a:t>
+              <a:t>3/6/2016</a:t>
             </a:fld>
             <a:endParaRPr lang="en-US"/>
           </a:p>
@@ -12446,48 +12446,6 @@
           </a:p>
         </p:txBody>
       </p:sp>
-      <p:sp>
-        <p:nvSpPr>
-          <p:cNvPr id="41" name="Rounded Rectangle 40"/>
-          <p:cNvSpPr/>
-          <p:nvPr/>
-        </p:nvSpPr>
-        <p:spPr>
-          <a:xfrm>
-            <a:off x="4932039" y="5949280"/>
-            <a:ext cx="720081" cy="432048"/>
-          </a:xfrm>
-          <a:prstGeom prst="roundRect">
-            <a:avLst/>
-          </a:prstGeom>
-        </p:spPr>
-        <p:style>
-          <a:lnRef idx="1">
-            <a:schemeClr val="accent2"/>
-          </a:lnRef>
-          <a:fillRef idx="2">
-            <a:schemeClr val="accent2"/>
-          </a:fillRef>
-          <a:effectRef idx="1">
-            <a:schemeClr val="accent2"/>
-          </a:effectRef>
-          <a:fontRef idx="minor">
-            <a:schemeClr val="dk1"/>
-          </a:fontRef>
-        </p:style>
-        <p:txBody>
-          <a:bodyPr rtlCol="0" anchor="ctr"/>
-          <a:lstStyle/>
-          <a:p>
-            <a:pPr algn="ctr"/>
-            <a:r>
-              <a:rPr lang="nl-NL" sz="1600" dirty="0" smtClean="0"/>
-              <a:t>ABCS</a:t>
-            </a:r>
-            <a:endParaRPr lang="en-US" sz="1600" dirty="0"/>
-          </a:p>
-        </p:txBody>
-      </p:sp>
       <p:cxnSp>
         <p:nvCxnSpPr>
           <p:cNvPr id="42" name="Elbow Connector 41"/>
@@ -12537,41 +12495,6 @@
           <a:xfrm flipV="1">
             <a:off x="5652120" y="4581128"/>
             <a:ext cx="1150137" cy="864096"/>
-          </a:xfrm>
-          <a:prstGeom prst="bentConnector2">
-            <a:avLst/>
-          </a:prstGeom>
-          <a:ln>
-            <a:tailEnd type="arrow"/>
-          </a:ln>
-        </p:spPr>
-        <p:style>
-          <a:lnRef idx="1">
-            <a:schemeClr val="accent1"/>
-          </a:lnRef>
-          <a:fillRef idx="0">
-            <a:schemeClr val="accent1"/>
-          </a:fillRef>
-          <a:effectRef idx="0">
-            <a:schemeClr val="accent1"/>
-          </a:effectRef>
-          <a:fontRef idx="minor">
-            <a:schemeClr val="tx1"/>
-          </a:fontRef>
-        </p:style>
-      </p:cxnSp>
-      <p:cxnSp>
-        <p:nvCxnSpPr>
-          <p:cNvPr id="46" name="Elbow Connector 45"/>
-          <p:cNvCxnSpPr>
-            <a:stCxn id="41" idx="3"/>
-          </p:cNvCxnSpPr>
-          <p:nvPr/>
-        </p:nvCxnSpPr>
-        <p:spPr>
-          <a:xfrm flipV="1">
-            <a:off x="5652120" y="4581128"/>
-            <a:ext cx="1413721" cy="1584176"/>
           </a:xfrm>
           <a:prstGeom prst="bentConnector2">
             <a:avLst/>
@@ -30116,17 +30039,17 @@
           </a:prstGeom>
         </p:spPr>
         <p:style>
-          <a:lnRef idx="1">
+          <a:lnRef idx="0">
             <a:schemeClr val="accent2"/>
           </a:lnRef>
-          <a:fillRef idx="2">
+          <a:fillRef idx="3">
             <a:schemeClr val="accent2"/>
           </a:fillRef>
-          <a:effectRef idx="1">
+          <a:effectRef idx="3">
             <a:schemeClr val="accent2"/>
           </a:effectRef>
           <a:fontRef idx="minor">
-            <a:schemeClr val="dk1"/>
+            <a:schemeClr val="lt1"/>
           </a:fontRef>
         </p:style>
         <p:txBody>
@@ -30135,10 +30058,18 @@
           <a:p>
             <a:pPr algn="ctr"/>
             <a:r>
-              <a:rPr lang="nl-NL" dirty="0" smtClean="0"/>
+              <a:rPr lang="nl-NL" dirty="0">
+                <a:solidFill>
+                  <a:schemeClr val="lt1"/>
+                </a:solidFill>
+              </a:rPr>
               <a:t>PCS</a:t>
             </a:r>
-            <a:endParaRPr lang="en-US" dirty="0"/>
+            <a:endParaRPr lang="en-US" dirty="0">
+              <a:solidFill>
+                <a:schemeClr val="lt1"/>
+              </a:solidFill>
+            </a:endParaRPr>
           </a:p>
         </p:txBody>
       </p:sp>
@@ -30158,17 +30089,17 @@
           </a:prstGeom>
         </p:spPr>
         <p:style>
-          <a:lnRef idx="1">
+          <a:lnRef idx="0">
             <a:schemeClr val="accent2"/>
           </a:lnRef>
-          <a:fillRef idx="2">
+          <a:fillRef idx="3">
             <a:schemeClr val="accent2"/>
           </a:fillRef>
-          <a:effectRef idx="1">
+          <a:effectRef idx="3">
             <a:schemeClr val="accent2"/>
           </a:effectRef>
           <a:fontRef idx="minor">
-            <a:schemeClr val="dk1"/>
+            <a:schemeClr val="lt1"/>
           </a:fontRef>
         </p:style>
         <p:txBody>
@@ -30177,14 +30108,18 @@
           <a:p>
             <a:pPr algn="ctr"/>
             <a:r>
-              <a:rPr lang="nl-NL" dirty="0"/>
-              <a:t>D</a:t>
-            </a:r>
-            <a:r>
-              <a:rPr lang="nl-NL" dirty="0" smtClean="0"/>
-              <a:t>CS</a:t>
-            </a:r>
-            <a:endParaRPr lang="en-US" dirty="0"/>
+              <a:rPr lang="nl-NL" dirty="0">
+                <a:solidFill>
+                  <a:schemeClr val="lt1"/>
+                </a:solidFill>
+              </a:rPr>
+              <a:t>DCS</a:t>
+            </a:r>
+            <a:endParaRPr lang="en-US" dirty="0">
+              <a:solidFill>
+                <a:schemeClr val="lt1"/>
+              </a:solidFill>
+            </a:endParaRPr>
           </a:p>
         </p:txBody>
       </p:sp>
@@ -30380,22 +30315,29 @@
           <a:prstGeom prst="bentConnector2">
             <a:avLst/>
           </a:prstGeom>
+          <a:noFill/>
           <a:ln>
-            <a:tailEnd type="arrow"/>
+            <a:solidFill>
+              <a:srgbClr val="C00000"/>
+            </a:solidFill>
+            <a:headEnd type="none" w="med" len="med"/>
+            <a:tailEnd type="arrow" w="med" len="med"/>
           </a:ln>
         </p:spPr>
         <p:style>
-          <a:lnRef idx="1">
-            <a:schemeClr val="accent1"/>
+          <a:lnRef idx="2">
+            <a:schemeClr val="accent1">
+              <a:shade val="50000"/>
+            </a:schemeClr>
           </a:lnRef>
-          <a:fillRef idx="0">
+          <a:fillRef idx="1">
             <a:schemeClr val="accent1"/>
           </a:fillRef>
           <a:effectRef idx="0">
             <a:schemeClr val="accent1"/>
           </a:effectRef>
           <a:fontRef idx="minor">
-            <a:schemeClr val="tx1"/>
+            <a:schemeClr val="lt1"/>
           </a:fontRef>
         </p:style>
       </p:cxnSp>
@@ -30413,22 +30355,29 @@
           <a:prstGeom prst="bentConnector3">
             <a:avLst/>
           </a:prstGeom>
+          <a:noFill/>
           <a:ln>
-            <a:tailEnd type="arrow"/>
+            <a:solidFill>
+              <a:srgbClr val="C00000"/>
+            </a:solidFill>
+            <a:headEnd type="none" w="med" len="med"/>
+            <a:tailEnd type="arrow" w="med" len="med"/>
           </a:ln>
         </p:spPr>
         <p:style>
-          <a:lnRef idx="1">
-            <a:schemeClr val="accent1"/>
+          <a:lnRef idx="2">
+            <a:schemeClr val="accent1">
+              <a:shade val="50000"/>
+            </a:schemeClr>
           </a:lnRef>
-          <a:fillRef idx="0">
+          <a:fillRef idx="1">
             <a:schemeClr val="accent1"/>
           </a:fillRef>
           <a:effectRef idx="0">
             <a:schemeClr val="accent1"/>
           </a:effectRef>
           <a:fontRef idx="minor">
-            <a:schemeClr val="tx1"/>
+            <a:schemeClr val="lt1"/>
           </a:fontRef>
         </p:style>
       </p:cxnSp>
@@ -31199,17 +31148,17 @@
           </a:prstGeom>
         </p:spPr>
         <p:style>
-          <a:lnRef idx="1">
+          <a:lnRef idx="0">
             <a:schemeClr val="accent2"/>
           </a:lnRef>
-          <a:fillRef idx="2">
+          <a:fillRef idx="3">
             <a:schemeClr val="accent2"/>
           </a:fillRef>
-          <a:effectRef idx="1">
+          <a:effectRef idx="3">
             <a:schemeClr val="accent2"/>
           </a:effectRef>
           <a:fontRef idx="minor">
-            <a:schemeClr val="dk1"/>
+            <a:schemeClr val="lt1"/>
           </a:fontRef>
         </p:style>
         <p:txBody>
@@ -31218,10 +31167,18 @@
           <a:p>
             <a:pPr algn="ctr"/>
             <a:r>
-              <a:rPr lang="nl-NL" dirty="0" smtClean="0"/>
-              <a:t>OSN?</a:t>
-            </a:r>
-            <a:endParaRPr lang="en-US" dirty="0"/>
+              <a:rPr lang="nl-NL" dirty="0" smtClean="0">
+                <a:solidFill>
+                  <a:schemeClr val="lt1"/>
+                </a:solidFill>
+              </a:rPr>
+              <a:t>OSN</a:t>
+            </a:r>
+            <a:endParaRPr lang="en-US" dirty="0">
+              <a:solidFill>
+                <a:schemeClr val="lt1"/>
+              </a:solidFill>
+            </a:endParaRPr>
           </a:p>
         </p:txBody>
       </p:sp>
@@ -31243,22 +31200,29 @@
               <a:gd name="adj1" fmla="val 85038"/>
             </a:avLst>
           </a:prstGeom>
+          <a:noFill/>
           <a:ln>
-            <a:tailEnd type="arrow"/>
+            <a:solidFill>
+              <a:srgbClr val="C00000"/>
+            </a:solidFill>
+            <a:headEnd type="none" w="med" len="med"/>
+            <a:tailEnd type="arrow" w="med" len="med"/>
           </a:ln>
         </p:spPr>
         <p:style>
-          <a:lnRef idx="1">
-            <a:schemeClr val="accent1"/>
+          <a:lnRef idx="2">
+            <a:schemeClr val="accent1">
+              <a:shade val="50000"/>
+            </a:schemeClr>
           </a:lnRef>
-          <a:fillRef idx="0">
+          <a:fillRef idx="1">
             <a:schemeClr val="accent1"/>
           </a:fillRef>
           <a:effectRef idx="0">
             <a:schemeClr val="accent1"/>
           </a:effectRef>
           <a:fontRef idx="minor">
-            <a:schemeClr val="tx1"/>
+            <a:schemeClr val="lt1"/>
           </a:fontRef>
         </p:style>
       </p:cxnSp>
@@ -32295,29 +32259,25 @@
               </a:path>
             </a:pathLst>
           </a:custGeom>
-          <a:noFill/>
-          <a:ln>
+          <a:ln w="38100">
             <a:solidFill>
               <a:srgbClr val="C00000"/>
             </a:solidFill>
-            <a:headEnd type="none" w="med" len="med"/>
-            <a:tailEnd type="arrow" w="med" len="med"/>
+            <a:tailEnd type="arrow"/>
           </a:ln>
         </p:spPr>
         <p:style>
-          <a:lnRef idx="2">
-            <a:schemeClr val="accent1">
-              <a:shade val="50000"/>
-            </a:schemeClr>
+          <a:lnRef idx="1">
+            <a:schemeClr val="accent1"/>
           </a:lnRef>
-          <a:fillRef idx="1">
+          <a:fillRef idx="0">
             <a:schemeClr val="accent1"/>
           </a:fillRef>
           <a:effectRef idx="0">
             <a:schemeClr val="accent1"/>
           </a:effectRef>
           <a:fontRef idx="minor">
-            <a:schemeClr val="lt1"/>
+            <a:schemeClr val="tx1"/>
           </a:fontRef>
         </p:style>
         <p:txBody>
@@ -36291,7 +36251,7 @@
         </p:nvSpPr>
         <p:spPr>
           <a:xfrm>
-            <a:off x="593558" y="2154037"/>
+            <a:off x="762618" y="1793997"/>
             <a:ext cx="936104" cy="720080"/>
           </a:xfrm>
           <a:prstGeom prst="cube">
@@ -36457,8 +36417,8 @@
         </p:nvSpPr>
         <p:spPr>
           <a:xfrm>
-            <a:off x="3209293" y="5367797"/>
-            <a:ext cx="216024" cy="216025"/>
+            <a:off x="3131840" y="5367797"/>
+            <a:ext cx="293477" cy="216025"/>
           </a:xfrm>
           <a:prstGeom prst="cube">
             <a:avLst/>
@@ -36497,7 +36457,7 @@
         </p:nvSpPr>
         <p:spPr>
           <a:xfrm>
-            <a:off x="935596" y="2046024"/>
+            <a:off x="1104656" y="1685984"/>
             <a:ext cx="216024" cy="216025"/>
           </a:xfrm>
           <a:prstGeom prst="cube">
@@ -36540,8 +36500,8 @@
         </p:nvCxnSpPr>
         <p:spPr>
           <a:xfrm flipV="1">
-            <a:off x="3290302" y="3635407"/>
-            <a:ext cx="1263079" cy="1786396"/>
+            <a:off x="3251575" y="3635407"/>
+            <a:ext cx="1301806" cy="1786396"/>
           </a:xfrm>
           <a:prstGeom prst="straightConnector1">
             <a:avLst/>
@@ -36825,8 +36785,8 @@
         </p:nvCxnSpPr>
         <p:spPr>
           <a:xfrm>
-            <a:off x="1097614" y="2181040"/>
-            <a:ext cx="3222358" cy="1220958"/>
+            <a:off x="1266674" y="1821000"/>
+            <a:ext cx="3053298" cy="1580998"/>
           </a:xfrm>
           <a:prstGeom prst="straightConnector1">
             <a:avLst/>
@@ -36878,7 +36838,7 @@
         </p:blipFill>
         <p:spPr bwMode="auto">
           <a:xfrm>
-            <a:off x="3684564" y="1713903"/>
+            <a:off x="3684564" y="1613209"/>
             <a:ext cx="1819875" cy="664242"/>
           </a:xfrm>
           <a:prstGeom prst="rect">
@@ -36938,7 +36898,7 @@
         </p:blipFill>
         <p:spPr bwMode="auto">
           <a:xfrm>
-            <a:off x="1929333" y="2604421"/>
+            <a:off x="1712940" y="2378145"/>
             <a:ext cx="2282627" cy="591084"/>
           </a:xfrm>
           <a:prstGeom prst="rect">
@@ -37061,13 +37021,13 @@
         </p:nvSpPr>
         <p:spPr>
           <a:xfrm>
-            <a:off x="755576" y="548680"/>
-            <a:ext cx="2734123" cy="804095"/>
+            <a:off x="762618" y="548680"/>
+            <a:ext cx="2734123" cy="594253"/>
           </a:xfrm>
           <a:prstGeom prst="wedgeRectCallout">
             <a:avLst>
-              <a:gd name="adj1" fmla="val 7477"/>
-              <a:gd name="adj2" fmla="val 213873"/>
+              <a:gd name="adj1" fmla="val 18104"/>
+              <a:gd name="adj2" fmla="val 278586"/>
             </a:avLst>
           </a:prstGeom>
         </p:spPr>
@@ -37129,7 +37089,7 @@
             </a:r>
             <a:r>
               <a:rPr lang="nl-NL" sz="1200" dirty="0" err="1" smtClean="0"/>
-              <a:t>currently</a:t>
+              <a:t>forwarded</a:t>
             </a:r>
             <a:r>
               <a:rPr lang="nl-NL" sz="1200" dirty="0" smtClean="0"/>
@@ -37137,43 +37097,15 @@
             </a:r>
             <a:r>
               <a:rPr lang="nl-NL" sz="1200" dirty="0" err="1" smtClean="0"/>
-              <a:t>forwarded</a:t>
+              <a:t>to</a:t>
             </a:r>
             <a:r>
               <a:rPr lang="nl-NL" sz="1200" dirty="0" smtClean="0"/>
-              <a:t> </a:t>
-            </a:r>
-            <a:r>
-              <a:rPr lang="nl-NL" sz="1200" dirty="0" err="1" smtClean="0"/>
-              <a:t>to</a:t>
+              <a:t> SOA </a:t>
             </a:r>
             <a:r>
               <a:rPr lang="nl-NL" sz="1200" dirty="0" smtClean="0"/>
-              <a:t> SOA CS – </a:t>
-            </a:r>
-            <a:r>
-              <a:rPr lang="nl-NL" sz="1200" dirty="0" err="1" smtClean="0"/>
-              <a:t>eventually</a:t>
-            </a:r>
-            <a:r>
-              <a:rPr lang="nl-NL" sz="1200" dirty="0" smtClean="0"/>
-              <a:t> </a:t>
-            </a:r>
-            <a:r>
-              <a:rPr lang="nl-NL" sz="1200" dirty="0" err="1" smtClean="0"/>
-              <a:t>routed</a:t>
-            </a:r>
-            <a:r>
-              <a:rPr lang="nl-NL" sz="1200" dirty="0" smtClean="0"/>
-              <a:t> </a:t>
-            </a:r>
-            <a:r>
-              <a:rPr lang="nl-NL" sz="1200" dirty="0" err="1" smtClean="0"/>
-              <a:t>to</a:t>
-            </a:r>
-            <a:r>
-              <a:rPr lang="nl-NL" sz="1200" dirty="0" smtClean="0"/>
-              <a:t> PCS</a:t>
+              <a:t>CS</a:t>
             </a:r>
             <a:endParaRPr lang="en-US" sz="1200" dirty="0"/>
           </a:p>
@@ -37344,7 +37276,7 @@
         <p:spPr>
           <a:xfrm flipV="1">
             <a:off x="251520" y="3401998"/>
-            <a:ext cx="4068452" cy="781162"/>
+            <a:ext cx="4068452" cy="1395154"/>
           </a:xfrm>
           <a:prstGeom prst="straightConnector1">
             <a:avLst/>
@@ -37521,8 +37453,8 @@
         </p:nvSpPr>
         <p:spPr>
           <a:xfrm>
-            <a:off x="0" y="4560623"/>
-            <a:ext cx="2819127" cy="1023199"/>
+            <a:off x="968648" y="4520310"/>
+            <a:ext cx="2163150" cy="901493"/>
           </a:xfrm>
           <a:prstGeom prst="wedgeRectCallout">
             <a:avLst>
@@ -37589,12 +37521,8 @@
               <a:t> artist in  decent JSON format; </a:t>
             </a:r>
             <a:r>
-              <a:rPr lang="nl-NL" sz="1200" dirty="0" err="1" smtClean="0"/>
-              <a:t>currently</a:t>
-            </a:r>
-            <a:r>
               <a:rPr lang="nl-NL" sz="1200" dirty="0" smtClean="0"/>
-              <a:t> links </a:t>
+              <a:t>links </a:t>
             </a:r>
             <a:r>
               <a:rPr lang="nl-NL" sz="1200" dirty="0" err="1" smtClean="0"/>
@@ -37602,7 +37530,11 @@
             </a:r>
             <a:r>
               <a:rPr lang="nl-NL" sz="1200" dirty="0" smtClean="0"/>
-              <a:t> SOA CS </a:t>
+              <a:t> </a:t>
+            </a:r>
+            <a:r>
+              <a:rPr lang="nl-NL" sz="1200" dirty="0" smtClean="0"/>
+              <a:t>PCS </a:t>
             </a:r>
             <a:r>
               <a:rPr lang="nl-NL" sz="1200" dirty="0" err="1" smtClean="0"/>
@@ -37614,59 +37546,31 @@
             </a:r>
             <a:r>
               <a:rPr lang="nl-NL" sz="1200" dirty="0" err="1" smtClean="0"/>
-              <a:t>create</a:t>
+              <a:t>ask</a:t>
             </a:r>
             <a:r>
               <a:rPr lang="nl-NL" sz="1200" dirty="0" smtClean="0"/>
-              <a:t> community </a:t>
+              <a:t> for </a:t>
             </a:r>
             <a:r>
               <a:rPr lang="nl-NL" sz="1200" dirty="0" err="1" smtClean="0"/>
-              <a:t>derived</a:t>
+              <a:t>approval</a:t>
             </a:r>
             <a:r>
               <a:rPr lang="nl-NL" sz="1200" dirty="0" smtClean="0"/>
-              <a:t> artist </a:t>
+              <a:t> of </a:t>
+            </a:r>
+            <a:r>
+              <a:rPr lang="nl-NL" sz="1200" dirty="0" err="1" smtClean="0"/>
+              <a:t>the</a:t>
+            </a:r>
+            <a:r>
+              <a:rPr lang="nl-NL" sz="1200" dirty="0" smtClean="0"/>
+              <a:t> </a:t>
             </a:r>
             <a:r>
               <a:rPr lang="nl-NL" sz="1200" dirty="0" err="1" smtClean="0"/>
               <a:t>proposal</a:t>
-            </a:r>
-            <a:r>
-              <a:rPr lang="nl-NL" sz="1200" dirty="0" smtClean="0"/>
-              <a:t>; later </a:t>
-            </a:r>
-            <a:r>
-              <a:rPr lang="nl-NL" sz="1200" dirty="0" err="1" smtClean="0"/>
-              <a:t>to</a:t>
-            </a:r>
-            <a:r>
-              <a:rPr lang="nl-NL" sz="1200" dirty="0" smtClean="0"/>
-              <a:t> </a:t>
-            </a:r>
-            <a:r>
-              <a:rPr lang="nl-NL" sz="1200" dirty="0" err="1" smtClean="0"/>
-              <a:t>be</a:t>
-            </a:r>
-            <a:r>
-              <a:rPr lang="nl-NL" sz="1200" dirty="0" smtClean="0"/>
-              <a:t> </a:t>
-            </a:r>
-            <a:r>
-              <a:rPr lang="nl-NL" sz="1200" dirty="0" err="1" smtClean="0"/>
-              <a:t>rerouted</a:t>
-            </a:r>
-            <a:r>
-              <a:rPr lang="nl-NL" sz="1200" dirty="0" smtClean="0"/>
-              <a:t> </a:t>
-            </a:r>
-            <a:r>
-              <a:rPr lang="nl-NL" sz="1200" dirty="0" err="1" smtClean="0"/>
-              <a:t>to</a:t>
-            </a:r>
-            <a:r>
-              <a:rPr lang="nl-NL" sz="1200" dirty="0" smtClean="0"/>
-              <a:t> PCS</a:t>
             </a:r>
             <a:endParaRPr lang="en-US" sz="1200" dirty="0"/>
           </a:p>
@@ -38029,6 +37933,204 @@
           </a:p>
         </p:txBody>
       </p:sp>
+      <p:pic>
+        <p:nvPicPr>
+          <p:cNvPr id="4" name="Picture 2"/>
+          <p:cNvPicPr>
+            <a:picLocks noChangeAspect="1" noChangeArrowheads="1"/>
+          </p:cNvPicPr>
+          <p:nvPr/>
+        </p:nvPicPr>
+        <p:blipFill>
+          <a:blip r:embed="rId9">
+            <a:extLst>
+              <a:ext uri="{28A0092B-C50C-407E-A947-70E740481C1C}">
+                <a14:useLocalDpi xmlns:a14="http://schemas.microsoft.com/office/drawing/2010/main" val="0"/>
+              </a:ext>
+            </a:extLst>
+          </a:blip>
+          <a:srcRect/>
+          <a:stretch>
+            <a:fillRect/>
+          </a:stretch>
+        </p:blipFill>
+        <p:spPr bwMode="auto">
+          <a:xfrm>
+            <a:off x="484532" y="2803218"/>
+            <a:ext cx="2456816" cy="604322"/>
+          </a:xfrm>
+          <a:prstGeom prst="rect">
+            <a:avLst/>
+          </a:prstGeom>
+          <a:ln>
+            <a:noFill/>
+          </a:ln>
+          <a:effectLst>
+            <a:outerShdw blurRad="292100" dist="139700" dir="2700000" algn="tl" rotWithShape="0">
+              <a:srgbClr val="333333">
+                <a:alpha val="65000"/>
+              </a:srgbClr>
+            </a:outerShdw>
+          </a:effectLst>
+          <a:extLst>
+            <a:ext uri="{909E8E84-426E-40DD-AFC4-6F175D3DCCD1}">
+              <a14:hiddenFill xmlns:a14="http://schemas.microsoft.com/office/drawing/2010/main">
+                <a:solidFill>
+                  <a:schemeClr val="accent1"/>
+                </a:solidFill>
+              </a14:hiddenFill>
+            </a:ext>
+            <a:ext uri="{91240B29-F687-4F45-9708-019B960494DF}">
+              <a14:hiddenLine xmlns:a14="http://schemas.microsoft.com/office/drawing/2010/main" w="9525">
+                <a:solidFill>
+                  <a:schemeClr val="tx1"/>
+                </a:solidFill>
+                <a:miter lim="800000"/>
+                <a:headEnd/>
+                <a:tailEnd/>
+              </a14:hiddenLine>
+            </a:ext>
+          </a:extLst>
+        </p:spPr>
+      </p:pic>
+      <p:cxnSp>
+        <p:nvCxnSpPr>
+          <p:cNvPr id="9" name="Straight Arrow Connector 8"/>
+          <p:cNvCxnSpPr>
+            <a:stCxn id="11" idx="3"/>
+          </p:cNvCxnSpPr>
+          <p:nvPr/>
+        </p:nvCxnSpPr>
+        <p:spPr>
+          <a:xfrm flipH="1">
+            <a:off x="3209293" y="3483007"/>
+            <a:ext cx="1191688" cy="1884790"/>
+          </a:xfrm>
+          <a:prstGeom prst="straightConnector1">
+            <a:avLst/>
+          </a:prstGeom>
+          <a:ln w="19050">
+            <a:solidFill>
+              <a:schemeClr val="accent2">
+                <a:lumMod val="50000"/>
+              </a:schemeClr>
+            </a:solidFill>
+            <a:tailEnd type="arrow"/>
+          </a:ln>
+        </p:spPr>
+        <p:style>
+          <a:lnRef idx="1">
+            <a:schemeClr val="accent1"/>
+          </a:lnRef>
+          <a:fillRef idx="0">
+            <a:schemeClr val="accent1"/>
+          </a:fillRef>
+          <a:effectRef idx="0">
+            <a:schemeClr val="accent1"/>
+          </a:effectRef>
+          <a:fontRef idx="minor">
+            <a:schemeClr val="tx1"/>
+          </a:fontRef>
+        </p:style>
+      </p:cxnSp>
+      <p:sp>
+        <p:nvSpPr>
+          <p:cNvPr id="41" name="Rectangular Callout 40"/>
+          <p:cNvSpPr/>
+          <p:nvPr/>
+        </p:nvSpPr>
+        <p:spPr>
+          <a:xfrm>
+            <a:off x="-183438" y="3483007"/>
+            <a:ext cx="1659094" cy="901493"/>
+          </a:xfrm>
+          <a:prstGeom prst="wedgeRectCallout">
+            <a:avLst>
+              <a:gd name="adj1" fmla="val 28028"/>
+              <a:gd name="adj2" fmla="val -109862"/>
+            </a:avLst>
+          </a:prstGeom>
+        </p:spPr>
+        <p:style>
+          <a:lnRef idx="2">
+            <a:schemeClr val="accent6">
+              <a:shade val="50000"/>
+            </a:schemeClr>
+          </a:lnRef>
+          <a:fillRef idx="1">
+            <a:schemeClr val="accent6"/>
+          </a:fillRef>
+          <a:effectRef idx="0">
+            <a:schemeClr val="accent6"/>
+          </a:effectRef>
+          <a:fontRef idx="minor">
+            <a:schemeClr val="lt1"/>
+          </a:fontRef>
+        </p:style>
+        <p:txBody>
+          <a:bodyPr rtlCol="0" anchor="ctr"/>
+          <a:lstStyle/>
+          <a:p>
+            <a:pPr algn="ctr"/>
+            <a:r>
+              <a:rPr lang="nl-NL" sz="1200" dirty="0"/>
+              <a:t>REST</a:t>
+            </a:r>
+          </a:p>
+          <a:p>
+            <a:pPr algn="ctr"/>
+            <a:r>
+              <a:rPr lang="nl-NL" sz="1200" dirty="0"/>
+              <a:t>(hand off artist </a:t>
+            </a:r>
+            <a:r>
+              <a:rPr lang="nl-NL" sz="1200" dirty="0" err="1"/>
+              <a:t>finding</a:t>
+            </a:r>
+            <a:r>
+              <a:rPr lang="nl-NL" sz="1200" dirty="0"/>
+              <a:t> in </a:t>
+            </a:r>
+            <a:r>
+              <a:rPr lang="nl-NL" sz="1200" dirty="0" err="1"/>
+              <a:t>proprietary</a:t>
+            </a:r>
+            <a:r>
+              <a:rPr lang="nl-NL" sz="1200" dirty="0"/>
+              <a:t> </a:t>
+            </a:r>
+            <a:r>
+              <a:rPr lang="nl-NL" sz="1200" dirty="0" err="1"/>
+              <a:t>IoT</a:t>
+            </a:r>
+            <a:r>
+              <a:rPr lang="nl-NL" sz="1200" dirty="0"/>
+              <a:t> CS JSON format); </a:t>
+            </a:r>
+            <a:r>
+              <a:rPr lang="nl-NL" sz="1200" dirty="0" err="1"/>
+              <a:t>forwarded</a:t>
+            </a:r>
+            <a:r>
+              <a:rPr lang="nl-NL" sz="1200" dirty="0"/>
+              <a:t> </a:t>
+            </a:r>
+            <a:r>
+              <a:rPr lang="nl-NL" sz="1200" dirty="0" err="1"/>
+              <a:t>to</a:t>
+            </a:r>
+            <a:r>
+              <a:rPr lang="nl-NL" sz="1200" dirty="0"/>
+              <a:t> </a:t>
+            </a:r>
+            <a:r>
+              <a:rPr lang="nl-NL" sz="1200" dirty="0" smtClean="0"/>
+              <a:t>PCS</a:t>
+            </a:r>
+            <a:endParaRPr lang="en-US" sz="1200" dirty="0"/>
+          </a:p>
+        </p:txBody>
+      </p:sp>
     </p:spTree>
     <p:extLst>
       <p:ext uri="{BB962C8B-B14F-4D97-AF65-F5344CB8AC3E}">
@@ -38039,6 +38141,13 @@
   <p:clrMapOvr>
     <a:masterClrMapping/>
   </p:clrMapOvr>
+  <p:timing>
+    <p:tnLst>
+      <p:par>
+        <p:cTn id="1" dur="indefinite" restart="never" nodeType="tmRoot"/>
+      </p:par>
+    </p:tnLst>
+  </p:timing>
 </p:sld>
 </file>
 

</xml_diff>